<commit_message>
Slides: Added multichart feature
</commit_message>
<xml_diff>
--- a/docs/CFW_Features.pptx
+++ b/docs/CFW_Features.pptx
@@ -37,6 +37,7 @@
     <p:sldId id="296" r:id="rId31"/>
     <p:sldId id="295" r:id="rId32"/>
     <p:sldId id="297" r:id="rId33"/>
+    <p:sldId id="301" r:id="rId34"/>
   </p:sldIdLst>
   <p:sldSz cx="12192000" cy="6858000"/>
   <p:notesSz cx="6858000" cy="9144000"/>
@@ -137,7 +138,7 @@
   </p:defaultTextStyle>
   <p:extLst>
     <p:ext uri="{EFAFB233-063F-42B5-8137-9DF3F51BA10A}">
-      <p15:sldGuideLst xmlns:p15="http://schemas.microsoft.com/office/powerpoint/2012/main" xmlns=""/>
+      <p15:sldGuideLst xmlns="" xmlns:p15="http://schemas.microsoft.com/office/powerpoint/2012/main"/>
     </p:ext>
   </p:extLst>
 </p:presentation>
@@ -165,7 +166,7 @@
           <p:cNvPr id="2" name="Title 1">
             <a:extLst>
               <a:ext uri="{FF2B5EF4-FFF2-40B4-BE49-F238E27FC236}">
-                <a16:creationId xmlns:a16="http://schemas.microsoft.com/office/drawing/2014/main" xmlns="" id="{00B95F70-03C0-4FFB-8793-F7D6F5551AFE}"/>
+                <a16:creationId xmlns="" xmlns:a16="http://schemas.microsoft.com/office/drawing/2014/main" id="{00B95F70-03C0-4FFB-8793-F7D6F5551AFE}"/>
               </a:ext>
             </a:extLst>
           </p:cNvPr>
@@ -203,7 +204,7 @@
           <p:cNvPr id="3" name="Subtitle 2">
             <a:extLst>
               <a:ext uri="{FF2B5EF4-FFF2-40B4-BE49-F238E27FC236}">
-                <a16:creationId xmlns:a16="http://schemas.microsoft.com/office/drawing/2014/main" xmlns="" id="{B2734A24-4980-419F-9DCC-EF3C91B614D0}"/>
+                <a16:creationId xmlns="" xmlns:a16="http://schemas.microsoft.com/office/drawing/2014/main" id="{B2734A24-4980-419F-9DCC-EF3C91B614D0}"/>
               </a:ext>
             </a:extLst>
           </p:cNvPr>
@@ -274,7 +275,7 @@
           <p:cNvPr id="4" name="Date Placeholder 3">
             <a:extLst>
               <a:ext uri="{FF2B5EF4-FFF2-40B4-BE49-F238E27FC236}">
-                <a16:creationId xmlns:a16="http://schemas.microsoft.com/office/drawing/2014/main" xmlns="" id="{3E853A52-D183-4C0C-AF9C-8CBCDCDD993D}"/>
+                <a16:creationId xmlns="" xmlns:a16="http://schemas.microsoft.com/office/drawing/2014/main" id="{3E853A52-D183-4C0C-AF9C-8CBCDCDD993D}"/>
               </a:ext>
             </a:extLst>
           </p:cNvPr>
@@ -292,7 +293,7 @@
           <a:p>
             <a:fld id="{CAE04C65-539E-4AD4-859E-8B7412D78289}" type="datetimeFigureOut">
               <a:rPr lang="x-none" smtClean="0"/>
-              <a:t>19/07/2023</a:t>
+              <a:t>21/07/2023</a:t>
             </a:fld>
             <a:endParaRPr lang="x-none"/>
           </a:p>
@@ -303,7 +304,7 @@
           <p:cNvPr id="5" name="Footer Placeholder 4">
             <a:extLst>
               <a:ext uri="{FF2B5EF4-FFF2-40B4-BE49-F238E27FC236}">
-                <a16:creationId xmlns:a16="http://schemas.microsoft.com/office/drawing/2014/main" xmlns="" id="{F7BFF61B-7605-451A-90D7-7D5BBCEB49B8}"/>
+                <a16:creationId xmlns="" xmlns:a16="http://schemas.microsoft.com/office/drawing/2014/main" id="{F7BFF61B-7605-451A-90D7-7D5BBCEB49B8}"/>
               </a:ext>
             </a:extLst>
           </p:cNvPr>
@@ -328,7 +329,7 @@
           <p:cNvPr id="6" name="Slide Number Placeholder 5">
             <a:extLst>
               <a:ext uri="{FF2B5EF4-FFF2-40B4-BE49-F238E27FC236}">
-                <a16:creationId xmlns:a16="http://schemas.microsoft.com/office/drawing/2014/main" xmlns="" id="{5CC0DA70-08A2-486F-B9EE-95F97EE8417C}"/>
+                <a16:creationId xmlns="" xmlns:a16="http://schemas.microsoft.com/office/drawing/2014/main" id="{5CC0DA70-08A2-486F-B9EE-95F97EE8417C}"/>
               </a:ext>
             </a:extLst>
           </p:cNvPr>
@@ -387,7 +388,7 @@
           <p:cNvPr id="2" name="Title 1">
             <a:extLst>
               <a:ext uri="{FF2B5EF4-FFF2-40B4-BE49-F238E27FC236}">
-                <a16:creationId xmlns:a16="http://schemas.microsoft.com/office/drawing/2014/main" xmlns="" id="{64802038-B57B-4E5E-90FE-7F10286B5600}"/>
+                <a16:creationId xmlns="" xmlns:a16="http://schemas.microsoft.com/office/drawing/2014/main" id="{64802038-B57B-4E5E-90FE-7F10286B5600}"/>
               </a:ext>
             </a:extLst>
           </p:cNvPr>
@@ -425,7 +426,7 @@
           <p:cNvPr id="3" name="Picture Placeholder 2">
             <a:extLst>
               <a:ext uri="{FF2B5EF4-FFF2-40B4-BE49-F238E27FC236}">
-                <a16:creationId xmlns:a16="http://schemas.microsoft.com/office/drawing/2014/main" xmlns="" id="{08554BB7-F0A0-4396-BACB-54DA9F304612}"/>
+                <a16:creationId xmlns="" xmlns:a16="http://schemas.microsoft.com/office/drawing/2014/main" id="{08554BB7-F0A0-4396-BACB-54DA9F304612}"/>
               </a:ext>
             </a:extLst>
           </p:cNvPr>
@@ -492,7 +493,7 @@
           <p:cNvPr id="4" name="Text Placeholder 3">
             <a:extLst>
               <a:ext uri="{FF2B5EF4-FFF2-40B4-BE49-F238E27FC236}">
-                <a16:creationId xmlns:a16="http://schemas.microsoft.com/office/drawing/2014/main" xmlns="" id="{401A17FF-E591-4806-8EF8-735215AE0E3F}"/>
+                <a16:creationId xmlns="" xmlns:a16="http://schemas.microsoft.com/office/drawing/2014/main" id="{401A17FF-E591-4806-8EF8-735215AE0E3F}"/>
               </a:ext>
             </a:extLst>
           </p:cNvPr>
@@ -563,7 +564,7 @@
           <p:cNvPr id="5" name="Date Placeholder 4">
             <a:extLst>
               <a:ext uri="{FF2B5EF4-FFF2-40B4-BE49-F238E27FC236}">
-                <a16:creationId xmlns:a16="http://schemas.microsoft.com/office/drawing/2014/main" xmlns="" id="{090D2BFE-2655-4DA3-9CBD-07FBE562E4D8}"/>
+                <a16:creationId xmlns="" xmlns:a16="http://schemas.microsoft.com/office/drawing/2014/main" id="{090D2BFE-2655-4DA3-9CBD-07FBE562E4D8}"/>
               </a:ext>
             </a:extLst>
           </p:cNvPr>
@@ -581,7 +582,7 @@
           <a:p>
             <a:fld id="{CAE04C65-539E-4AD4-859E-8B7412D78289}" type="datetimeFigureOut">
               <a:rPr lang="x-none" smtClean="0"/>
-              <a:t>19/07/2023</a:t>
+              <a:t>21/07/2023</a:t>
             </a:fld>
             <a:endParaRPr lang="x-none"/>
           </a:p>
@@ -592,7 +593,7 @@
           <p:cNvPr id="6" name="Footer Placeholder 5">
             <a:extLst>
               <a:ext uri="{FF2B5EF4-FFF2-40B4-BE49-F238E27FC236}">
-                <a16:creationId xmlns:a16="http://schemas.microsoft.com/office/drawing/2014/main" xmlns="" id="{13BEECB8-6D65-4094-AC1A-C992C25A19E3}"/>
+                <a16:creationId xmlns="" xmlns:a16="http://schemas.microsoft.com/office/drawing/2014/main" id="{13BEECB8-6D65-4094-AC1A-C992C25A19E3}"/>
               </a:ext>
             </a:extLst>
           </p:cNvPr>
@@ -617,7 +618,7 @@
           <p:cNvPr id="7" name="Slide Number Placeholder 6">
             <a:extLst>
               <a:ext uri="{FF2B5EF4-FFF2-40B4-BE49-F238E27FC236}">
-                <a16:creationId xmlns:a16="http://schemas.microsoft.com/office/drawing/2014/main" xmlns="" id="{8DFF4C0F-BF7E-488F-A4B4-696F76B353EA}"/>
+                <a16:creationId xmlns="" xmlns:a16="http://schemas.microsoft.com/office/drawing/2014/main" id="{8DFF4C0F-BF7E-488F-A4B4-696F76B353EA}"/>
               </a:ext>
             </a:extLst>
           </p:cNvPr>
@@ -676,7 +677,7 @@
           <p:cNvPr id="2" name="Title 1">
             <a:extLst>
               <a:ext uri="{FF2B5EF4-FFF2-40B4-BE49-F238E27FC236}">
-                <a16:creationId xmlns:a16="http://schemas.microsoft.com/office/drawing/2014/main" xmlns="" id="{AFB6792A-F38B-4F2C-ADBC-1C15014B5D5C}"/>
+                <a16:creationId xmlns="" xmlns:a16="http://schemas.microsoft.com/office/drawing/2014/main" id="{AFB6792A-F38B-4F2C-ADBC-1C15014B5D5C}"/>
               </a:ext>
             </a:extLst>
           </p:cNvPr>
@@ -714,7 +715,7 @@
           <p:cNvPr id="3" name="Vertical Text Placeholder 2">
             <a:extLst>
               <a:ext uri="{FF2B5EF4-FFF2-40B4-BE49-F238E27FC236}">
-                <a16:creationId xmlns:a16="http://schemas.microsoft.com/office/drawing/2014/main" xmlns="" id="{F2A99952-591F-418A-B108-6EC6B6968419}"/>
+                <a16:creationId xmlns="" xmlns:a16="http://schemas.microsoft.com/office/drawing/2014/main" id="{F2A99952-591F-418A-B108-6EC6B6968419}"/>
               </a:ext>
             </a:extLst>
           </p:cNvPr>
@@ -772,7 +773,7 @@
           <p:cNvPr id="4" name="Date Placeholder 3">
             <a:extLst>
               <a:ext uri="{FF2B5EF4-FFF2-40B4-BE49-F238E27FC236}">
-                <a16:creationId xmlns:a16="http://schemas.microsoft.com/office/drawing/2014/main" xmlns="" id="{3D36D347-D3C8-448D-847D-015AC3FA1F2A}"/>
+                <a16:creationId xmlns="" xmlns:a16="http://schemas.microsoft.com/office/drawing/2014/main" id="{3D36D347-D3C8-448D-847D-015AC3FA1F2A}"/>
               </a:ext>
             </a:extLst>
           </p:cNvPr>
@@ -790,7 +791,7 @@
           <a:p>
             <a:fld id="{CAE04C65-539E-4AD4-859E-8B7412D78289}" type="datetimeFigureOut">
               <a:rPr lang="x-none" smtClean="0"/>
-              <a:t>19/07/2023</a:t>
+              <a:t>21/07/2023</a:t>
             </a:fld>
             <a:endParaRPr lang="x-none"/>
           </a:p>
@@ -801,7 +802,7 @@
           <p:cNvPr id="5" name="Footer Placeholder 4">
             <a:extLst>
               <a:ext uri="{FF2B5EF4-FFF2-40B4-BE49-F238E27FC236}">
-                <a16:creationId xmlns:a16="http://schemas.microsoft.com/office/drawing/2014/main" xmlns="" id="{99E80698-EA0D-43B5-9E68-9C256E5BD8B6}"/>
+                <a16:creationId xmlns="" xmlns:a16="http://schemas.microsoft.com/office/drawing/2014/main" id="{99E80698-EA0D-43B5-9E68-9C256E5BD8B6}"/>
               </a:ext>
             </a:extLst>
           </p:cNvPr>
@@ -826,7 +827,7 @@
           <p:cNvPr id="6" name="Slide Number Placeholder 5">
             <a:extLst>
               <a:ext uri="{FF2B5EF4-FFF2-40B4-BE49-F238E27FC236}">
-                <a16:creationId xmlns:a16="http://schemas.microsoft.com/office/drawing/2014/main" xmlns="" id="{1C7C721B-CEB8-44BA-A33B-0999425FF8CB}"/>
+                <a16:creationId xmlns="" xmlns:a16="http://schemas.microsoft.com/office/drawing/2014/main" id="{1C7C721B-CEB8-44BA-A33B-0999425FF8CB}"/>
               </a:ext>
             </a:extLst>
           </p:cNvPr>
@@ -885,7 +886,7 @@
           <p:cNvPr id="2" name="Vertical Title 1">
             <a:extLst>
               <a:ext uri="{FF2B5EF4-FFF2-40B4-BE49-F238E27FC236}">
-                <a16:creationId xmlns:a16="http://schemas.microsoft.com/office/drawing/2014/main" xmlns="" id="{500B0A6C-F906-4F5E-AADC-643EEFC80DEB}"/>
+                <a16:creationId xmlns="" xmlns:a16="http://schemas.microsoft.com/office/drawing/2014/main" id="{500B0A6C-F906-4F5E-AADC-643EEFC80DEB}"/>
               </a:ext>
             </a:extLst>
           </p:cNvPr>
@@ -919,7 +920,7 @@
           <p:cNvPr id="3" name="Vertical Text Placeholder 2">
             <a:extLst>
               <a:ext uri="{FF2B5EF4-FFF2-40B4-BE49-F238E27FC236}">
-                <a16:creationId xmlns:a16="http://schemas.microsoft.com/office/drawing/2014/main" xmlns="" id="{29CC0E59-041B-4D67-B633-405BC9AD35A2}"/>
+                <a16:creationId xmlns="" xmlns:a16="http://schemas.microsoft.com/office/drawing/2014/main" id="{29CC0E59-041B-4D67-B633-405BC9AD35A2}"/>
               </a:ext>
             </a:extLst>
           </p:cNvPr>
@@ -982,7 +983,7 @@
           <p:cNvPr id="4" name="Date Placeholder 3">
             <a:extLst>
               <a:ext uri="{FF2B5EF4-FFF2-40B4-BE49-F238E27FC236}">
-                <a16:creationId xmlns:a16="http://schemas.microsoft.com/office/drawing/2014/main" xmlns="" id="{7C66094C-1E6B-4D24-94B7-DB85355ED520}"/>
+                <a16:creationId xmlns="" xmlns:a16="http://schemas.microsoft.com/office/drawing/2014/main" id="{7C66094C-1E6B-4D24-94B7-DB85355ED520}"/>
               </a:ext>
             </a:extLst>
           </p:cNvPr>
@@ -1000,7 +1001,7 @@
           <a:p>
             <a:fld id="{CAE04C65-539E-4AD4-859E-8B7412D78289}" type="datetimeFigureOut">
               <a:rPr lang="x-none" smtClean="0"/>
-              <a:t>19/07/2023</a:t>
+              <a:t>21/07/2023</a:t>
             </a:fld>
             <a:endParaRPr lang="x-none"/>
           </a:p>
@@ -1011,7 +1012,7 @@
           <p:cNvPr id="5" name="Footer Placeholder 4">
             <a:extLst>
               <a:ext uri="{FF2B5EF4-FFF2-40B4-BE49-F238E27FC236}">
-                <a16:creationId xmlns:a16="http://schemas.microsoft.com/office/drawing/2014/main" xmlns="" id="{A58C9311-2138-4B0E-9939-26AC61D07969}"/>
+                <a16:creationId xmlns="" xmlns:a16="http://schemas.microsoft.com/office/drawing/2014/main" id="{A58C9311-2138-4B0E-9939-26AC61D07969}"/>
               </a:ext>
             </a:extLst>
           </p:cNvPr>
@@ -1036,7 +1037,7 @@
           <p:cNvPr id="6" name="Slide Number Placeholder 5">
             <a:extLst>
               <a:ext uri="{FF2B5EF4-FFF2-40B4-BE49-F238E27FC236}">
-                <a16:creationId xmlns:a16="http://schemas.microsoft.com/office/drawing/2014/main" xmlns="" id="{C33BE1DF-F537-4836-A12B-24449608FC5F}"/>
+                <a16:creationId xmlns="" xmlns:a16="http://schemas.microsoft.com/office/drawing/2014/main" id="{C33BE1DF-F537-4836-A12B-24449608FC5F}"/>
               </a:ext>
             </a:extLst>
           </p:cNvPr>
@@ -1095,7 +1096,7 @@
           <p:cNvPr id="2" name="Title 1">
             <a:extLst>
               <a:ext uri="{FF2B5EF4-FFF2-40B4-BE49-F238E27FC236}">
-                <a16:creationId xmlns:a16="http://schemas.microsoft.com/office/drawing/2014/main" xmlns="" id="{721241B2-0D86-430D-B41B-D8E905A0226B}"/>
+                <a16:creationId xmlns="" xmlns:a16="http://schemas.microsoft.com/office/drawing/2014/main" id="{721241B2-0D86-430D-B41B-D8E905A0226B}"/>
               </a:ext>
             </a:extLst>
           </p:cNvPr>
@@ -1133,7 +1134,7 @@
           <p:cNvPr id="3" name="Content Placeholder 2">
             <a:extLst>
               <a:ext uri="{FF2B5EF4-FFF2-40B4-BE49-F238E27FC236}">
-                <a16:creationId xmlns:a16="http://schemas.microsoft.com/office/drawing/2014/main" xmlns="" id="{5B8D9E8E-BCFE-476B-9C3E-D795BDF1FD75}"/>
+                <a16:creationId xmlns="" xmlns:a16="http://schemas.microsoft.com/office/drawing/2014/main" id="{5B8D9E8E-BCFE-476B-9C3E-D795BDF1FD75}"/>
               </a:ext>
             </a:extLst>
           </p:cNvPr>
@@ -1196,7 +1197,7 @@
           <p:cNvPr id="4" name="Date Placeholder 3">
             <a:extLst>
               <a:ext uri="{FF2B5EF4-FFF2-40B4-BE49-F238E27FC236}">
-                <a16:creationId xmlns:a16="http://schemas.microsoft.com/office/drawing/2014/main" xmlns="" id="{397D097D-F058-404A-9054-FA12C51573F2}"/>
+                <a16:creationId xmlns="" xmlns:a16="http://schemas.microsoft.com/office/drawing/2014/main" id="{397D097D-F058-404A-9054-FA12C51573F2}"/>
               </a:ext>
             </a:extLst>
           </p:cNvPr>
@@ -1214,7 +1215,7 @@
           <a:p>
             <a:fld id="{CAE04C65-539E-4AD4-859E-8B7412D78289}" type="datetimeFigureOut">
               <a:rPr lang="x-none" smtClean="0"/>
-              <a:t>19/07/2023</a:t>
+              <a:t>21/07/2023</a:t>
             </a:fld>
             <a:endParaRPr lang="x-none"/>
           </a:p>
@@ -1225,7 +1226,7 @@
           <p:cNvPr id="5" name="Footer Placeholder 4">
             <a:extLst>
               <a:ext uri="{FF2B5EF4-FFF2-40B4-BE49-F238E27FC236}">
-                <a16:creationId xmlns:a16="http://schemas.microsoft.com/office/drawing/2014/main" xmlns="" id="{A4A3C1B6-62FF-4D39-B1B7-80ED1EEB8500}"/>
+                <a16:creationId xmlns="" xmlns:a16="http://schemas.microsoft.com/office/drawing/2014/main" id="{A4A3C1B6-62FF-4D39-B1B7-80ED1EEB8500}"/>
               </a:ext>
             </a:extLst>
           </p:cNvPr>
@@ -1250,7 +1251,7 @@
           <p:cNvPr id="6" name="Slide Number Placeholder 5">
             <a:extLst>
               <a:ext uri="{FF2B5EF4-FFF2-40B4-BE49-F238E27FC236}">
-                <a16:creationId xmlns:a16="http://schemas.microsoft.com/office/drawing/2014/main" xmlns="" id="{3AE1DEF8-8DD4-429C-8045-43AFFEE4E620}"/>
+                <a16:creationId xmlns="" xmlns:a16="http://schemas.microsoft.com/office/drawing/2014/main" id="{3AE1DEF8-8DD4-429C-8045-43AFFEE4E620}"/>
               </a:ext>
             </a:extLst>
           </p:cNvPr>
@@ -1309,7 +1310,7 @@
           <p:cNvPr id="2" name="Title 1">
             <a:extLst>
               <a:ext uri="{FF2B5EF4-FFF2-40B4-BE49-F238E27FC236}">
-                <a16:creationId xmlns:a16="http://schemas.microsoft.com/office/drawing/2014/main" xmlns="" id="{721241B2-0D86-430D-B41B-D8E905A0226B}"/>
+                <a16:creationId xmlns="" xmlns:a16="http://schemas.microsoft.com/office/drawing/2014/main" id="{721241B2-0D86-430D-B41B-D8E905A0226B}"/>
               </a:ext>
             </a:extLst>
           </p:cNvPr>
@@ -1347,7 +1348,7 @@
           <p:cNvPr id="3" name="Content Placeholder 2">
             <a:extLst>
               <a:ext uri="{FF2B5EF4-FFF2-40B4-BE49-F238E27FC236}">
-                <a16:creationId xmlns:a16="http://schemas.microsoft.com/office/drawing/2014/main" xmlns="" id="{5B8D9E8E-BCFE-476B-9C3E-D795BDF1FD75}"/>
+                <a16:creationId xmlns="" xmlns:a16="http://schemas.microsoft.com/office/drawing/2014/main" id="{5B8D9E8E-BCFE-476B-9C3E-D795BDF1FD75}"/>
               </a:ext>
             </a:extLst>
           </p:cNvPr>
@@ -1386,7 +1387,7 @@
           <p:cNvPr id="4" name="Date Placeholder 3">
             <a:extLst>
               <a:ext uri="{FF2B5EF4-FFF2-40B4-BE49-F238E27FC236}">
-                <a16:creationId xmlns:a16="http://schemas.microsoft.com/office/drawing/2014/main" xmlns="" id="{397D097D-F058-404A-9054-FA12C51573F2}"/>
+                <a16:creationId xmlns="" xmlns:a16="http://schemas.microsoft.com/office/drawing/2014/main" id="{397D097D-F058-404A-9054-FA12C51573F2}"/>
               </a:ext>
             </a:extLst>
           </p:cNvPr>
@@ -1404,7 +1405,7 @@
           <a:p>
             <a:fld id="{CAE04C65-539E-4AD4-859E-8B7412D78289}" type="datetimeFigureOut">
               <a:rPr lang="x-none" smtClean="0"/>
-              <a:t>19/07/2023</a:t>
+              <a:t>21/07/2023</a:t>
             </a:fld>
             <a:endParaRPr lang="x-none"/>
           </a:p>
@@ -1415,7 +1416,7 @@
           <p:cNvPr id="5" name="Footer Placeholder 4">
             <a:extLst>
               <a:ext uri="{FF2B5EF4-FFF2-40B4-BE49-F238E27FC236}">
-                <a16:creationId xmlns:a16="http://schemas.microsoft.com/office/drawing/2014/main" xmlns="" id="{A4A3C1B6-62FF-4D39-B1B7-80ED1EEB8500}"/>
+                <a16:creationId xmlns="" xmlns:a16="http://schemas.microsoft.com/office/drawing/2014/main" id="{A4A3C1B6-62FF-4D39-B1B7-80ED1EEB8500}"/>
               </a:ext>
             </a:extLst>
           </p:cNvPr>
@@ -1440,7 +1441,7 @@
           <p:cNvPr id="6" name="Slide Number Placeholder 5">
             <a:extLst>
               <a:ext uri="{FF2B5EF4-FFF2-40B4-BE49-F238E27FC236}">
-                <a16:creationId xmlns:a16="http://schemas.microsoft.com/office/drawing/2014/main" xmlns="" id="{3AE1DEF8-8DD4-429C-8045-43AFFEE4E620}"/>
+                <a16:creationId xmlns="" xmlns:a16="http://schemas.microsoft.com/office/drawing/2014/main" id="{3AE1DEF8-8DD4-429C-8045-43AFFEE4E620}"/>
               </a:ext>
             </a:extLst>
           </p:cNvPr>
@@ -1499,7 +1500,7 @@
           <p:cNvPr id="2" name="Title 1">
             <a:extLst>
               <a:ext uri="{FF2B5EF4-FFF2-40B4-BE49-F238E27FC236}">
-                <a16:creationId xmlns:a16="http://schemas.microsoft.com/office/drawing/2014/main" xmlns="" id="{7F92C17B-2942-4D0A-96F1-F2E0E5735A53}"/>
+                <a16:creationId xmlns="" xmlns:a16="http://schemas.microsoft.com/office/drawing/2014/main" id="{7F92C17B-2942-4D0A-96F1-F2E0E5735A53}"/>
               </a:ext>
             </a:extLst>
           </p:cNvPr>
@@ -1537,7 +1538,7 @@
           <p:cNvPr id="3" name="Text Placeholder 2">
             <a:extLst>
               <a:ext uri="{FF2B5EF4-FFF2-40B4-BE49-F238E27FC236}">
-                <a16:creationId xmlns:a16="http://schemas.microsoft.com/office/drawing/2014/main" xmlns="" id="{2DB10F1A-C192-41FA-B518-42050492D2D4}"/>
+                <a16:creationId xmlns="" xmlns:a16="http://schemas.microsoft.com/office/drawing/2014/main" id="{2DB10F1A-C192-41FA-B518-42050492D2D4}"/>
               </a:ext>
             </a:extLst>
           </p:cNvPr>
@@ -1662,7 +1663,7 @@
           <p:cNvPr id="4" name="Date Placeholder 3">
             <a:extLst>
               <a:ext uri="{FF2B5EF4-FFF2-40B4-BE49-F238E27FC236}">
-                <a16:creationId xmlns:a16="http://schemas.microsoft.com/office/drawing/2014/main" xmlns="" id="{184B0546-9C9D-4940-87A3-F39585AADCC0}"/>
+                <a16:creationId xmlns="" xmlns:a16="http://schemas.microsoft.com/office/drawing/2014/main" id="{184B0546-9C9D-4940-87A3-F39585AADCC0}"/>
               </a:ext>
             </a:extLst>
           </p:cNvPr>
@@ -1680,7 +1681,7 @@
           <a:p>
             <a:fld id="{CAE04C65-539E-4AD4-859E-8B7412D78289}" type="datetimeFigureOut">
               <a:rPr lang="x-none" smtClean="0"/>
-              <a:t>19/07/2023</a:t>
+              <a:t>21/07/2023</a:t>
             </a:fld>
             <a:endParaRPr lang="x-none"/>
           </a:p>
@@ -1691,7 +1692,7 @@
           <p:cNvPr id="5" name="Footer Placeholder 4">
             <a:extLst>
               <a:ext uri="{FF2B5EF4-FFF2-40B4-BE49-F238E27FC236}">
-                <a16:creationId xmlns:a16="http://schemas.microsoft.com/office/drawing/2014/main" xmlns="" id="{8B80B022-C5B3-4DD3-BF3F-C1357C979210}"/>
+                <a16:creationId xmlns="" xmlns:a16="http://schemas.microsoft.com/office/drawing/2014/main" id="{8B80B022-C5B3-4DD3-BF3F-C1357C979210}"/>
               </a:ext>
             </a:extLst>
           </p:cNvPr>
@@ -1716,7 +1717,7 @@
           <p:cNvPr id="6" name="Slide Number Placeholder 5">
             <a:extLst>
               <a:ext uri="{FF2B5EF4-FFF2-40B4-BE49-F238E27FC236}">
-                <a16:creationId xmlns:a16="http://schemas.microsoft.com/office/drawing/2014/main" xmlns="" id="{E15C7E91-1FEE-44AE-B9B7-330B5D7DEA5A}"/>
+                <a16:creationId xmlns="" xmlns:a16="http://schemas.microsoft.com/office/drawing/2014/main" id="{E15C7E91-1FEE-44AE-B9B7-330B5D7DEA5A}"/>
               </a:ext>
             </a:extLst>
           </p:cNvPr>
@@ -1775,7 +1776,7 @@
           <p:cNvPr id="2" name="Title 1">
             <a:extLst>
               <a:ext uri="{FF2B5EF4-FFF2-40B4-BE49-F238E27FC236}">
-                <a16:creationId xmlns:a16="http://schemas.microsoft.com/office/drawing/2014/main" xmlns="" id="{9D2AD6B7-3B2E-4C6A-9CEE-ED7686ECAC2E}"/>
+                <a16:creationId xmlns="" xmlns:a16="http://schemas.microsoft.com/office/drawing/2014/main" id="{9D2AD6B7-3B2E-4C6A-9CEE-ED7686ECAC2E}"/>
               </a:ext>
             </a:extLst>
           </p:cNvPr>
@@ -1813,7 +1814,7 @@
           <p:cNvPr id="3" name="Content Placeholder 2">
             <a:extLst>
               <a:ext uri="{FF2B5EF4-FFF2-40B4-BE49-F238E27FC236}">
-                <a16:creationId xmlns:a16="http://schemas.microsoft.com/office/drawing/2014/main" xmlns="" id="{8AD17769-71E8-4707-8BA2-910AAC4845DC}"/>
+                <a16:creationId xmlns="" xmlns:a16="http://schemas.microsoft.com/office/drawing/2014/main" id="{8AD17769-71E8-4707-8BA2-910AAC4845DC}"/>
               </a:ext>
             </a:extLst>
           </p:cNvPr>
@@ -1876,7 +1877,7 @@
           <p:cNvPr id="4" name="Content Placeholder 3">
             <a:extLst>
               <a:ext uri="{FF2B5EF4-FFF2-40B4-BE49-F238E27FC236}">
-                <a16:creationId xmlns:a16="http://schemas.microsoft.com/office/drawing/2014/main" xmlns="" id="{EECE7247-487E-471D-8D75-BA5F655BAC60}"/>
+                <a16:creationId xmlns="" xmlns:a16="http://schemas.microsoft.com/office/drawing/2014/main" id="{EECE7247-487E-471D-8D75-BA5F655BAC60}"/>
               </a:ext>
             </a:extLst>
           </p:cNvPr>
@@ -1939,7 +1940,7 @@
           <p:cNvPr id="5" name="Date Placeholder 4">
             <a:extLst>
               <a:ext uri="{FF2B5EF4-FFF2-40B4-BE49-F238E27FC236}">
-                <a16:creationId xmlns:a16="http://schemas.microsoft.com/office/drawing/2014/main" xmlns="" id="{8BCC875D-D2B6-4251-81C3-89B2569BBAD7}"/>
+                <a16:creationId xmlns="" xmlns:a16="http://schemas.microsoft.com/office/drawing/2014/main" id="{8BCC875D-D2B6-4251-81C3-89B2569BBAD7}"/>
               </a:ext>
             </a:extLst>
           </p:cNvPr>
@@ -1957,7 +1958,7 @@
           <a:p>
             <a:fld id="{CAE04C65-539E-4AD4-859E-8B7412D78289}" type="datetimeFigureOut">
               <a:rPr lang="x-none" smtClean="0"/>
-              <a:t>19/07/2023</a:t>
+              <a:t>21/07/2023</a:t>
             </a:fld>
             <a:endParaRPr lang="x-none"/>
           </a:p>
@@ -1968,7 +1969,7 @@
           <p:cNvPr id="6" name="Footer Placeholder 5">
             <a:extLst>
               <a:ext uri="{FF2B5EF4-FFF2-40B4-BE49-F238E27FC236}">
-                <a16:creationId xmlns:a16="http://schemas.microsoft.com/office/drawing/2014/main" xmlns="" id="{D1F7938A-1BA6-419F-AEB4-60E23EA7FE1E}"/>
+                <a16:creationId xmlns="" xmlns:a16="http://schemas.microsoft.com/office/drawing/2014/main" id="{D1F7938A-1BA6-419F-AEB4-60E23EA7FE1E}"/>
               </a:ext>
             </a:extLst>
           </p:cNvPr>
@@ -1993,7 +1994,7 @@
           <p:cNvPr id="7" name="Slide Number Placeholder 6">
             <a:extLst>
               <a:ext uri="{FF2B5EF4-FFF2-40B4-BE49-F238E27FC236}">
-                <a16:creationId xmlns:a16="http://schemas.microsoft.com/office/drawing/2014/main" xmlns="" id="{916EA456-7EC8-411E-9A69-771CE07E1543}"/>
+                <a16:creationId xmlns="" xmlns:a16="http://schemas.microsoft.com/office/drawing/2014/main" id="{916EA456-7EC8-411E-9A69-771CE07E1543}"/>
               </a:ext>
             </a:extLst>
           </p:cNvPr>
@@ -2052,7 +2053,7 @@
           <p:cNvPr id="2" name="Title 1">
             <a:extLst>
               <a:ext uri="{FF2B5EF4-FFF2-40B4-BE49-F238E27FC236}">
-                <a16:creationId xmlns:a16="http://schemas.microsoft.com/office/drawing/2014/main" xmlns="" id="{8B6DE085-2280-467E-91CB-6698071994E5}"/>
+                <a16:creationId xmlns="" xmlns:a16="http://schemas.microsoft.com/office/drawing/2014/main" id="{8B6DE085-2280-467E-91CB-6698071994E5}"/>
               </a:ext>
             </a:extLst>
           </p:cNvPr>
@@ -2090,7 +2091,7 @@
           <p:cNvPr id="3" name="Text Placeholder 2">
             <a:extLst>
               <a:ext uri="{FF2B5EF4-FFF2-40B4-BE49-F238E27FC236}">
-                <a16:creationId xmlns:a16="http://schemas.microsoft.com/office/drawing/2014/main" xmlns="" id="{40EFBDD5-779C-4D34-A857-FC50086F0EE2}"/>
+                <a16:creationId xmlns="" xmlns:a16="http://schemas.microsoft.com/office/drawing/2014/main" id="{40EFBDD5-779C-4D34-A857-FC50086F0EE2}"/>
               </a:ext>
             </a:extLst>
           </p:cNvPr>
@@ -2161,7 +2162,7 @@
           <p:cNvPr id="4" name="Content Placeholder 3">
             <a:extLst>
               <a:ext uri="{FF2B5EF4-FFF2-40B4-BE49-F238E27FC236}">
-                <a16:creationId xmlns:a16="http://schemas.microsoft.com/office/drawing/2014/main" xmlns="" id="{1C8F016C-CA19-4B99-B496-64ABB6B58158}"/>
+                <a16:creationId xmlns="" xmlns:a16="http://schemas.microsoft.com/office/drawing/2014/main" id="{1C8F016C-CA19-4B99-B496-64ABB6B58158}"/>
               </a:ext>
             </a:extLst>
           </p:cNvPr>
@@ -2224,7 +2225,7 @@
           <p:cNvPr id="5" name="Text Placeholder 4">
             <a:extLst>
               <a:ext uri="{FF2B5EF4-FFF2-40B4-BE49-F238E27FC236}">
-                <a16:creationId xmlns:a16="http://schemas.microsoft.com/office/drawing/2014/main" xmlns="" id="{A7541AC2-A479-4308-9AF8-CA83127ABD59}"/>
+                <a16:creationId xmlns="" xmlns:a16="http://schemas.microsoft.com/office/drawing/2014/main" id="{A7541AC2-A479-4308-9AF8-CA83127ABD59}"/>
               </a:ext>
             </a:extLst>
           </p:cNvPr>
@@ -2295,7 +2296,7 @@
           <p:cNvPr id="6" name="Content Placeholder 5">
             <a:extLst>
               <a:ext uri="{FF2B5EF4-FFF2-40B4-BE49-F238E27FC236}">
-                <a16:creationId xmlns:a16="http://schemas.microsoft.com/office/drawing/2014/main" xmlns="" id="{ECF79F8A-DA3A-4D09-B6DA-CDF139491450}"/>
+                <a16:creationId xmlns="" xmlns:a16="http://schemas.microsoft.com/office/drawing/2014/main" id="{ECF79F8A-DA3A-4D09-B6DA-CDF139491450}"/>
               </a:ext>
             </a:extLst>
           </p:cNvPr>
@@ -2358,7 +2359,7 @@
           <p:cNvPr id="7" name="Date Placeholder 6">
             <a:extLst>
               <a:ext uri="{FF2B5EF4-FFF2-40B4-BE49-F238E27FC236}">
-                <a16:creationId xmlns:a16="http://schemas.microsoft.com/office/drawing/2014/main" xmlns="" id="{2ED2DBA1-82A3-40C5-9F37-4B88F6C664F3}"/>
+                <a16:creationId xmlns="" xmlns:a16="http://schemas.microsoft.com/office/drawing/2014/main" id="{2ED2DBA1-82A3-40C5-9F37-4B88F6C664F3}"/>
               </a:ext>
             </a:extLst>
           </p:cNvPr>
@@ -2376,7 +2377,7 @@
           <a:p>
             <a:fld id="{CAE04C65-539E-4AD4-859E-8B7412D78289}" type="datetimeFigureOut">
               <a:rPr lang="x-none" smtClean="0"/>
-              <a:t>19/07/2023</a:t>
+              <a:t>21/07/2023</a:t>
             </a:fld>
             <a:endParaRPr lang="x-none"/>
           </a:p>
@@ -2387,7 +2388,7 @@
           <p:cNvPr id="8" name="Footer Placeholder 7">
             <a:extLst>
               <a:ext uri="{FF2B5EF4-FFF2-40B4-BE49-F238E27FC236}">
-                <a16:creationId xmlns:a16="http://schemas.microsoft.com/office/drawing/2014/main" xmlns="" id="{7094F45B-BDDE-4A68-BB93-9338CF8A5C26}"/>
+                <a16:creationId xmlns="" xmlns:a16="http://schemas.microsoft.com/office/drawing/2014/main" id="{7094F45B-BDDE-4A68-BB93-9338CF8A5C26}"/>
               </a:ext>
             </a:extLst>
           </p:cNvPr>
@@ -2412,7 +2413,7 @@
           <p:cNvPr id="9" name="Slide Number Placeholder 8">
             <a:extLst>
               <a:ext uri="{FF2B5EF4-FFF2-40B4-BE49-F238E27FC236}">
-                <a16:creationId xmlns:a16="http://schemas.microsoft.com/office/drawing/2014/main" xmlns="" id="{7795C017-DA5A-4391-8299-F0BBC4344645}"/>
+                <a16:creationId xmlns="" xmlns:a16="http://schemas.microsoft.com/office/drawing/2014/main" id="{7795C017-DA5A-4391-8299-F0BBC4344645}"/>
               </a:ext>
             </a:extLst>
           </p:cNvPr>
@@ -2471,7 +2472,7 @@
           <p:cNvPr id="2" name="Title 1">
             <a:extLst>
               <a:ext uri="{FF2B5EF4-FFF2-40B4-BE49-F238E27FC236}">
-                <a16:creationId xmlns:a16="http://schemas.microsoft.com/office/drawing/2014/main" xmlns="" id="{DF090373-D1D1-4D85-8BD7-F6CB60C5BC7B}"/>
+                <a16:creationId xmlns="" xmlns:a16="http://schemas.microsoft.com/office/drawing/2014/main" id="{DF090373-D1D1-4D85-8BD7-F6CB60C5BC7B}"/>
               </a:ext>
             </a:extLst>
           </p:cNvPr>
@@ -2509,7 +2510,7 @@
           <p:cNvPr id="3" name="Date Placeholder 2">
             <a:extLst>
               <a:ext uri="{FF2B5EF4-FFF2-40B4-BE49-F238E27FC236}">
-                <a16:creationId xmlns:a16="http://schemas.microsoft.com/office/drawing/2014/main" xmlns="" id="{4DA80B40-9C56-4836-ACF1-D4B9F7F77E5B}"/>
+                <a16:creationId xmlns="" xmlns:a16="http://schemas.microsoft.com/office/drawing/2014/main" id="{4DA80B40-9C56-4836-ACF1-D4B9F7F77E5B}"/>
               </a:ext>
             </a:extLst>
           </p:cNvPr>
@@ -2527,7 +2528,7 @@
           <a:p>
             <a:fld id="{CAE04C65-539E-4AD4-859E-8B7412D78289}" type="datetimeFigureOut">
               <a:rPr lang="x-none" smtClean="0"/>
-              <a:t>19/07/2023</a:t>
+              <a:t>21/07/2023</a:t>
             </a:fld>
             <a:endParaRPr lang="x-none"/>
           </a:p>
@@ -2538,7 +2539,7 @@
           <p:cNvPr id="4" name="Footer Placeholder 3">
             <a:extLst>
               <a:ext uri="{FF2B5EF4-FFF2-40B4-BE49-F238E27FC236}">
-                <a16:creationId xmlns:a16="http://schemas.microsoft.com/office/drawing/2014/main" xmlns="" id="{10BB32EE-102E-41E2-B788-5DDD96ACABB7}"/>
+                <a16:creationId xmlns="" xmlns:a16="http://schemas.microsoft.com/office/drawing/2014/main" id="{10BB32EE-102E-41E2-B788-5DDD96ACABB7}"/>
               </a:ext>
             </a:extLst>
           </p:cNvPr>
@@ -2563,7 +2564,7 @@
           <p:cNvPr id="5" name="Slide Number Placeholder 4">
             <a:extLst>
               <a:ext uri="{FF2B5EF4-FFF2-40B4-BE49-F238E27FC236}">
-                <a16:creationId xmlns:a16="http://schemas.microsoft.com/office/drawing/2014/main" xmlns="" id="{E7B88824-B17A-4DC3-9629-CB211E0F119E}"/>
+                <a16:creationId xmlns="" xmlns:a16="http://schemas.microsoft.com/office/drawing/2014/main" id="{E7B88824-B17A-4DC3-9629-CB211E0F119E}"/>
               </a:ext>
             </a:extLst>
           </p:cNvPr>
@@ -2622,7 +2623,7 @@
           <p:cNvPr id="2" name="Date Placeholder 1">
             <a:extLst>
               <a:ext uri="{FF2B5EF4-FFF2-40B4-BE49-F238E27FC236}">
-                <a16:creationId xmlns:a16="http://schemas.microsoft.com/office/drawing/2014/main" xmlns="" id="{4D7CE12B-9FE7-4C8A-AB68-F7D039EE3C9B}"/>
+                <a16:creationId xmlns="" xmlns:a16="http://schemas.microsoft.com/office/drawing/2014/main" id="{4D7CE12B-9FE7-4C8A-AB68-F7D039EE3C9B}"/>
               </a:ext>
             </a:extLst>
           </p:cNvPr>
@@ -2640,7 +2641,7 @@
           <a:p>
             <a:fld id="{CAE04C65-539E-4AD4-859E-8B7412D78289}" type="datetimeFigureOut">
               <a:rPr lang="x-none" smtClean="0"/>
-              <a:t>19/07/2023</a:t>
+              <a:t>21/07/2023</a:t>
             </a:fld>
             <a:endParaRPr lang="x-none"/>
           </a:p>
@@ -2651,7 +2652,7 @@
           <p:cNvPr id="3" name="Footer Placeholder 2">
             <a:extLst>
               <a:ext uri="{FF2B5EF4-FFF2-40B4-BE49-F238E27FC236}">
-                <a16:creationId xmlns:a16="http://schemas.microsoft.com/office/drawing/2014/main" xmlns="" id="{DCAC3784-E6A5-446D-9238-1396952AEA0F}"/>
+                <a16:creationId xmlns="" xmlns:a16="http://schemas.microsoft.com/office/drawing/2014/main" id="{DCAC3784-E6A5-446D-9238-1396952AEA0F}"/>
               </a:ext>
             </a:extLst>
           </p:cNvPr>
@@ -2676,7 +2677,7 @@
           <p:cNvPr id="4" name="Slide Number Placeholder 3">
             <a:extLst>
               <a:ext uri="{FF2B5EF4-FFF2-40B4-BE49-F238E27FC236}">
-                <a16:creationId xmlns:a16="http://schemas.microsoft.com/office/drawing/2014/main" xmlns="" id="{E074D0F5-8662-45C6-B05D-DF1F9D8A3D0C}"/>
+                <a16:creationId xmlns="" xmlns:a16="http://schemas.microsoft.com/office/drawing/2014/main" id="{E074D0F5-8662-45C6-B05D-DF1F9D8A3D0C}"/>
               </a:ext>
             </a:extLst>
           </p:cNvPr>
@@ -2735,7 +2736,7 @@
           <p:cNvPr id="2" name="Title 1">
             <a:extLst>
               <a:ext uri="{FF2B5EF4-FFF2-40B4-BE49-F238E27FC236}">
-                <a16:creationId xmlns:a16="http://schemas.microsoft.com/office/drawing/2014/main" xmlns="" id="{C88BF255-B2D7-498C-A3C7-A4C58317DD83}"/>
+                <a16:creationId xmlns="" xmlns:a16="http://schemas.microsoft.com/office/drawing/2014/main" id="{C88BF255-B2D7-498C-A3C7-A4C58317DD83}"/>
               </a:ext>
             </a:extLst>
           </p:cNvPr>
@@ -2773,7 +2774,7 @@
           <p:cNvPr id="3" name="Content Placeholder 2">
             <a:extLst>
               <a:ext uri="{FF2B5EF4-FFF2-40B4-BE49-F238E27FC236}">
-                <a16:creationId xmlns:a16="http://schemas.microsoft.com/office/drawing/2014/main" xmlns="" id="{2636CEDD-70C1-433C-BAA5-B342A147D3E0}"/>
+                <a16:creationId xmlns="" xmlns:a16="http://schemas.microsoft.com/office/drawing/2014/main" id="{2636CEDD-70C1-433C-BAA5-B342A147D3E0}"/>
               </a:ext>
             </a:extLst>
           </p:cNvPr>
@@ -2864,7 +2865,7 @@
           <p:cNvPr id="4" name="Text Placeholder 3">
             <a:extLst>
               <a:ext uri="{FF2B5EF4-FFF2-40B4-BE49-F238E27FC236}">
-                <a16:creationId xmlns:a16="http://schemas.microsoft.com/office/drawing/2014/main" xmlns="" id="{C5CB5D8C-A77C-4D26-A1D8-010736F847C8}"/>
+                <a16:creationId xmlns="" xmlns:a16="http://schemas.microsoft.com/office/drawing/2014/main" id="{C5CB5D8C-A77C-4D26-A1D8-010736F847C8}"/>
               </a:ext>
             </a:extLst>
           </p:cNvPr>
@@ -2935,7 +2936,7 @@
           <p:cNvPr id="5" name="Date Placeholder 4">
             <a:extLst>
               <a:ext uri="{FF2B5EF4-FFF2-40B4-BE49-F238E27FC236}">
-                <a16:creationId xmlns:a16="http://schemas.microsoft.com/office/drawing/2014/main" xmlns="" id="{9414FB87-DDFE-4E8F-87E0-C913D44A556A}"/>
+                <a16:creationId xmlns="" xmlns:a16="http://schemas.microsoft.com/office/drawing/2014/main" id="{9414FB87-DDFE-4E8F-87E0-C913D44A556A}"/>
               </a:ext>
             </a:extLst>
           </p:cNvPr>
@@ -2953,7 +2954,7 @@
           <a:p>
             <a:fld id="{CAE04C65-539E-4AD4-859E-8B7412D78289}" type="datetimeFigureOut">
               <a:rPr lang="x-none" smtClean="0"/>
-              <a:t>19/07/2023</a:t>
+              <a:t>21/07/2023</a:t>
             </a:fld>
             <a:endParaRPr lang="x-none"/>
           </a:p>
@@ -2964,7 +2965,7 @@
           <p:cNvPr id="6" name="Footer Placeholder 5">
             <a:extLst>
               <a:ext uri="{FF2B5EF4-FFF2-40B4-BE49-F238E27FC236}">
-                <a16:creationId xmlns:a16="http://schemas.microsoft.com/office/drawing/2014/main" xmlns="" id="{E396F764-A21C-45A4-91E4-7FA6B326DCA8}"/>
+                <a16:creationId xmlns="" xmlns:a16="http://schemas.microsoft.com/office/drawing/2014/main" id="{E396F764-A21C-45A4-91E4-7FA6B326DCA8}"/>
               </a:ext>
             </a:extLst>
           </p:cNvPr>
@@ -2989,7 +2990,7 @@
           <p:cNvPr id="7" name="Slide Number Placeholder 6">
             <a:extLst>
               <a:ext uri="{FF2B5EF4-FFF2-40B4-BE49-F238E27FC236}">
-                <a16:creationId xmlns:a16="http://schemas.microsoft.com/office/drawing/2014/main" xmlns="" id="{3EF52E83-3169-456B-AAD8-ABB8972F7E94}"/>
+                <a16:creationId xmlns="" xmlns:a16="http://schemas.microsoft.com/office/drawing/2014/main" id="{3EF52E83-3169-456B-AAD8-ABB8972F7E94}"/>
               </a:ext>
             </a:extLst>
           </p:cNvPr>
@@ -3056,7 +3057,7 @@
           <p:cNvPr id="2" name="Title Placeholder 1">
             <a:extLst>
               <a:ext uri="{FF2B5EF4-FFF2-40B4-BE49-F238E27FC236}">
-                <a16:creationId xmlns:a16="http://schemas.microsoft.com/office/drawing/2014/main" xmlns="" id="{1CC3A86D-3830-444D-B17A-3349865C7FF0}"/>
+                <a16:creationId xmlns="" xmlns:a16="http://schemas.microsoft.com/office/drawing/2014/main" id="{1CC3A86D-3830-444D-B17A-3349865C7FF0}"/>
               </a:ext>
             </a:extLst>
           </p:cNvPr>
@@ -3095,7 +3096,7 @@
           <p:cNvPr id="3" name="Text Placeholder 2">
             <a:extLst>
               <a:ext uri="{FF2B5EF4-FFF2-40B4-BE49-F238E27FC236}">
-                <a16:creationId xmlns:a16="http://schemas.microsoft.com/office/drawing/2014/main" xmlns="" id="{043AB334-5BA7-444F-8A15-4CBB1039B1A1}"/>
+                <a16:creationId xmlns="" xmlns:a16="http://schemas.microsoft.com/office/drawing/2014/main" id="{043AB334-5BA7-444F-8A15-4CBB1039B1A1}"/>
               </a:ext>
             </a:extLst>
           </p:cNvPr>
@@ -3163,7 +3164,7 @@
           <p:cNvPr id="4" name="Date Placeholder 3">
             <a:extLst>
               <a:ext uri="{FF2B5EF4-FFF2-40B4-BE49-F238E27FC236}">
-                <a16:creationId xmlns:a16="http://schemas.microsoft.com/office/drawing/2014/main" xmlns="" id="{DD6634C7-4BDC-430F-A9F0-60A3F69512B3}"/>
+                <a16:creationId xmlns="" xmlns:a16="http://schemas.microsoft.com/office/drawing/2014/main" id="{DD6634C7-4BDC-430F-A9F0-60A3F69512B3}"/>
               </a:ext>
             </a:extLst>
           </p:cNvPr>
@@ -3199,7 +3200,7 @@
           <a:p>
             <a:fld id="{CAE04C65-539E-4AD4-859E-8B7412D78289}" type="datetimeFigureOut">
               <a:rPr lang="x-none" smtClean="0"/>
-              <a:t>19/07/2023</a:t>
+              <a:t>21/07/2023</a:t>
             </a:fld>
             <a:endParaRPr lang="x-none"/>
           </a:p>
@@ -3210,7 +3211,7 @@
           <p:cNvPr id="5" name="Footer Placeholder 4">
             <a:extLst>
               <a:ext uri="{FF2B5EF4-FFF2-40B4-BE49-F238E27FC236}">
-                <a16:creationId xmlns:a16="http://schemas.microsoft.com/office/drawing/2014/main" xmlns="" id="{E93DAEAE-77B3-47FC-8341-6E0EFDFD0DBA}"/>
+                <a16:creationId xmlns="" xmlns:a16="http://schemas.microsoft.com/office/drawing/2014/main" id="{E93DAEAE-77B3-47FC-8341-6E0EFDFD0DBA}"/>
               </a:ext>
             </a:extLst>
           </p:cNvPr>
@@ -3253,7 +3254,7 @@
           <p:cNvPr id="6" name="Slide Number Placeholder 5">
             <a:extLst>
               <a:ext uri="{FF2B5EF4-FFF2-40B4-BE49-F238E27FC236}">
-                <a16:creationId xmlns:a16="http://schemas.microsoft.com/office/drawing/2014/main" xmlns="" id="{C4BCFFC4-BE25-4199-B180-25FF6B8B6EFE}"/>
+                <a16:creationId xmlns="" xmlns:a16="http://schemas.microsoft.com/office/drawing/2014/main" id="{C4BCFFC4-BE25-4199-B180-25FF6B8B6EFE}"/>
               </a:ext>
             </a:extLst>
           </p:cNvPr>
@@ -3622,7 +3623,7 @@
           <p:cNvPr id="2" name="Title 1">
             <a:extLst>
               <a:ext uri="{FF2B5EF4-FFF2-40B4-BE49-F238E27FC236}">
-                <a16:creationId xmlns:a16="http://schemas.microsoft.com/office/drawing/2014/main" xmlns="" id="{58A809C9-4B93-4BC5-9D6E-3EE198C9BC09}"/>
+                <a16:creationId xmlns="" xmlns:a16="http://schemas.microsoft.com/office/drawing/2014/main" id="{58A809C9-4B93-4BC5-9D6E-3EE198C9BC09}"/>
               </a:ext>
             </a:extLst>
           </p:cNvPr>
@@ -3651,7 +3652,7 @@
           <p:cNvPr id="3" name="Subtitle 2">
             <a:extLst>
               <a:ext uri="{FF2B5EF4-FFF2-40B4-BE49-F238E27FC236}">
-                <a16:creationId xmlns:a16="http://schemas.microsoft.com/office/drawing/2014/main" xmlns="" id="{86E98C76-BF7C-4E6D-9666-D506DF1D5B8A}"/>
+                <a16:creationId xmlns="" xmlns:a16="http://schemas.microsoft.com/office/drawing/2014/main" id="{86E98C76-BF7C-4E6D-9666-D506DF1D5B8A}"/>
               </a:ext>
             </a:extLst>
           </p:cNvPr>
@@ -3717,7 +3718,7 @@
           <p:cNvPr id="7" name="Title 6">
             <a:extLst>
               <a:ext uri="{FF2B5EF4-FFF2-40B4-BE49-F238E27FC236}">
-                <a16:creationId xmlns:a16="http://schemas.microsoft.com/office/drawing/2014/main" xmlns="" id="{73B810CF-8B65-40F1-A50C-4AEABE85B5E5}"/>
+                <a16:creationId xmlns="" xmlns:a16="http://schemas.microsoft.com/office/drawing/2014/main" id="{73B810CF-8B65-40F1-A50C-4AEABE85B5E5}"/>
               </a:ext>
             </a:extLst>
           </p:cNvPr>
@@ -3748,7 +3749,7 @@
           <p:cNvPr id="12" name="Content Placeholder 11">
             <a:extLst>
               <a:ext uri="{FF2B5EF4-FFF2-40B4-BE49-F238E27FC236}">
-                <a16:creationId xmlns:a16="http://schemas.microsoft.com/office/drawing/2014/main" xmlns="" id="{46AFF02A-4A3F-46A9-AA85-C205489ED0A3}"/>
+                <a16:creationId xmlns="" xmlns:a16="http://schemas.microsoft.com/office/drawing/2014/main" id="{46AFF02A-4A3F-46A9-AA85-C205489ED0A3}"/>
               </a:ext>
             </a:extLst>
           </p:cNvPr>
@@ -3777,7 +3778,7 @@
           <p:cNvPr id="18" name="Picture 17">
             <a:extLst>
               <a:ext uri="{FF2B5EF4-FFF2-40B4-BE49-F238E27FC236}">
-                <a16:creationId xmlns:a16="http://schemas.microsoft.com/office/drawing/2014/main" xmlns="" id="{E84A51B2-4D91-4021-8309-6E3EBF6BC3AF}"/>
+                <a16:creationId xmlns="" xmlns:a16="http://schemas.microsoft.com/office/drawing/2014/main" id="{E84A51B2-4D91-4021-8309-6E3EBF6BC3AF}"/>
               </a:ext>
             </a:extLst>
           </p:cNvPr>
@@ -3850,7 +3851,7 @@
           <p:cNvPr id="4" name="Title 3">
             <a:extLst>
               <a:ext uri="{FF2B5EF4-FFF2-40B4-BE49-F238E27FC236}">
-                <a16:creationId xmlns:a16="http://schemas.microsoft.com/office/drawing/2014/main" xmlns="" id="{0A05D06C-6013-4F53-8478-D129844FC8CC}"/>
+                <a16:creationId xmlns="" xmlns:a16="http://schemas.microsoft.com/office/drawing/2014/main" id="{0A05D06C-6013-4F53-8478-D129844FC8CC}"/>
               </a:ext>
             </a:extLst>
           </p:cNvPr>
@@ -3879,7 +3880,7 @@
           <p:cNvPr id="5" name="Content Placeholder 4">
             <a:extLst>
               <a:ext uri="{FF2B5EF4-FFF2-40B4-BE49-F238E27FC236}">
-                <a16:creationId xmlns:a16="http://schemas.microsoft.com/office/drawing/2014/main" xmlns="" id="{D82C205C-D269-41A7-9079-97120B0063B3}"/>
+                <a16:creationId xmlns="" xmlns:a16="http://schemas.microsoft.com/office/drawing/2014/main" id="{D82C205C-D269-41A7-9079-97120B0063B3}"/>
               </a:ext>
             </a:extLst>
           </p:cNvPr>
@@ -3922,7 +3923,7 @@
           <p:cNvPr id="7" name="Picture 6">
             <a:extLst>
               <a:ext uri="{FF2B5EF4-FFF2-40B4-BE49-F238E27FC236}">
-                <a16:creationId xmlns:a16="http://schemas.microsoft.com/office/drawing/2014/main" xmlns="" id="{49B0932E-A655-45F2-9269-67C936BCF00C}"/>
+                <a16:creationId xmlns="" xmlns:a16="http://schemas.microsoft.com/office/drawing/2014/main" id="{49B0932E-A655-45F2-9269-67C936BCF00C}"/>
               </a:ext>
             </a:extLst>
           </p:cNvPr>
@@ -3952,7 +3953,7 @@
           <p:cNvPr id="9" name="Picture 8">
             <a:extLst>
               <a:ext uri="{FF2B5EF4-FFF2-40B4-BE49-F238E27FC236}">
-                <a16:creationId xmlns:a16="http://schemas.microsoft.com/office/drawing/2014/main" xmlns="" id="{F875D6FF-E763-452F-B87F-EECE80E9E15C}"/>
+                <a16:creationId xmlns="" xmlns:a16="http://schemas.microsoft.com/office/drawing/2014/main" id="{F875D6FF-E763-452F-B87F-EECE80E9E15C}"/>
               </a:ext>
             </a:extLst>
           </p:cNvPr>
@@ -4019,7 +4020,7 @@
           <p:cNvPr id="4" name="Title 3">
             <a:extLst>
               <a:ext uri="{FF2B5EF4-FFF2-40B4-BE49-F238E27FC236}">
-                <a16:creationId xmlns:a16="http://schemas.microsoft.com/office/drawing/2014/main" xmlns="" id="{0A05D06C-6013-4F53-8478-D129844FC8CC}"/>
+                <a16:creationId xmlns="" xmlns:a16="http://schemas.microsoft.com/office/drawing/2014/main" id="{0A05D06C-6013-4F53-8478-D129844FC8CC}"/>
               </a:ext>
             </a:extLst>
           </p:cNvPr>
@@ -4048,7 +4049,7 @@
           <p:cNvPr id="5" name="Content Placeholder 4">
             <a:extLst>
               <a:ext uri="{FF2B5EF4-FFF2-40B4-BE49-F238E27FC236}">
-                <a16:creationId xmlns:a16="http://schemas.microsoft.com/office/drawing/2014/main" xmlns="" id="{D82C205C-D269-41A7-9079-97120B0063B3}"/>
+                <a16:creationId xmlns="" xmlns:a16="http://schemas.microsoft.com/office/drawing/2014/main" id="{D82C205C-D269-41A7-9079-97120B0063B3}"/>
               </a:ext>
             </a:extLst>
           </p:cNvPr>
@@ -4084,7 +4085,7 @@
           <p:cNvPr id="6" name="Picture 5">
             <a:extLst>
               <a:ext uri="{FF2B5EF4-FFF2-40B4-BE49-F238E27FC236}">
-                <a16:creationId xmlns:a16="http://schemas.microsoft.com/office/drawing/2014/main" xmlns="" id="{DC953E39-A1E1-4120-BA45-2C7E790EE460}"/>
+                <a16:creationId xmlns="" xmlns:a16="http://schemas.microsoft.com/office/drawing/2014/main" id="{DC953E39-A1E1-4120-BA45-2C7E790EE460}"/>
               </a:ext>
             </a:extLst>
           </p:cNvPr>
@@ -4151,7 +4152,7 @@
           <p:cNvPr id="2" name="Title 1">
             <a:extLst>
               <a:ext uri="{FF2B5EF4-FFF2-40B4-BE49-F238E27FC236}">
-                <a16:creationId xmlns:a16="http://schemas.microsoft.com/office/drawing/2014/main" xmlns="" id="{CCE9F001-422D-41D2-B0B0-44D45D916CA6}"/>
+                <a16:creationId xmlns="" xmlns:a16="http://schemas.microsoft.com/office/drawing/2014/main" id="{CCE9F001-422D-41D2-B0B0-44D45D916CA6}"/>
               </a:ext>
             </a:extLst>
           </p:cNvPr>
@@ -4184,7 +4185,7 @@
           <p:cNvPr id="3" name="Content Placeholder 2">
             <a:extLst>
               <a:ext uri="{FF2B5EF4-FFF2-40B4-BE49-F238E27FC236}">
-                <a16:creationId xmlns:a16="http://schemas.microsoft.com/office/drawing/2014/main" xmlns="" id="{CB15881A-5069-4285-97F3-5453BC930157}"/>
+                <a16:creationId xmlns="" xmlns:a16="http://schemas.microsoft.com/office/drawing/2014/main" id="{CB15881A-5069-4285-97F3-5453BC930157}"/>
               </a:ext>
             </a:extLst>
           </p:cNvPr>
@@ -4235,7 +4236,7 @@
           <p:cNvPr id="5" name="Picture 4">
             <a:extLst>
               <a:ext uri="{FF2B5EF4-FFF2-40B4-BE49-F238E27FC236}">
-                <a16:creationId xmlns:a16="http://schemas.microsoft.com/office/drawing/2014/main" xmlns="" id="{2340FC03-CF5D-4247-998C-49AA412A5808}"/>
+                <a16:creationId xmlns="" xmlns:a16="http://schemas.microsoft.com/office/drawing/2014/main" id="{2340FC03-CF5D-4247-998C-49AA412A5808}"/>
               </a:ext>
             </a:extLst>
           </p:cNvPr>
@@ -4367,7 +4368,7 @@
           <p:cNvPr id="2" name="Title 1">
             <a:extLst>
               <a:ext uri="{FF2B5EF4-FFF2-40B4-BE49-F238E27FC236}">
-                <a16:creationId xmlns:a16="http://schemas.microsoft.com/office/drawing/2014/main" xmlns="" id="{A7586D44-EECA-4316-AFD9-18218DD93FC5}"/>
+                <a16:creationId xmlns="" xmlns:a16="http://schemas.microsoft.com/office/drawing/2014/main" id="{A7586D44-EECA-4316-AFD9-18218DD93FC5}"/>
               </a:ext>
             </a:extLst>
           </p:cNvPr>
@@ -4396,7 +4397,7 @@
           <p:cNvPr id="3" name="Content Placeholder 2">
             <a:extLst>
               <a:ext uri="{FF2B5EF4-FFF2-40B4-BE49-F238E27FC236}">
-                <a16:creationId xmlns:a16="http://schemas.microsoft.com/office/drawing/2014/main" xmlns="" id="{274B9576-886E-4FFB-A78F-8B87E0DBB4C2}"/>
+                <a16:creationId xmlns="" xmlns:a16="http://schemas.microsoft.com/office/drawing/2014/main" id="{274B9576-886E-4FFB-A78F-8B87E0DBB4C2}"/>
               </a:ext>
             </a:extLst>
           </p:cNvPr>
@@ -4581,7 +4582,7 @@
           <p:cNvPr id="2" name="Title 1">
             <a:extLst>
               <a:ext uri="{FF2B5EF4-FFF2-40B4-BE49-F238E27FC236}">
-                <a16:creationId xmlns:a16="http://schemas.microsoft.com/office/drawing/2014/main" xmlns="" id="{62118670-9D33-4A23-AC4C-183474388AAF}"/>
+                <a16:creationId xmlns="" xmlns:a16="http://schemas.microsoft.com/office/drawing/2014/main" id="{62118670-9D33-4A23-AC4C-183474388AAF}"/>
               </a:ext>
             </a:extLst>
           </p:cNvPr>
@@ -4599,11 +4600,7 @@
           <a:p>
             <a:r>
               <a:rPr lang="en-US" dirty="0" smtClean="0"/>
-              <a:t>Query </a:t>
-            </a:r>
-            <a:r>
-              <a:rPr lang="en-US" dirty="0" smtClean="0"/>
-              <a:t>Results on Dashboard</a:t>
+              <a:t>Query Results on Dashboard</a:t>
             </a:r>
             <a:endParaRPr lang="x-none" dirty="0"/>
           </a:p>
@@ -4614,7 +4611,7 @@
           <p:cNvPr id="7" name="Content Placeholder 2">
             <a:extLst>
               <a:ext uri="{FF2B5EF4-FFF2-40B4-BE49-F238E27FC236}">
-                <a16:creationId xmlns:a16="http://schemas.microsoft.com/office/drawing/2014/main" xmlns="" id="{E4DA3F9C-F9DB-4F20-8762-A4E630955EE6}"/>
+                <a16:creationId xmlns="" xmlns:a16="http://schemas.microsoft.com/office/drawing/2014/main" id="{E4DA3F9C-F9DB-4F20-8762-A4E630955EE6}"/>
               </a:ext>
             </a:extLst>
           </p:cNvPr>
@@ -4640,11 +4637,7 @@
             <a:pPr algn="ctr"/>
             <a:r>
               <a:rPr lang="en-US" dirty="0" smtClean="0"/>
-              <a:t>Show any </a:t>
-            </a:r>
-            <a:r>
-              <a:rPr lang="en-US" dirty="0" smtClean="0"/>
-              <a:t>result of a query on a dashboard</a:t>
+              <a:t>Show any result of a query on a dashboard</a:t>
             </a:r>
             <a:r>
               <a:rPr lang="en-US" dirty="0"/>
@@ -4652,11 +4645,7 @@
             </a:r>
             <a:r>
               <a:rPr lang="en-US" dirty="0" smtClean="0"/>
-              <a:t>using any format you can create with the query language</a:t>
-            </a:r>
-            <a:r>
-              <a:rPr lang="en-US" dirty="0" smtClean="0"/>
-              <a:t>:</a:t>
+              <a:t>using any format you can create with the query language:</a:t>
             </a:r>
             <a:endParaRPr lang="x-none" dirty="0"/>
           </a:p>
@@ -5216,7 +5205,7 @@
           <p:cNvPr id="2" name="Title 1">
             <a:extLst>
               <a:ext uri="{FF2B5EF4-FFF2-40B4-BE49-F238E27FC236}">
-                <a16:creationId xmlns:a16="http://schemas.microsoft.com/office/drawing/2014/main" xmlns="" id="{62118670-9D33-4A23-AC4C-183474388AAF}"/>
+                <a16:creationId xmlns="" xmlns:a16="http://schemas.microsoft.com/office/drawing/2014/main" id="{62118670-9D33-4A23-AC4C-183474388AAF}"/>
               </a:ext>
             </a:extLst>
           </p:cNvPr>
@@ -5245,7 +5234,7 @@
           <p:cNvPr id="7" name="Content Placeholder 2">
             <a:extLst>
               <a:ext uri="{FF2B5EF4-FFF2-40B4-BE49-F238E27FC236}">
-                <a16:creationId xmlns:a16="http://schemas.microsoft.com/office/drawing/2014/main" xmlns="" id="{E4DA3F9C-F9DB-4F20-8762-A4E630955EE6}"/>
+                <a16:creationId xmlns="" xmlns:a16="http://schemas.microsoft.com/office/drawing/2014/main" id="{E4DA3F9C-F9DB-4F20-8762-A4E630955EE6}"/>
               </a:ext>
             </a:extLst>
           </p:cNvPr>
@@ -5511,7 +5500,7 @@
           <p:cNvPr id="2" name="Title 1">
             <a:extLst>
               <a:ext uri="{FF2B5EF4-FFF2-40B4-BE49-F238E27FC236}">
-                <a16:creationId xmlns:a16="http://schemas.microsoft.com/office/drawing/2014/main" xmlns="" id="{62118670-9D33-4A23-AC4C-183474388AAF}"/>
+                <a16:creationId xmlns="" xmlns:a16="http://schemas.microsoft.com/office/drawing/2014/main" id="{62118670-9D33-4A23-AC4C-183474388AAF}"/>
               </a:ext>
             </a:extLst>
           </p:cNvPr>
@@ -5529,15 +5518,7 @@
           <a:p>
             <a:r>
               <a:rPr lang="en-US" dirty="0" smtClean="0"/>
-              <a:t>Query </a:t>
-            </a:r>
-            <a:r>
-              <a:rPr lang="en-US" dirty="0" smtClean="0"/>
-              <a:t>Results - </a:t>
-            </a:r>
-            <a:r>
-              <a:rPr lang="en-US" dirty="0" smtClean="0"/>
-              <a:t>Chart Display</a:t>
+              <a:t>Query Results - Chart Display</a:t>
             </a:r>
             <a:endParaRPr lang="x-none" dirty="0"/>
           </a:p>
@@ -6097,7 +6078,7 @@
           <p:cNvPr id="2" name="Title 1">
             <a:extLst>
               <a:ext uri="{FF2B5EF4-FFF2-40B4-BE49-F238E27FC236}">
-                <a16:creationId xmlns:a16="http://schemas.microsoft.com/office/drawing/2014/main" xmlns="" id="{62118670-9D33-4A23-AC4C-183474388AAF}"/>
+                <a16:creationId xmlns="" xmlns:a16="http://schemas.microsoft.com/office/drawing/2014/main" id="{62118670-9D33-4A23-AC4C-183474388AAF}"/>
               </a:ext>
             </a:extLst>
           </p:cNvPr>
@@ -6498,7 +6479,7 @@
           <p:cNvPr id="2" name="Title 1">
             <a:extLst>
               <a:ext uri="{FF2B5EF4-FFF2-40B4-BE49-F238E27FC236}">
-                <a16:creationId xmlns:a16="http://schemas.microsoft.com/office/drawing/2014/main" xmlns="" id="{D2966871-39A6-4CAF-9BAF-98EB2F6D1286}"/>
+                <a16:creationId xmlns="" xmlns:a16="http://schemas.microsoft.com/office/drawing/2014/main" id="{D2966871-39A6-4CAF-9BAF-98EB2F6D1286}"/>
               </a:ext>
             </a:extLst>
           </p:cNvPr>
@@ -6535,7 +6516,7 @@
           <p:cNvPr id="3" name="Content Placeholder 2">
             <a:extLst>
               <a:ext uri="{FF2B5EF4-FFF2-40B4-BE49-F238E27FC236}">
-                <a16:creationId xmlns:a16="http://schemas.microsoft.com/office/drawing/2014/main" xmlns="" id="{9CC308C7-6DFB-4507-A325-8CD2A01E731B}"/>
+                <a16:creationId xmlns="" xmlns:a16="http://schemas.microsoft.com/office/drawing/2014/main" id="{9CC308C7-6DFB-4507-A325-8CD2A01E731B}"/>
               </a:ext>
             </a:extLst>
           </p:cNvPr>
@@ -6892,7 +6873,7 @@
           <p:cNvPr id="2" name="Title 1">
             <a:extLst>
               <a:ext uri="{FF2B5EF4-FFF2-40B4-BE49-F238E27FC236}">
-                <a16:creationId xmlns:a16="http://schemas.microsoft.com/office/drawing/2014/main" xmlns="" id="{640606EA-B052-4986-9E62-6ACA495288FE}"/>
+                <a16:creationId xmlns="" xmlns:a16="http://schemas.microsoft.com/office/drawing/2014/main" id="{640606EA-B052-4986-9E62-6ACA495288FE}"/>
               </a:ext>
             </a:extLst>
           </p:cNvPr>
@@ -6929,7 +6910,7 @@
           <p:cNvPr id="3" name="Content Placeholder 2">
             <a:extLst>
               <a:ext uri="{FF2B5EF4-FFF2-40B4-BE49-F238E27FC236}">
-                <a16:creationId xmlns:a16="http://schemas.microsoft.com/office/drawing/2014/main" xmlns="" id="{BF0741C9-90F7-49E1-9999-3F216DB04D68}"/>
+                <a16:creationId xmlns="" xmlns:a16="http://schemas.microsoft.com/office/drawing/2014/main" id="{BF0741C9-90F7-49E1-9999-3F216DB04D68}"/>
               </a:ext>
             </a:extLst>
           </p:cNvPr>
@@ -7074,7 +7055,7 @@
           <p:cNvPr id="2" name="Title 1">
             <a:extLst>
               <a:ext uri="{FF2B5EF4-FFF2-40B4-BE49-F238E27FC236}">
-                <a16:creationId xmlns:a16="http://schemas.microsoft.com/office/drawing/2014/main" xmlns="" id="{640606EA-B052-4986-9E62-6ACA495288FE}"/>
+                <a16:creationId xmlns="" xmlns:a16="http://schemas.microsoft.com/office/drawing/2014/main" id="{640606EA-B052-4986-9E62-6ACA495288FE}"/>
               </a:ext>
             </a:extLst>
           </p:cNvPr>
@@ -7107,7 +7088,7 @@
           <p:cNvPr id="3" name="Content Placeholder 2">
             <a:extLst>
               <a:ext uri="{FF2B5EF4-FFF2-40B4-BE49-F238E27FC236}">
-                <a16:creationId xmlns:a16="http://schemas.microsoft.com/office/drawing/2014/main" xmlns="" id="{BF0741C9-90F7-49E1-9999-3F216DB04D68}"/>
+                <a16:creationId xmlns="" xmlns:a16="http://schemas.microsoft.com/office/drawing/2014/main" id="{BF0741C9-90F7-49E1-9999-3F216DB04D68}"/>
               </a:ext>
             </a:extLst>
           </p:cNvPr>
@@ -7136,7 +7117,7 @@
           <p:cNvPr id="9" name="Picture 8">
             <a:extLst>
               <a:ext uri="{FF2B5EF4-FFF2-40B4-BE49-F238E27FC236}">
-                <a16:creationId xmlns:a16="http://schemas.microsoft.com/office/drawing/2014/main" xmlns="" id="{EC1EA80E-36ED-462E-AF59-5356E89542BF}"/>
+                <a16:creationId xmlns="" xmlns:a16="http://schemas.microsoft.com/office/drawing/2014/main" id="{EC1EA80E-36ED-462E-AF59-5356E89542BF}"/>
               </a:ext>
             </a:extLst>
           </p:cNvPr>
@@ -7786,7 +7767,7 @@
           <p:cNvPr id="2" name="Title 1">
             <a:extLst>
               <a:ext uri="{FF2B5EF4-FFF2-40B4-BE49-F238E27FC236}">
-                <a16:creationId xmlns:a16="http://schemas.microsoft.com/office/drawing/2014/main" xmlns="" id="{1A48B704-594D-4CE1-8C3B-5EAC7C5F03A6}"/>
+                <a16:creationId xmlns="" xmlns:a16="http://schemas.microsoft.com/office/drawing/2014/main" id="{1A48B704-594D-4CE1-8C3B-5EAC7C5F03A6}"/>
               </a:ext>
             </a:extLst>
           </p:cNvPr>
@@ -7815,7 +7796,7 @@
           <p:cNvPr id="3" name="Content Placeholder 2">
             <a:extLst>
               <a:ext uri="{FF2B5EF4-FFF2-40B4-BE49-F238E27FC236}">
-                <a16:creationId xmlns:a16="http://schemas.microsoft.com/office/drawing/2014/main" xmlns="" id="{8ABB42C9-39CD-487D-9BEE-AFC8655570CB}"/>
+                <a16:creationId xmlns="" xmlns:a16="http://schemas.microsoft.com/office/drawing/2014/main" id="{8ABB42C9-39CD-487D-9BEE-AFC8655570CB}"/>
               </a:ext>
             </a:extLst>
           </p:cNvPr>
@@ -7844,7 +7825,7 @@
           <p:cNvPr id="7" name="Picture 6">
             <a:extLst>
               <a:ext uri="{FF2B5EF4-FFF2-40B4-BE49-F238E27FC236}">
-                <a16:creationId xmlns:a16="http://schemas.microsoft.com/office/drawing/2014/main" xmlns="" id="{1F2C98FB-B744-402A-81F8-C360DDFF2473}"/>
+                <a16:creationId xmlns="" xmlns:a16="http://schemas.microsoft.com/office/drawing/2014/main" id="{1F2C98FB-B744-402A-81F8-C360DDFF2473}"/>
               </a:ext>
             </a:extLst>
           </p:cNvPr>
@@ -7975,7 +7956,7 @@
           <p:cNvPr id="2" name="Title 1">
             <a:extLst>
               <a:ext uri="{FF2B5EF4-FFF2-40B4-BE49-F238E27FC236}">
-                <a16:creationId xmlns:a16="http://schemas.microsoft.com/office/drawing/2014/main" xmlns="" id="{A8BFE8D1-2656-4D55-B23C-7228FA743196}"/>
+                <a16:creationId xmlns="" xmlns:a16="http://schemas.microsoft.com/office/drawing/2014/main" id="{A8BFE8D1-2656-4D55-B23C-7228FA743196}"/>
               </a:ext>
             </a:extLst>
           </p:cNvPr>
@@ -7993,19 +7974,7 @@
           <a:p>
             <a:r>
               <a:rPr lang="en-US" dirty="0" smtClean="0"/>
-              <a:t>Query</a:t>
-            </a:r>
-            <a:r>
-              <a:rPr lang="en-US" dirty="0" smtClean="0"/>
-              <a:t> </a:t>
-            </a:r>
-            <a:r>
-              <a:rPr lang="en-US" dirty="0" smtClean="0"/>
-              <a:t>- </a:t>
-            </a:r>
-            <a:r>
-              <a:rPr lang="en-US" dirty="0" smtClean="0"/>
-              <a:t>Dashboard </a:t>
+              <a:t>Query - Dashboard </a:t>
             </a:r>
             <a:r>
               <a:rPr lang="en-US" dirty="0"/>
@@ -8020,7 +7989,7 @@
           <p:cNvPr id="3" name="Content Placeholder 2">
             <a:extLst>
               <a:ext uri="{FF2B5EF4-FFF2-40B4-BE49-F238E27FC236}">
-                <a16:creationId xmlns:a16="http://schemas.microsoft.com/office/drawing/2014/main" xmlns="" id="{0A425075-3083-4C08-9A0E-A1DE3A4D6342}"/>
+                <a16:creationId xmlns="" xmlns:a16="http://schemas.microsoft.com/office/drawing/2014/main" id="{0A425075-3083-4C08-9A0E-A1DE3A4D6342}"/>
               </a:ext>
             </a:extLst>
           </p:cNvPr>
@@ -8051,7 +8020,7 @@
           <p:cNvPr id="7" name="Picture 6">
             <a:extLst>
               <a:ext uri="{FF2B5EF4-FFF2-40B4-BE49-F238E27FC236}">
-                <a16:creationId xmlns:a16="http://schemas.microsoft.com/office/drawing/2014/main" xmlns="" id="{1F5A427E-4B35-421D-8621-525DBD1FC382}"/>
+                <a16:creationId xmlns="" xmlns:a16="http://schemas.microsoft.com/office/drawing/2014/main" id="{1F5A427E-4B35-421D-8621-525DBD1FC382}"/>
               </a:ext>
             </a:extLst>
           </p:cNvPr>
@@ -8888,12 +8857,12 @@
               <a:t>The query language supports objects and arrays, creating, accessing and </a:t>
             </a:r>
             <a:r>
-              <a:rPr lang="en-US" dirty="0" err="1" smtClean="0"/>
-              <a:t>manupulation</a:t>
-            </a:r>
-            <a:r>
               <a:rPr lang="en-US" dirty="0" smtClean="0"/>
-              <a:t> of the data included in them:</a:t>
+              <a:t>manipulation </a:t>
+            </a:r>
+            <a:r>
+              <a:rPr lang="en-US" dirty="0" smtClean="0"/>
+              <a:t>of the data included in them:</a:t>
             </a:r>
             <a:endParaRPr lang="de-DE" dirty="0"/>
           </a:p>
@@ -9031,6 +9000,223 @@
     <p:extLst>
       <p:ext uri="{BB962C8B-B14F-4D97-AF65-F5344CB8AC3E}">
         <p14:creationId xmlns:p14="http://schemas.microsoft.com/office/powerpoint/2010/main" val="391116196"/>
+      </p:ext>
+    </p:extLst>
+  </p:cSld>
+  <p:clrMapOvr>
+    <a:masterClrMapping/>
+  </p:clrMapOvr>
+  <p:timing>
+    <p:tnLst>
+      <p:par>
+        <p:cTn id="1" dur="indefinite" restart="never" nodeType="tmRoot"/>
+      </p:par>
+    </p:tnLst>
+  </p:timing>
+</p:sld>
+</file>
+
+<file path=ppt/slides/slide33.xml><?xml version="1.0" encoding="utf-8"?>
+<p:sld xmlns:a="http://schemas.openxmlformats.org/drawingml/2006/main" xmlns:r="http://schemas.openxmlformats.org/officeDocument/2006/relationships" xmlns:p="http://schemas.openxmlformats.org/presentationml/2006/main">
+  <p:cSld>
+    <p:spTree>
+      <p:nvGrpSpPr>
+        <p:cNvPr id="1" name=""/>
+        <p:cNvGrpSpPr/>
+        <p:nvPr/>
+      </p:nvGrpSpPr>
+      <p:grpSpPr>
+        <a:xfrm>
+          <a:off x="0" y="0"/>
+          <a:ext cx="0" cy="0"/>
+          <a:chOff x="0" y="0"/>
+          <a:chExt cx="0" cy="0"/>
+        </a:xfrm>
+      </p:grpSpPr>
+      <p:sp>
+        <p:nvSpPr>
+          <p:cNvPr id="2" name="Titel 1"/>
+          <p:cNvSpPr>
+            <a:spLocks noGrp="1"/>
+          </p:cNvSpPr>
+          <p:nvPr>
+            <p:ph type="title"/>
+          </p:nvPr>
+        </p:nvSpPr>
+        <p:spPr/>
+        <p:txBody>
+          <a:bodyPr/>
+          <a:lstStyle/>
+          <a:p>
+            <a:r>
+              <a:rPr lang="en-US" dirty="0" smtClean="0"/>
+              <a:t>Query – </a:t>
+            </a:r>
+            <a:r>
+              <a:rPr lang="en-US" dirty="0" smtClean="0"/>
+              <a:t>Multi Chart and Chart Details</a:t>
+            </a:r>
+            <a:endParaRPr lang="de-DE" dirty="0"/>
+          </a:p>
+        </p:txBody>
+      </p:sp>
+      <p:sp>
+        <p:nvSpPr>
+          <p:cNvPr id="3" name="Inhaltsplatzhalter 2"/>
+          <p:cNvSpPr>
+            <a:spLocks noGrp="1"/>
+          </p:cNvSpPr>
+          <p:nvPr>
+            <p:ph idx="1"/>
+          </p:nvPr>
+        </p:nvSpPr>
+        <p:spPr/>
+        <p:txBody>
+          <a:bodyPr>
+            <a:normAutofit fontScale="92500" lnSpcReduction="10000"/>
+          </a:bodyPr>
+          <a:lstStyle/>
+          <a:p>
+            <a:r>
+              <a:rPr lang="en-US" dirty="0" smtClean="0"/>
+              <a:t>Use the multi chart options and details options to render multiple data series separately with a simple setup:</a:t>
+            </a:r>
+            <a:endParaRPr lang="de-DE" dirty="0"/>
+          </a:p>
+        </p:txBody>
+      </p:sp>
+      <p:pic>
+        <p:nvPicPr>
+          <p:cNvPr id="1027" name="Picture 3"/>
+          <p:cNvPicPr>
+            <a:picLocks noChangeAspect="1" noChangeArrowheads="1"/>
+          </p:cNvPicPr>
+          <p:nvPr/>
+        </p:nvPicPr>
+        <p:blipFill>
+          <a:blip r:embed="rId2">
+            <a:extLst>
+              <a:ext uri="{28A0092B-C50C-407E-A947-70E740481C1C}">
+                <a14:useLocalDpi xmlns:a14="http://schemas.microsoft.com/office/drawing/2010/main" val="0"/>
+              </a:ext>
+            </a:extLst>
+          </a:blip>
+          <a:srcRect/>
+          <a:stretch>
+            <a:fillRect/>
+          </a:stretch>
+        </p:blipFill>
+        <p:spPr bwMode="auto">
+          <a:xfrm>
+            <a:off x="4487453" y="2142522"/>
+            <a:ext cx="7204562" cy="4466622"/>
+          </a:xfrm>
+          <a:prstGeom prst="rect">
+            <a:avLst/>
+          </a:prstGeom>
+          <a:noFill/>
+          <a:ln>
+            <a:noFill/>
+          </a:ln>
+          <a:effectLst/>
+          <a:extLst>
+            <a:ext uri="{909E8E84-426E-40DD-AFC4-6F175D3DCCD1}">
+              <a14:hiddenFill xmlns:a14="http://schemas.microsoft.com/office/drawing/2010/main">
+                <a:solidFill>
+                  <a:schemeClr val="accent1"/>
+                </a:solidFill>
+              </a14:hiddenFill>
+            </a:ext>
+            <a:ext uri="{91240B29-F687-4F45-9708-019B960494DF}">
+              <a14:hiddenLine xmlns:a14="http://schemas.microsoft.com/office/drawing/2010/main" w="9525">
+                <a:solidFill>
+                  <a:schemeClr val="tx1"/>
+                </a:solidFill>
+                <a:miter lim="800000"/>
+                <a:headEnd/>
+                <a:tailEnd/>
+              </a14:hiddenLine>
+            </a:ext>
+            <a:ext uri="{AF507438-7753-43E0-B8FC-AC1667EBCBE1}">
+              <a14:hiddenEffects xmlns:a14="http://schemas.microsoft.com/office/drawing/2010/main">
+                <a:effectLst>
+                  <a:outerShdw dist="35921" dir="2700000" algn="ctr" rotWithShape="0">
+                    <a:schemeClr val="bg2"/>
+                  </a:outerShdw>
+                </a:effectLst>
+              </a14:hiddenEffects>
+            </a:ext>
+          </a:extLst>
+        </p:spPr>
+      </p:pic>
+      <p:pic>
+        <p:nvPicPr>
+          <p:cNvPr id="1028" name="Picture 4"/>
+          <p:cNvPicPr>
+            <a:picLocks noChangeAspect="1" noChangeArrowheads="1"/>
+          </p:cNvPicPr>
+          <p:nvPr/>
+        </p:nvPicPr>
+        <p:blipFill>
+          <a:blip r:embed="rId3">
+            <a:extLst>
+              <a:ext uri="{28A0092B-C50C-407E-A947-70E740481C1C}">
+                <a14:useLocalDpi xmlns:a14="http://schemas.microsoft.com/office/drawing/2010/main" val="0"/>
+              </a:ext>
+            </a:extLst>
+          </a:blip>
+          <a:srcRect/>
+          <a:stretch>
+            <a:fillRect/>
+          </a:stretch>
+        </p:blipFill>
+        <p:spPr bwMode="auto">
+          <a:xfrm>
+            <a:off x="353424" y="2192919"/>
+            <a:ext cx="3819525" cy="4381500"/>
+          </a:xfrm>
+          <a:prstGeom prst="rect">
+            <a:avLst/>
+          </a:prstGeom>
+          <a:noFill/>
+          <a:ln>
+            <a:noFill/>
+          </a:ln>
+          <a:effectLst/>
+          <a:extLst>
+            <a:ext uri="{909E8E84-426E-40DD-AFC4-6F175D3DCCD1}">
+              <a14:hiddenFill xmlns:a14="http://schemas.microsoft.com/office/drawing/2010/main">
+                <a:solidFill>
+                  <a:schemeClr val="accent1"/>
+                </a:solidFill>
+              </a14:hiddenFill>
+            </a:ext>
+            <a:ext uri="{91240B29-F687-4F45-9708-019B960494DF}">
+              <a14:hiddenLine xmlns:a14="http://schemas.microsoft.com/office/drawing/2010/main" w="9525">
+                <a:solidFill>
+                  <a:schemeClr val="tx1"/>
+                </a:solidFill>
+                <a:miter lim="800000"/>
+                <a:headEnd/>
+                <a:tailEnd/>
+              </a14:hiddenLine>
+            </a:ext>
+            <a:ext uri="{AF507438-7753-43E0-B8FC-AC1667EBCBE1}">
+              <a14:hiddenEffects xmlns:a14="http://schemas.microsoft.com/office/drawing/2010/main">
+                <a:effectLst>
+                  <a:outerShdw dist="35921" dir="2700000" algn="ctr" rotWithShape="0">
+                    <a:schemeClr val="bg2"/>
+                  </a:outerShdw>
+                </a:effectLst>
+              </a14:hiddenEffects>
+            </a:ext>
+          </a:extLst>
+        </p:spPr>
+      </p:pic>
+    </p:spTree>
+    <p:extLst>
+      <p:ext uri="{BB962C8B-B14F-4D97-AF65-F5344CB8AC3E}">
+        <p14:creationId xmlns:p14="http://schemas.microsoft.com/office/powerpoint/2010/main" val="3926414067"/>
       </p:ext>
     </p:extLst>
   </p:cSld>
@@ -9069,7 +9255,7 @@
           <p:cNvPr id="2" name="Title 1">
             <a:extLst>
               <a:ext uri="{FF2B5EF4-FFF2-40B4-BE49-F238E27FC236}">
-                <a16:creationId xmlns:a16="http://schemas.microsoft.com/office/drawing/2014/main" xmlns="" id="{CDCDEA46-AB36-471C-8BC0-E2849C41986F}"/>
+                <a16:creationId xmlns="" xmlns:a16="http://schemas.microsoft.com/office/drawing/2014/main" id="{CDCDEA46-AB36-471C-8BC0-E2849C41986F}"/>
               </a:ext>
             </a:extLst>
           </p:cNvPr>
@@ -9098,7 +9284,7 @@
           <p:cNvPr id="5" name="Picture 4">
             <a:extLst>
               <a:ext uri="{FF2B5EF4-FFF2-40B4-BE49-F238E27FC236}">
-                <a16:creationId xmlns:a16="http://schemas.microsoft.com/office/drawing/2014/main" xmlns="" id="{FB790BAE-2EAA-4426-8E94-CA35B3AA924A}"/>
+                <a16:creationId xmlns="" xmlns:a16="http://schemas.microsoft.com/office/drawing/2014/main" id="{FB790BAE-2EAA-4426-8E94-CA35B3AA924A}"/>
               </a:ext>
             </a:extLst>
           </p:cNvPr>
@@ -9230,7 +9416,7 @@
           <p:cNvPr id="2" name="Title 1">
             <a:extLst>
               <a:ext uri="{FF2B5EF4-FFF2-40B4-BE49-F238E27FC236}">
-                <a16:creationId xmlns:a16="http://schemas.microsoft.com/office/drawing/2014/main" xmlns="" id="{F208E1EB-D1EA-49C6-A87D-807F9EF8B59B}"/>
+                <a16:creationId xmlns="" xmlns:a16="http://schemas.microsoft.com/office/drawing/2014/main" id="{F208E1EB-D1EA-49C6-A87D-807F9EF8B59B}"/>
               </a:ext>
             </a:extLst>
           </p:cNvPr>
@@ -9259,7 +9445,7 @@
           <p:cNvPr id="5" name="Picture 4">
             <a:extLst>
               <a:ext uri="{FF2B5EF4-FFF2-40B4-BE49-F238E27FC236}">
-                <a16:creationId xmlns:a16="http://schemas.microsoft.com/office/drawing/2014/main" xmlns="" id="{2457B652-73B7-45B0-874C-963B358D59FA}"/>
+                <a16:creationId xmlns="" xmlns:a16="http://schemas.microsoft.com/office/drawing/2014/main" id="{2457B652-73B7-45B0-874C-963B358D59FA}"/>
               </a:ext>
             </a:extLst>
           </p:cNvPr>
@@ -9326,7 +9512,7 @@
           <p:cNvPr id="2" name="Title 1">
             <a:extLst>
               <a:ext uri="{FF2B5EF4-FFF2-40B4-BE49-F238E27FC236}">
-                <a16:creationId xmlns:a16="http://schemas.microsoft.com/office/drawing/2014/main" xmlns="" id="{DF1C355E-D737-4D59-8170-3869785DCA0C}"/>
+                <a16:creationId xmlns="" xmlns:a16="http://schemas.microsoft.com/office/drawing/2014/main" id="{DF1C355E-D737-4D59-8170-3869785DCA0C}"/>
               </a:ext>
             </a:extLst>
           </p:cNvPr>
@@ -9355,7 +9541,7 @@
           <p:cNvPr id="3" name="Content Placeholder 2">
             <a:extLst>
               <a:ext uri="{FF2B5EF4-FFF2-40B4-BE49-F238E27FC236}">
-                <a16:creationId xmlns:a16="http://schemas.microsoft.com/office/drawing/2014/main" xmlns="" id="{6A872884-D8FA-473F-BA4D-48DF02AD3431}"/>
+                <a16:creationId xmlns="" xmlns:a16="http://schemas.microsoft.com/office/drawing/2014/main" id="{6A872884-D8FA-473F-BA4D-48DF02AD3431}"/>
               </a:ext>
             </a:extLst>
           </p:cNvPr>
@@ -9423,7 +9609,7 @@
           <p:cNvPr id="5" name="Picture 4">
             <a:extLst>
               <a:ext uri="{FF2B5EF4-FFF2-40B4-BE49-F238E27FC236}">
-                <a16:creationId xmlns:a16="http://schemas.microsoft.com/office/drawing/2014/main" xmlns="" id="{6661E8F4-3000-4F5D-9315-C3E1003B6820}"/>
+                <a16:creationId xmlns="" xmlns:a16="http://schemas.microsoft.com/office/drawing/2014/main" id="{6661E8F4-3000-4F5D-9315-C3E1003B6820}"/>
               </a:ext>
             </a:extLst>
           </p:cNvPr>
@@ -9490,7 +9676,7 @@
           <p:cNvPr id="2" name="Title 1">
             <a:extLst>
               <a:ext uri="{FF2B5EF4-FFF2-40B4-BE49-F238E27FC236}">
-                <a16:creationId xmlns:a16="http://schemas.microsoft.com/office/drawing/2014/main" xmlns="" id="{1B5E51F3-A5F3-4C93-AA3F-38F4818C0DFE}"/>
+                <a16:creationId xmlns="" xmlns:a16="http://schemas.microsoft.com/office/drawing/2014/main" id="{1B5E51F3-A5F3-4C93-AA3F-38F4818C0DFE}"/>
               </a:ext>
             </a:extLst>
           </p:cNvPr>
@@ -9523,7 +9709,7 @@
           <p:cNvPr id="5" name="Content Placeholder 4">
             <a:extLst>
               <a:ext uri="{FF2B5EF4-FFF2-40B4-BE49-F238E27FC236}">
-                <a16:creationId xmlns:a16="http://schemas.microsoft.com/office/drawing/2014/main" xmlns="" id="{9455BA79-08DE-44E8-8A22-40E4D835AAD7}"/>
+                <a16:creationId xmlns="" xmlns:a16="http://schemas.microsoft.com/office/drawing/2014/main" id="{9455BA79-08DE-44E8-8A22-40E4D835AAD7}"/>
               </a:ext>
             </a:extLst>
           </p:cNvPr>
@@ -9634,7 +9820,7 @@
           <p:cNvPr id="8" name="Content Placeholder 4">
             <a:extLst>
               <a:ext uri="{FF2B5EF4-FFF2-40B4-BE49-F238E27FC236}">
-                <a16:creationId xmlns:a16="http://schemas.microsoft.com/office/drawing/2014/main" xmlns="" id="{9455BA79-08DE-44E8-8A22-40E4D835AAD7}"/>
+                <a16:creationId xmlns="" xmlns:a16="http://schemas.microsoft.com/office/drawing/2014/main" id="{9455BA79-08DE-44E8-8A22-40E4D835AAD7}"/>
               </a:ext>
             </a:extLst>
           </p:cNvPr>
@@ -9939,7 +10125,7 @@
           <p:cNvPr id="11" name="Title 10">
             <a:extLst>
               <a:ext uri="{FF2B5EF4-FFF2-40B4-BE49-F238E27FC236}">
-                <a16:creationId xmlns:a16="http://schemas.microsoft.com/office/drawing/2014/main" xmlns="" id="{30F7E243-F54D-4F7C-845C-0C2C1DBA9D28}"/>
+                <a16:creationId xmlns="" xmlns:a16="http://schemas.microsoft.com/office/drawing/2014/main" id="{30F7E243-F54D-4F7C-845C-0C2C1DBA9D28}"/>
               </a:ext>
             </a:extLst>
           </p:cNvPr>
@@ -9968,7 +10154,7 @@
           <p:cNvPr id="15" name="Picture 14">
             <a:extLst>
               <a:ext uri="{FF2B5EF4-FFF2-40B4-BE49-F238E27FC236}">
-                <a16:creationId xmlns:a16="http://schemas.microsoft.com/office/drawing/2014/main" xmlns="" id="{6C615B85-DB7E-490F-BF09-363517CDBB58}"/>
+                <a16:creationId xmlns="" xmlns:a16="http://schemas.microsoft.com/office/drawing/2014/main" id="{6C615B85-DB7E-490F-BF09-363517CDBB58}"/>
               </a:ext>
             </a:extLst>
           </p:cNvPr>
@@ -10308,7 +10494,7 @@
   <a:extraClrSchemeLst/>
   <a:extLst>
     <a:ext uri="{05A4C25C-085E-4340-85A3-A5531E510DB2}">
-      <thm15:themeFamily xmlns:thm15="http://schemas.microsoft.com/office/thememl/2012/main" xmlns="" name="Office Theme" id="{62F939B6-93AF-4DB8-9C6B-D6C7DFDC589F}" vid="{4A3C46E8-61CC-4603-A589-7422A47A8E4A}"/>
+      <thm15:themeFamily xmlns="" xmlns:thm15="http://schemas.microsoft.com/office/thememl/2012/main" name="Office Theme" id="{62F939B6-93AF-4DB8-9C6B-D6C7DFDC589F}" vid="{4A3C46E8-61CC-4603-A589-7422A47A8E4A}"/>
     </a:ext>
   </a:extLst>
 </a:theme>

</xml_diff>

<commit_message>
Query Widget: Added Alerting Task, Alerting Channels: Added method to add textData
</commit_message>
<xml_diff>
--- a/docs/CFW_Features.pptx
+++ b/docs/CFW_Features.pptx
@@ -25,19 +25,20 @@
     <p:sldId id="285" r:id="rId19"/>
     <p:sldId id="286" r:id="rId20"/>
     <p:sldId id="294" r:id="rId21"/>
-    <p:sldId id="291" r:id="rId22"/>
-    <p:sldId id="279" r:id="rId23"/>
-    <p:sldId id="299" r:id="rId24"/>
-    <p:sldId id="287" r:id="rId25"/>
-    <p:sldId id="300" r:id="rId26"/>
-    <p:sldId id="298" r:id="rId27"/>
-    <p:sldId id="278" r:id="rId28"/>
-    <p:sldId id="281" r:id="rId29"/>
-    <p:sldId id="293" r:id="rId30"/>
-    <p:sldId id="296" r:id="rId31"/>
-    <p:sldId id="295" r:id="rId32"/>
-    <p:sldId id="297" r:id="rId33"/>
-    <p:sldId id="301" r:id="rId34"/>
+    <p:sldId id="302" r:id="rId22"/>
+    <p:sldId id="291" r:id="rId23"/>
+    <p:sldId id="279" r:id="rId24"/>
+    <p:sldId id="299" r:id="rId25"/>
+    <p:sldId id="287" r:id="rId26"/>
+    <p:sldId id="300" r:id="rId27"/>
+    <p:sldId id="298" r:id="rId28"/>
+    <p:sldId id="278" r:id="rId29"/>
+    <p:sldId id="281" r:id="rId30"/>
+    <p:sldId id="293" r:id="rId31"/>
+    <p:sldId id="296" r:id="rId32"/>
+    <p:sldId id="295" r:id="rId33"/>
+    <p:sldId id="297" r:id="rId34"/>
+    <p:sldId id="301" r:id="rId35"/>
   </p:sldIdLst>
   <p:sldSz cx="12192000" cy="6858000"/>
   <p:notesSz cx="6858000" cy="9144000"/>
@@ -138,7 +139,7 @@
   </p:defaultTextStyle>
   <p:extLst>
     <p:ext uri="{EFAFB233-063F-42B5-8137-9DF3F51BA10A}">
-      <p15:sldGuideLst xmlns="" xmlns:p15="http://schemas.microsoft.com/office/powerpoint/2012/main"/>
+      <p15:sldGuideLst xmlns:p15="http://schemas.microsoft.com/office/powerpoint/2012/main" xmlns=""/>
     </p:ext>
   </p:extLst>
 </p:presentation>
@@ -166,7 +167,7 @@
           <p:cNvPr id="2" name="Title 1">
             <a:extLst>
               <a:ext uri="{FF2B5EF4-FFF2-40B4-BE49-F238E27FC236}">
-                <a16:creationId xmlns="" xmlns:a16="http://schemas.microsoft.com/office/drawing/2014/main" id="{00B95F70-03C0-4FFB-8793-F7D6F5551AFE}"/>
+                <a16:creationId xmlns:a16="http://schemas.microsoft.com/office/drawing/2014/main" xmlns="" id="{00B95F70-03C0-4FFB-8793-F7D6F5551AFE}"/>
               </a:ext>
             </a:extLst>
           </p:cNvPr>
@@ -204,7 +205,7 @@
           <p:cNvPr id="3" name="Subtitle 2">
             <a:extLst>
               <a:ext uri="{FF2B5EF4-FFF2-40B4-BE49-F238E27FC236}">
-                <a16:creationId xmlns="" xmlns:a16="http://schemas.microsoft.com/office/drawing/2014/main" id="{B2734A24-4980-419F-9DCC-EF3C91B614D0}"/>
+                <a16:creationId xmlns:a16="http://schemas.microsoft.com/office/drawing/2014/main" xmlns="" id="{B2734A24-4980-419F-9DCC-EF3C91B614D0}"/>
               </a:ext>
             </a:extLst>
           </p:cNvPr>
@@ -275,7 +276,7 @@
           <p:cNvPr id="4" name="Date Placeholder 3">
             <a:extLst>
               <a:ext uri="{FF2B5EF4-FFF2-40B4-BE49-F238E27FC236}">
-                <a16:creationId xmlns="" xmlns:a16="http://schemas.microsoft.com/office/drawing/2014/main" id="{3E853A52-D183-4C0C-AF9C-8CBCDCDD993D}"/>
+                <a16:creationId xmlns:a16="http://schemas.microsoft.com/office/drawing/2014/main" xmlns="" id="{3E853A52-D183-4C0C-AF9C-8CBCDCDD993D}"/>
               </a:ext>
             </a:extLst>
           </p:cNvPr>
@@ -293,7 +294,7 @@
           <a:p>
             <a:fld id="{CAE04C65-539E-4AD4-859E-8B7412D78289}" type="datetimeFigureOut">
               <a:rPr lang="x-none" smtClean="0"/>
-              <a:t>21/07/2023</a:t>
+              <a:t>22/07/2023</a:t>
             </a:fld>
             <a:endParaRPr lang="x-none"/>
           </a:p>
@@ -304,7 +305,7 @@
           <p:cNvPr id="5" name="Footer Placeholder 4">
             <a:extLst>
               <a:ext uri="{FF2B5EF4-FFF2-40B4-BE49-F238E27FC236}">
-                <a16:creationId xmlns="" xmlns:a16="http://schemas.microsoft.com/office/drawing/2014/main" id="{F7BFF61B-7605-451A-90D7-7D5BBCEB49B8}"/>
+                <a16:creationId xmlns:a16="http://schemas.microsoft.com/office/drawing/2014/main" xmlns="" id="{F7BFF61B-7605-451A-90D7-7D5BBCEB49B8}"/>
               </a:ext>
             </a:extLst>
           </p:cNvPr>
@@ -329,7 +330,7 @@
           <p:cNvPr id="6" name="Slide Number Placeholder 5">
             <a:extLst>
               <a:ext uri="{FF2B5EF4-FFF2-40B4-BE49-F238E27FC236}">
-                <a16:creationId xmlns="" xmlns:a16="http://schemas.microsoft.com/office/drawing/2014/main" id="{5CC0DA70-08A2-486F-B9EE-95F97EE8417C}"/>
+                <a16:creationId xmlns:a16="http://schemas.microsoft.com/office/drawing/2014/main" xmlns="" id="{5CC0DA70-08A2-486F-B9EE-95F97EE8417C}"/>
               </a:ext>
             </a:extLst>
           </p:cNvPr>
@@ -388,7 +389,7 @@
           <p:cNvPr id="2" name="Title 1">
             <a:extLst>
               <a:ext uri="{FF2B5EF4-FFF2-40B4-BE49-F238E27FC236}">
-                <a16:creationId xmlns="" xmlns:a16="http://schemas.microsoft.com/office/drawing/2014/main" id="{64802038-B57B-4E5E-90FE-7F10286B5600}"/>
+                <a16:creationId xmlns:a16="http://schemas.microsoft.com/office/drawing/2014/main" xmlns="" id="{64802038-B57B-4E5E-90FE-7F10286B5600}"/>
               </a:ext>
             </a:extLst>
           </p:cNvPr>
@@ -426,7 +427,7 @@
           <p:cNvPr id="3" name="Picture Placeholder 2">
             <a:extLst>
               <a:ext uri="{FF2B5EF4-FFF2-40B4-BE49-F238E27FC236}">
-                <a16:creationId xmlns="" xmlns:a16="http://schemas.microsoft.com/office/drawing/2014/main" id="{08554BB7-F0A0-4396-BACB-54DA9F304612}"/>
+                <a16:creationId xmlns:a16="http://schemas.microsoft.com/office/drawing/2014/main" xmlns="" id="{08554BB7-F0A0-4396-BACB-54DA9F304612}"/>
               </a:ext>
             </a:extLst>
           </p:cNvPr>
@@ -493,7 +494,7 @@
           <p:cNvPr id="4" name="Text Placeholder 3">
             <a:extLst>
               <a:ext uri="{FF2B5EF4-FFF2-40B4-BE49-F238E27FC236}">
-                <a16:creationId xmlns="" xmlns:a16="http://schemas.microsoft.com/office/drawing/2014/main" id="{401A17FF-E591-4806-8EF8-735215AE0E3F}"/>
+                <a16:creationId xmlns:a16="http://schemas.microsoft.com/office/drawing/2014/main" xmlns="" id="{401A17FF-E591-4806-8EF8-735215AE0E3F}"/>
               </a:ext>
             </a:extLst>
           </p:cNvPr>
@@ -564,7 +565,7 @@
           <p:cNvPr id="5" name="Date Placeholder 4">
             <a:extLst>
               <a:ext uri="{FF2B5EF4-FFF2-40B4-BE49-F238E27FC236}">
-                <a16:creationId xmlns="" xmlns:a16="http://schemas.microsoft.com/office/drawing/2014/main" id="{090D2BFE-2655-4DA3-9CBD-07FBE562E4D8}"/>
+                <a16:creationId xmlns:a16="http://schemas.microsoft.com/office/drawing/2014/main" xmlns="" id="{090D2BFE-2655-4DA3-9CBD-07FBE562E4D8}"/>
               </a:ext>
             </a:extLst>
           </p:cNvPr>
@@ -582,7 +583,7 @@
           <a:p>
             <a:fld id="{CAE04C65-539E-4AD4-859E-8B7412D78289}" type="datetimeFigureOut">
               <a:rPr lang="x-none" smtClean="0"/>
-              <a:t>21/07/2023</a:t>
+              <a:t>22/07/2023</a:t>
             </a:fld>
             <a:endParaRPr lang="x-none"/>
           </a:p>
@@ -593,7 +594,7 @@
           <p:cNvPr id="6" name="Footer Placeholder 5">
             <a:extLst>
               <a:ext uri="{FF2B5EF4-FFF2-40B4-BE49-F238E27FC236}">
-                <a16:creationId xmlns="" xmlns:a16="http://schemas.microsoft.com/office/drawing/2014/main" id="{13BEECB8-6D65-4094-AC1A-C992C25A19E3}"/>
+                <a16:creationId xmlns:a16="http://schemas.microsoft.com/office/drawing/2014/main" xmlns="" id="{13BEECB8-6D65-4094-AC1A-C992C25A19E3}"/>
               </a:ext>
             </a:extLst>
           </p:cNvPr>
@@ -618,7 +619,7 @@
           <p:cNvPr id="7" name="Slide Number Placeholder 6">
             <a:extLst>
               <a:ext uri="{FF2B5EF4-FFF2-40B4-BE49-F238E27FC236}">
-                <a16:creationId xmlns="" xmlns:a16="http://schemas.microsoft.com/office/drawing/2014/main" id="{8DFF4C0F-BF7E-488F-A4B4-696F76B353EA}"/>
+                <a16:creationId xmlns:a16="http://schemas.microsoft.com/office/drawing/2014/main" xmlns="" id="{8DFF4C0F-BF7E-488F-A4B4-696F76B353EA}"/>
               </a:ext>
             </a:extLst>
           </p:cNvPr>
@@ -677,7 +678,7 @@
           <p:cNvPr id="2" name="Title 1">
             <a:extLst>
               <a:ext uri="{FF2B5EF4-FFF2-40B4-BE49-F238E27FC236}">
-                <a16:creationId xmlns="" xmlns:a16="http://schemas.microsoft.com/office/drawing/2014/main" id="{AFB6792A-F38B-4F2C-ADBC-1C15014B5D5C}"/>
+                <a16:creationId xmlns:a16="http://schemas.microsoft.com/office/drawing/2014/main" xmlns="" id="{AFB6792A-F38B-4F2C-ADBC-1C15014B5D5C}"/>
               </a:ext>
             </a:extLst>
           </p:cNvPr>
@@ -715,7 +716,7 @@
           <p:cNvPr id="3" name="Vertical Text Placeholder 2">
             <a:extLst>
               <a:ext uri="{FF2B5EF4-FFF2-40B4-BE49-F238E27FC236}">
-                <a16:creationId xmlns="" xmlns:a16="http://schemas.microsoft.com/office/drawing/2014/main" id="{F2A99952-591F-418A-B108-6EC6B6968419}"/>
+                <a16:creationId xmlns:a16="http://schemas.microsoft.com/office/drawing/2014/main" xmlns="" id="{F2A99952-591F-418A-B108-6EC6B6968419}"/>
               </a:ext>
             </a:extLst>
           </p:cNvPr>
@@ -773,7 +774,7 @@
           <p:cNvPr id="4" name="Date Placeholder 3">
             <a:extLst>
               <a:ext uri="{FF2B5EF4-FFF2-40B4-BE49-F238E27FC236}">
-                <a16:creationId xmlns="" xmlns:a16="http://schemas.microsoft.com/office/drawing/2014/main" id="{3D36D347-D3C8-448D-847D-015AC3FA1F2A}"/>
+                <a16:creationId xmlns:a16="http://schemas.microsoft.com/office/drawing/2014/main" xmlns="" id="{3D36D347-D3C8-448D-847D-015AC3FA1F2A}"/>
               </a:ext>
             </a:extLst>
           </p:cNvPr>
@@ -791,7 +792,7 @@
           <a:p>
             <a:fld id="{CAE04C65-539E-4AD4-859E-8B7412D78289}" type="datetimeFigureOut">
               <a:rPr lang="x-none" smtClean="0"/>
-              <a:t>21/07/2023</a:t>
+              <a:t>22/07/2023</a:t>
             </a:fld>
             <a:endParaRPr lang="x-none"/>
           </a:p>
@@ -802,7 +803,7 @@
           <p:cNvPr id="5" name="Footer Placeholder 4">
             <a:extLst>
               <a:ext uri="{FF2B5EF4-FFF2-40B4-BE49-F238E27FC236}">
-                <a16:creationId xmlns="" xmlns:a16="http://schemas.microsoft.com/office/drawing/2014/main" id="{99E80698-EA0D-43B5-9E68-9C256E5BD8B6}"/>
+                <a16:creationId xmlns:a16="http://schemas.microsoft.com/office/drawing/2014/main" xmlns="" id="{99E80698-EA0D-43B5-9E68-9C256E5BD8B6}"/>
               </a:ext>
             </a:extLst>
           </p:cNvPr>
@@ -827,7 +828,7 @@
           <p:cNvPr id="6" name="Slide Number Placeholder 5">
             <a:extLst>
               <a:ext uri="{FF2B5EF4-FFF2-40B4-BE49-F238E27FC236}">
-                <a16:creationId xmlns="" xmlns:a16="http://schemas.microsoft.com/office/drawing/2014/main" id="{1C7C721B-CEB8-44BA-A33B-0999425FF8CB}"/>
+                <a16:creationId xmlns:a16="http://schemas.microsoft.com/office/drawing/2014/main" xmlns="" id="{1C7C721B-CEB8-44BA-A33B-0999425FF8CB}"/>
               </a:ext>
             </a:extLst>
           </p:cNvPr>
@@ -886,7 +887,7 @@
           <p:cNvPr id="2" name="Vertical Title 1">
             <a:extLst>
               <a:ext uri="{FF2B5EF4-FFF2-40B4-BE49-F238E27FC236}">
-                <a16:creationId xmlns="" xmlns:a16="http://schemas.microsoft.com/office/drawing/2014/main" id="{500B0A6C-F906-4F5E-AADC-643EEFC80DEB}"/>
+                <a16:creationId xmlns:a16="http://schemas.microsoft.com/office/drawing/2014/main" xmlns="" id="{500B0A6C-F906-4F5E-AADC-643EEFC80DEB}"/>
               </a:ext>
             </a:extLst>
           </p:cNvPr>
@@ -920,7 +921,7 @@
           <p:cNvPr id="3" name="Vertical Text Placeholder 2">
             <a:extLst>
               <a:ext uri="{FF2B5EF4-FFF2-40B4-BE49-F238E27FC236}">
-                <a16:creationId xmlns="" xmlns:a16="http://schemas.microsoft.com/office/drawing/2014/main" id="{29CC0E59-041B-4D67-B633-405BC9AD35A2}"/>
+                <a16:creationId xmlns:a16="http://schemas.microsoft.com/office/drawing/2014/main" xmlns="" id="{29CC0E59-041B-4D67-B633-405BC9AD35A2}"/>
               </a:ext>
             </a:extLst>
           </p:cNvPr>
@@ -983,7 +984,7 @@
           <p:cNvPr id="4" name="Date Placeholder 3">
             <a:extLst>
               <a:ext uri="{FF2B5EF4-FFF2-40B4-BE49-F238E27FC236}">
-                <a16:creationId xmlns="" xmlns:a16="http://schemas.microsoft.com/office/drawing/2014/main" id="{7C66094C-1E6B-4D24-94B7-DB85355ED520}"/>
+                <a16:creationId xmlns:a16="http://schemas.microsoft.com/office/drawing/2014/main" xmlns="" id="{7C66094C-1E6B-4D24-94B7-DB85355ED520}"/>
               </a:ext>
             </a:extLst>
           </p:cNvPr>
@@ -1001,7 +1002,7 @@
           <a:p>
             <a:fld id="{CAE04C65-539E-4AD4-859E-8B7412D78289}" type="datetimeFigureOut">
               <a:rPr lang="x-none" smtClean="0"/>
-              <a:t>21/07/2023</a:t>
+              <a:t>22/07/2023</a:t>
             </a:fld>
             <a:endParaRPr lang="x-none"/>
           </a:p>
@@ -1012,7 +1013,7 @@
           <p:cNvPr id="5" name="Footer Placeholder 4">
             <a:extLst>
               <a:ext uri="{FF2B5EF4-FFF2-40B4-BE49-F238E27FC236}">
-                <a16:creationId xmlns="" xmlns:a16="http://schemas.microsoft.com/office/drawing/2014/main" id="{A58C9311-2138-4B0E-9939-26AC61D07969}"/>
+                <a16:creationId xmlns:a16="http://schemas.microsoft.com/office/drawing/2014/main" xmlns="" id="{A58C9311-2138-4B0E-9939-26AC61D07969}"/>
               </a:ext>
             </a:extLst>
           </p:cNvPr>
@@ -1037,7 +1038,7 @@
           <p:cNvPr id="6" name="Slide Number Placeholder 5">
             <a:extLst>
               <a:ext uri="{FF2B5EF4-FFF2-40B4-BE49-F238E27FC236}">
-                <a16:creationId xmlns="" xmlns:a16="http://schemas.microsoft.com/office/drawing/2014/main" id="{C33BE1DF-F537-4836-A12B-24449608FC5F}"/>
+                <a16:creationId xmlns:a16="http://schemas.microsoft.com/office/drawing/2014/main" xmlns="" id="{C33BE1DF-F537-4836-A12B-24449608FC5F}"/>
               </a:ext>
             </a:extLst>
           </p:cNvPr>
@@ -1096,7 +1097,7 @@
           <p:cNvPr id="2" name="Title 1">
             <a:extLst>
               <a:ext uri="{FF2B5EF4-FFF2-40B4-BE49-F238E27FC236}">
-                <a16:creationId xmlns="" xmlns:a16="http://schemas.microsoft.com/office/drawing/2014/main" id="{721241B2-0D86-430D-B41B-D8E905A0226B}"/>
+                <a16:creationId xmlns:a16="http://schemas.microsoft.com/office/drawing/2014/main" xmlns="" id="{721241B2-0D86-430D-B41B-D8E905A0226B}"/>
               </a:ext>
             </a:extLst>
           </p:cNvPr>
@@ -1134,7 +1135,7 @@
           <p:cNvPr id="3" name="Content Placeholder 2">
             <a:extLst>
               <a:ext uri="{FF2B5EF4-FFF2-40B4-BE49-F238E27FC236}">
-                <a16:creationId xmlns="" xmlns:a16="http://schemas.microsoft.com/office/drawing/2014/main" id="{5B8D9E8E-BCFE-476B-9C3E-D795BDF1FD75}"/>
+                <a16:creationId xmlns:a16="http://schemas.microsoft.com/office/drawing/2014/main" xmlns="" id="{5B8D9E8E-BCFE-476B-9C3E-D795BDF1FD75}"/>
               </a:ext>
             </a:extLst>
           </p:cNvPr>
@@ -1197,7 +1198,7 @@
           <p:cNvPr id="4" name="Date Placeholder 3">
             <a:extLst>
               <a:ext uri="{FF2B5EF4-FFF2-40B4-BE49-F238E27FC236}">
-                <a16:creationId xmlns="" xmlns:a16="http://schemas.microsoft.com/office/drawing/2014/main" id="{397D097D-F058-404A-9054-FA12C51573F2}"/>
+                <a16:creationId xmlns:a16="http://schemas.microsoft.com/office/drawing/2014/main" xmlns="" id="{397D097D-F058-404A-9054-FA12C51573F2}"/>
               </a:ext>
             </a:extLst>
           </p:cNvPr>
@@ -1215,7 +1216,7 @@
           <a:p>
             <a:fld id="{CAE04C65-539E-4AD4-859E-8B7412D78289}" type="datetimeFigureOut">
               <a:rPr lang="x-none" smtClean="0"/>
-              <a:t>21/07/2023</a:t>
+              <a:t>22/07/2023</a:t>
             </a:fld>
             <a:endParaRPr lang="x-none"/>
           </a:p>
@@ -1226,7 +1227,7 @@
           <p:cNvPr id="5" name="Footer Placeholder 4">
             <a:extLst>
               <a:ext uri="{FF2B5EF4-FFF2-40B4-BE49-F238E27FC236}">
-                <a16:creationId xmlns="" xmlns:a16="http://schemas.microsoft.com/office/drawing/2014/main" id="{A4A3C1B6-62FF-4D39-B1B7-80ED1EEB8500}"/>
+                <a16:creationId xmlns:a16="http://schemas.microsoft.com/office/drawing/2014/main" xmlns="" id="{A4A3C1B6-62FF-4D39-B1B7-80ED1EEB8500}"/>
               </a:ext>
             </a:extLst>
           </p:cNvPr>
@@ -1251,7 +1252,7 @@
           <p:cNvPr id="6" name="Slide Number Placeholder 5">
             <a:extLst>
               <a:ext uri="{FF2B5EF4-FFF2-40B4-BE49-F238E27FC236}">
-                <a16:creationId xmlns="" xmlns:a16="http://schemas.microsoft.com/office/drawing/2014/main" id="{3AE1DEF8-8DD4-429C-8045-43AFFEE4E620}"/>
+                <a16:creationId xmlns:a16="http://schemas.microsoft.com/office/drawing/2014/main" xmlns="" id="{3AE1DEF8-8DD4-429C-8045-43AFFEE4E620}"/>
               </a:ext>
             </a:extLst>
           </p:cNvPr>
@@ -1310,7 +1311,7 @@
           <p:cNvPr id="2" name="Title 1">
             <a:extLst>
               <a:ext uri="{FF2B5EF4-FFF2-40B4-BE49-F238E27FC236}">
-                <a16:creationId xmlns="" xmlns:a16="http://schemas.microsoft.com/office/drawing/2014/main" id="{721241B2-0D86-430D-B41B-D8E905A0226B}"/>
+                <a16:creationId xmlns:a16="http://schemas.microsoft.com/office/drawing/2014/main" xmlns="" id="{721241B2-0D86-430D-B41B-D8E905A0226B}"/>
               </a:ext>
             </a:extLst>
           </p:cNvPr>
@@ -1348,7 +1349,7 @@
           <p:cNvPr id="3" name="Content Placeholder 2">
             <a:extLst>
               <a:ext uri="{FF2B5EF4-FFF2-40B4-BE49-F238E27FC236}">
-                <a16:creationId xmlns="" xmlns:a16="http://schemas.microsoft.com/office/drawing/2014/main" id="{5B8D9E8E-BCFE-476B-9C3E-D795BDF1FD75}"/>
+                <a16:creationId xmlns:a16="http://schemas.microsoft.com/office/drawing/2014/main" xmlns="" id="{5B8D9E8E-BCFE-476B-9C3E-D795BDF1FD75}"/>
               </a:ext>
             </a:extLst>
           </p:cNvPr>
@@ -1387,7 +1388,7 @@
           <p:cNvPr id="4" name="Date Placeholder 3">
             <a:extLst>
               <a:ext uri="{FF2B5EF4-FFF2-40B4-BE49-F238E27FC236}">
-                <a16:creationId xmlns="" xmlns:a16="http://schemas.microsoft.com/office/drawing/2014/main" id="{397D097D-F058-404A-9054-FA12C51573F2}"/>
+                <a16:creationId xmlns:a16="http://schemas.microsoft.com/office/drawing/2014/main" xmlns="" id="{397D097D-F058-404A-9054-FA12C51573F2}"/>
               </a:ext>
             </a:extLst>
           </p:cNvPr>
@@ -1405,7 +1406,7 @@
           <a:p>
             <a:fld id="{CAE04C65-539E-4AD4-859E-8B7412D78289}" type="datetimeFigureOut">
               <a:rPr lang="x-none" smtClean="0"/>
-              <a:t>21/07/2023</a:t>
+              <a:t>22/07/2023</a:t>
             </a:fld>
             <a:endParaRPr lang="x-none"/>
           </a:p>
@@ -1416,7 +1417,7 @@
           <p:cNvPr id="5" name="Footer Placeholder 4">
             <a:extLst>
               <a:ext uri="{FF2B5EF4-FFF2-40B4-BE49-F238E27FC236}">
-                <a16:creationId xmlns="" xmlns:a16="http://schemas.microsoft.com/office/drawing/2014/main" id="{A4A3C1B6-62FF-4D39-B1B7-80ED1EEB8500}"/>
+                <a16:creationId xmlns:a16="http://schemas.microsoft.com/office/drawing/2014/main" xmlns="" id="{A4A3C1B6-62FF-4D39-B1B7-80ED1EEB8500}"/>
               </a:ext>
             </a:extLst>
           </p:cNvPr>
@@ -1441,7 +1442,7 @@
           <p:cNvPr id="6" name="Slide Number Placeholder 5">
             <a:extLst>
               <a:ext uri="{FF2B5EF4-FFF2-40B4-BE49-F238E27FC236}">
-                <a16:creationId xmlns="" xmlns:a16="http://schemas.microsoft.com/office/drawing/2014/main" id="{3AE1DEF8-8DD4-429C-8045-43AFFEE4E620}"/>
+                <a16:creationId xmlns:a16="http://schemas.microsoft.com/office/drawing/2014/main" xmlns="" id="{3AE1DEF8-8DD4-429C-8045-43AFFEE4E620}"/>
               </a:ext>
             </a:extLst>
           </p:cNvPr>
@@ -1500,7 +1501,7 @@
           <p:cNvPr id="2" name="Title 1">
             <a:extLst>
               <a:ext uri="{FF2B5EF4-FFF2-40B4-BE49-F238E27FC236}">
-                <a16:creationId xmlns="" xmlns:a16="http://schemas.microsoft.com/office/drawing/2014/main" id="{7F92C17B-2942-4D0A-96F1-F2E0E5735A53}"/>
+                <a16:creationId xmlns:a16="http://schemas.microsoft.com/office/drawing/2014/main" xmlns="" id="{7F92C17B-2942-4D0A-96F1-F2E0E5735A53}"/>
               </a:ext>
             </a:extLst>
           </p:cNvPr>
@@ -1538,7 +1539,7 @@
           <p:cNvPr id="3" name="Text Placeholder 2">
             <a:extLst>
               <a:ext uri="{FF2B5EF4-FFF2-40B4-BE49-F238E27FC236}">
-                <a16:creationId xmlns="" xmlns:a16="http://schemas.microsoft.com/office/drawing/2014/main" id="{2DB10F1A-C192-41FA-B518-42050492D2D4}"/>
+                <a16:creationId xmlns:a16="http://schemas.microsoft.com/office/drawing/2014/main" xmlns="" id="{2DB10F1A-C192-41FA-B518-42050492D2D4}"/>
               </a:ext>
             </a:extLst>
           </p:cNvPr>
@@ -1663,7 +1664,7 @@
           <p:cNvPr id="4" name="Date Placeholder 3">
             <a:extLst>
               <a:ext uri="{FF2B5EF4-FFF2-40B4-BE49-F238E27FC236}">
-                <a16:creationId xmlns="" xmlns:a16="http://schemas.microsoft.com/office/drawing/2014/main" id="{184B0546-9C9D-4940-87A3-F39585AADCC0}"/>
+                <a16:creationId xmlns:a16="http://schemas.microsoft.com/office/drawing/2014/main" xmlns="" id="{184B0546-9C9D-4940-87A3-F39585AADCC0}"/>
               </a:ext>
             </a:extLst>
           </p:cNvPr>
@@ -1681,7 +1682,7 @@
           <a:p>
             <a:fld id="{CAE04C65-539E-4AD4-859E-8B7412D78289}" type="datetimeFigureOut">
               <a:rPr lang="x-none" smtClean="0"/>
-              <a:t>21/07/2023</a:t>
+              <a:t>22/07/2023</a:t>
             </a:fld>
             <a:endParaRPr lang="x-none"/>
           </a:p>
@@ -1692,7 +1693,7 @@
           <p:cNvPr id="5" name="Footer Placeholder 4">
             <a:extLst>
               <a:ext uri="{FF2B5EF4-FFF2-40B4-BE49-F238E27FC236}">
-                <a16:creationId xmlns="" xmlns:a16="http://schemas.microsoft.com/office/drawing/2014/main" id="{8B80B022-C5B3-4DD3-BF3F-C1357C979210}"/>
+                <a16:creationId xmlns:a16="http://schemas.microsoft.com/office/drawing/2014/main" xmlns="" id="{8B80B022-C5B3-4DD3-BF3F-C1357C979210}"/>
               </a:ext>
             </a:extLst>
           </p:cNvPr>
@@ -1717,7 +1718,7 @@
           <p:cNvPr id="6" name="Slide Number Placeholder 5">
             <a:extLst>
               <a:ext uri="{FF2B5EF4-FFF2-40B4-BE49-F238E27FC236}">
-                <a16:creationId xmlns="" xmlns:a16="http://schemas.microsoft.com/office/drawing/2014/main" id="{E15C7E91-1FEE-44AE-B9B7-330B5D7DEA5A}"/>
+                <a16:creationId xmlns:a16="http://schemas.microsoft.com/office/drawing/2014/main" xmlns="" id="{E15C7E91-1FEE-44AE-B9B7-330B5D7DEA5A}"/>
               </a:ext>
             </a:extLst>
           </p:cNvPr>
@@ -1776,7 +1777,7 @@
           <p:cNvPr id="2" name="Title 1">
             <a:extLst>
               <a:ext uri="{FF2B5EF4-FFF2-40B4-BE49-F238E27FC236}">
-                <a16:creationId xmlns="" xmlns:a16="http://schemas.microsoft.com/office/drawing/2014/main" id="{9D2AD6B7-3B2E-4C6A-9CEE-ED7686ECAC2E}"/>
+                <a16:creationId xmlns:a16="http://schemas.microsoft.com/office/drawing/2014/main" xmlns="" id="{9D2AD6B7-3B2E-4C6A-9CEE-ED7686ECAC2E}"/>
               </a:ext>
             </a:extLst>
           </p:cNvPr>
@@ -1814,7 +1815,7 @@
           <p:cNvPr id="3" name="Content Placeholder 2">
             <a:extLst>
               <a:ext uri="{FF2B5EF4-FFF2-40B4-BE49-F238E27FC236}">
-                <a16:creationId xmlns="" xmlns:a16="http://schemas.microsoft.com/office/drawing/2014/main" id="{8AD17769-71E8-4707-8BA2-910AAC4845DC}"/>
+                <a16:creationId xmlns:a16="http://schemas.microsoft.com/office/drawing/2014/main" xmlns="" id="{8AD17769-71E8-4707-8BA2-910AAC4845DC}"/>
               </a:ext>
             </a:extLst>
           </p:cNvPr>
@@ -1877,7 +1878,7 @@
           <p:cNvPr id="4" name="Content Placeholder 3">
             <a:extLst>
               <a:ext uri="{FF2B5EF4-FFF2-40B4-BE49-F238E27FC236}">
-                <a16:creationId xmlns="" xmlns:a16="http://schemas.microsoft.com/office/drawing/2014/main" id="{EECE7247-487E-471D-8D75-BA5F655BAC60}"/>
+                <a16:creationId xmlns:a16="http://schemas.microsoft.com/office/drawing/2014/main" xmlns="" id="{EECE7247-487E-471D-8D75-BA5F655BAC60}"/>
               </a:ext>
             </a:extLst>
           </p:cNvPr>
@@ -1940,7 +1941,7 @@
           <p:cNvPr id="5" name="Date Placeholder 4">
             <a:extLst>
               <a:ext uri="{FF2B5EF4-FFF2-40B4-BE49-F238E27FC236}">
-                <a16:creationId xmlns="" xmlns:a16="http://schemas.microsoft.com/office/drawing/2014/main" id="{8BCC875D-D2B6-4251-81C3-89B2569BBAD7}"/>
+                <a16:creationId xmlns:a16="http://schemas.microsoft.com/office/drawing/2014/main" xmlns="" id="{8BCC875D-D2B6-4251-81C3-89B2569BBAD7}"/>
               </a:ext>
             </a:extLst>
           </p:cNvPr>
@@ -1958,7 +1959,7 @@
           <a:p>
             <a:fld id="{CAE04C65-539E-4AD4-859E-8B7412D78289}" type="datetimeFigureOut">
               <a:rPr lang="x-none" smtClean="0"/>
-              <a:t>21/07/2023</a:t>
+              <a:t>22/07/2023</a:t>
             </a:fld>
             <a:endParaRPr lang="x-none"/>
           </a:p>
@@ -1969,7 +1970,7 @@
           <p:cNvPr id="6" name="Footer Placeholder 5">
             <a:extLst>
               <a:ext uri="{FF2B5EF4-FFF2-40B4-BE49-F238E27FC236}">
-                <a16:creationId xmlns="" xmlns:a16="http://schemas.microsoft.com/office/drawing/2014/main" id="{D1F7938A-1BA6-419F-AEB4-60E23EA7FE1E}"/>
+                <a16:creationId xmlns:a16="http://schemas.microsoft.com/office/drawing/2014/main" xmlns="" id="{D1F7938A-1BA6-419F-AEB4-60E23EA7FE1E}"/>
               </a:ext>
             </a:extLst>
           </p:cNvPr>
@@ -1994,7 +1995,7 @@
           <p:cNvPr id="7" name="Slide Number Placeholder 6">
             <a:extLst>
               <a:ext uri="{FF2B5EF4-FFF2-40B4-BE49-F238E27FC236}">
-                <a16:creationId xmlns="" xmlns:a16="http://schemas.microsoft.com/office/drawing/2014/main" id="{916EA456-7EC8-411E-9A69-771CE07E1543}"/>
+                <a16:creationId xmlns:a16="http://schemas.microsoft.com/office/drawing/2014/main" xmlns="" id="{916EA456-7EC8-411E-9A69-771CE07E1543}"/>
               </a:ext>
             </a:extLst>
           </p:cNvPr>
@@ -2053,7 +2054,7 @@
           <p:cNvPr id="2" name="Title 1">
             <a:extLst>
               <a:ext uri="{FF2B5EF4-FFF2-40B4-BE49-F238E27FC236}">
-                <a16:creationId xmlns="" xmlns:a16="http://schemas.microsoft.com/office/drawing/2014/main" id="{8B6DE085-2280-467E-91CB-6698071994E5}"/>
+                <a16:creationId xmlns:a16="http://schemas.microsoft.com/office/drawing/2014/main" xmlns="" id="{8B6DE085-2280-467E-91CB-6698071994E5}"/>
               </a:ext>
             </a:extLst>
           </p:cNvPr>
@@ -2091,7 +2092,7 @@
           <p:cNvPr id="3" name="Text Placeholder 2">
             <a:extLst>
               <a:ext uri="{FF2B5EF4-FFF2-40B4-BE49-F238E27FC236}">
-                <a16:creationId xmlns="" xmlns:a16="http://schemas.microsoft.com/office/drawing/2014/main" id="{40EFBDD5-779C-4D34-A857-FC50086F0EE2}"/>
+                <a16:creationId xmlns:a16="http://schemas.microsoft.com/office/drawing/2014/main" xmlns="" id="{40EFBDD5-779C-4D34-A857-FC50086F0EE2}"/>
               </a:ext>
             </a:extLst>
           </p:cNvPr>
@@ -2162,7 +2163,7 @@
           <p:cNvPr id="4" name="Content Placeholder 3">
             <a:extLst>
               <a:ext uri="{FF2B5EF4-FFF2-40B4-BE49-F238E27FC236}">
-                <a16:creationId xmlns="" xmlns:a16="http://schemas.microsoft.com/office/drawing/2014/main" id="{1C8F016C-CA19-4B99-B496-64ABB6B58158}"/>
+                <a16:creationId xmlns:a16="http://schemas.microsoft.com/office/drawing/2014/main" xmlns="" id="{1C8F016C-CA19-4B99-B496-64ABB6B58158}"/>
               </a:ext>
             </a:extLst>
           </p:cNvPr>
@@ -2225,7 +2226,7 @@
           <p:cNvPr id="5" name="Text Placeholder 4">
             <a:extLst>
               <a:ext uri="{FF2B5EF4-FFF2-40B4-BE49-F238E27FC236}">
-                <a16:creationId xmlns="" xmlns:a16="http://schemas.microsoft.com/office/drawing/2014/main" id="{A7541AC2-A479-4308-9AF8-CA83127ABD59}"/>
+                <a16:creationId xmlns:a16="http://schemas.microsoft.com/office/drawing/2014/main" xmlns="" id="{A7541AC2-A479-4308-9AF8-CA83127ABD59}"/>
               </a:ext>
             </a:extLst>
           </p:cNvPr>
@@ -2296,7 +2297,7 @@
           <p:cNvPr id="6" name="Content Placeholder 5">
             <a:extLst>
               <a:ext uri="{FF2B5EF4-FFF2-40B4-BE49-F238E27FC236}">
-                <a16:creationId xmlns="" xmlns:a16="http://schemas.microsoft.com/office/drawing/2014/main" id="{ECF79F8A-DA3A-4D09-B6DA-CDF139491450}"/>
+                <a16:creationId xmlns:a16="http://schemas.microsoft.com/office/drawing/2014/main" xmlns="" id="{ECF79F8A-DA3A-4D09-B6DA-CDF139491450}"/>
               </a:ext>
             </a:extLst>
           </p:cNvPr>
@@ -2359,7 +2360,7 @@
           <p:cNvPr id="7" name="Date Placeholder 6">
             <a:extLst>
               <a:ext uri="{FF2B5EF4-FFF2-40B4-BE49-F238E27FC236}">
-                <a16:creationId xmlns="" xmlns:a16="http://schemas.microsoft.com/office/drawing/2014/main" id="{2ED2DBA1-82A3-40C5-9F37-4B88F6C664F3}"/>
+                <a16:creationId xmlns:a16="http://schemas.microsoft.com/office/drawing/2014/main" xmlns="" id="{2ED2DBA1-82A3-40C5-9F37-4B88F6C664F3}"/>
               </a:ext>
             </a:extLst>
           </p:cNvPr>
@@ -2377,7 +2378,7 @@
           <a:p>
             <a:fld id="{CAE04C65-539E-4AD4-859E-8B7412D78289}" type="datetimeFigureOut">
               <a:rPr lang="x-none" smtClean="0"/>
-              <a:t>21/07/2023</a:t>
+              <a:t>22/07/2023</a:t>
             </a:fld>
             <a:endParaRPr lang="x-none"/>
           </a:p>
@@ -2388,7 +2389,7 @@
           <p:cNvPr id="8" name="Footer Placeholder 7">
             <a:extLst>
               <a:ext uri="{FF2B5EF4-FFF2-40B4-BE49-F238E27FC236}">
-                <a16:creationId xmlns="" xmlns:a16="http://schemas.microsoft.com/office/drawing/2014/main" id="{7094F45B-BDDE-4A68-BB93-9338CF8A5C26}"/>
+                <a16:creationId xmlns:a16="http://schemas.microsoft.com/office/drawing/2014/main" xmlns="" id="{7094F45B-BDDE-4A68-BB93-9338CF8A5C26}"/>
               </a:ext>
             </a:extLst>
           </p:cNvPr>
@@ -2413,7 +2414,7 @@
           <p:cNvPr id="9" name="Slide Number Placeholder 8">
             <a:extLst>
               <a:ext uri="{FF2B5EF4-FFF2-40B4-BE49-F238E27FC236}">
-                <a16:creationId xmlns="" xmlns:a16="http://schemas.microsoft.com/office/drawing/2014/main" id="{7795C017-DA5A-4391-8299-F0BBC4344645}"/>
+                <a16:creationId xmlns:a16="http://schemas.microsoft.com/office/drawing/2014/main" xmlns="" id="{7795C017-DA5A-4391-8299-F0BBC4344645}"/>
               </a:ext>
             </a:extLst>
           </p:cNvPr>
@@ -2472,7 +2473,7 @@
           <p:cNvPr id="2" name="Title 1">
             <a:extLst>
               <a:ext uri="{FF2B5EF4-FFF2-40B4-BE49-F238E27FC236}">
-                <a16:creationId xmlns="" xmlns:a16="http://schemas.microsoft.com/office/drawing/2014/main" id="{DF090373-D1D1-4D85-8BD7-F6CB60C5BC7B}"/>
+                <a16:creationId xmlns:a16="http://schemas.microsoft.com/office/drawing/2014/main" xmlns="" id="{DF090373-D1D1-4D85-8BD7-F6CB60C5BC7B}"/>
               </a:ext>
             </a:extLst>
           </p:cNvPr>
@@ -2510,7 +2511,7 @@
           <p:cNvPr id="3" name="Date Placeholder 2">
             <a:extLst>
               <a:ext uri="{FF2B5EF4-FFF2-40B4-BE49-F238E27FC236}">
-                <a16:creationId xmlns="" xmlns:a16="http://schemas.microsoft.com/office/drawing/2014/main" id="{4DA80B40-9C56-4836-ACF1-D4B9F7F77E5B}"/>
+                <a16:creationId xmlns:a16="http://schemas.microsoft.com/office/drawing/2014/main" xmlns="" id="{4DA80B40-9C56-4836-ACF1-D4B9F7F77E5B}"/>
               </a:ext>
             </a:extLst>
           </p:cNvPr>
@@ -2528,7 +2529,7 @@
           <a:p>
             <a:fld id="{CAE04C65-539E-4AD4-859E-8B7412D78289}" type="datetimeFigureOut">
               <a:rPr lang="x-none" smtClean="0"/>
-              <a:t>21/07/2023</a:t>
+              <a:t>22/07/2023</a:t>
             </a:fld>
             <a:endParaRPr lang="x-none"/>
           </a:p>
@@ -2539,7 +2540,7 @@
           <p:cNvPr id="4" name="Footer Placeholder 3">
             <a:extLst>
               <a:ext uri="{FF2B5EF4-FFF2-40B4-BE49-F238E27FC236}">
-                <a16:creationId xmlns="" xmlns:a16="http://schemas.microsoft.com/office/drawing/2014/main" id="{10BB32EE-102E-41E2-B788-5DDD96ACABB7}"/>
+                <a16:creationId xmlns:a16="http://schemas.microsoft.com/office/drawing/2014/main" xmlns="" id="{10BB32EE-102E-41E2-B788-5DDD96ACABB7}"/>
               </a:ext>
             </a:extLst>
           </p:cNvPr>
@@ -2564,7 +2565,7 @@
           <p:cNvPr id="5" name="Slide Number Placeholder 4">
             <a:extLst>
               <a:ext uri="{FF2B5EF4-FFF2-40B4-BE49-F238E27FC236}">
-                <a16:creationId xmlns="" xmlns:a16="http://schemas.microsoft.com/office/drawing/2014/main" id="{E7B88824-B17A-4DC3-9629-CB211E0F119E}"/>
+                <a16:creationId xmlns:a16="http://schemas.microsoft.com/office/drawing/2014/main" xmlns="" id="{E7B88824-B17A-4DC3-9629-CB211E0F119E}"/>
               </a:ext>
             </a:extLst>
           </p:cNvPr>
@@ -2623,7 +2624,7 @@
           <p:cNvPr id="2" name="Date Placeholder 1">
             <a:extLst>
               <a:ext uri="{FF2B5EF4-FFF2-40B4-BE49-F238E27FC236}">
-                <a16:creationId xmlns="" xmlns:a16="http://schemas.microsoft.com/office/drawing/2014/main" id="{4D7CE12B-9FE7-4C8A-AB68-F7D039EE3C9B}"/>
+                <a16:creationId xmlns:a16="http://schemas.microsoft.com/office/drawing/2014/main" xmlns="" id="{4D7CE12B-9FE7-4C8A-AB68-F7D039EE3C9B}"/>
               </a:ext>
             </a:extLst>
           </p:cNvPr>
@@ -2641,7 +2642,7 @@
           <a:p>
             <a:fld id="{CAE04C65-539E-4AD4-859E-8B7412D78289}" type="datetimeFigureOut">
               <a:rPr lang="x-none" smtClean="0"/>
-              <a:t>21/07/2023</a:t>
+              <a:t>22/07/2023</a:t>
             </a:fld>
             <a:endParaRPr lang="x-none"/>
           </a:p>
@@ -2652,7 +2653,7 @@
           <p:cNvPr id="3" name="Footer Placeholder 2">
             <a:extLst>
               <a:ext uri="{FF2B5EF4-FFF2-40B4-BE49-F238E27FC236}">
-                <a16:creationId xmlns="" xmlns:a16="http://schemas.microsoft.com/office/drawing/2014/main" id="{DCAC3784-E6A5-446D-9238-1396952AEA0F}"/>
+                <a16:creationId xmlns:a16="http://schemas.microsoft.com/office/drawing/2014/main" xmlns="" id="{DCAC3784-E6A5-446D-9238-1396952AEA0F}"/>
               </a:ext>
             </a:extLst>
           </p:cNvPr>
@@ -2677,7 +2678,7 @@
           <p:cNvPr id="4" name="Slide Number Placeholder 3">
             <a:extLst>
               <a:ext uri="{FF2B5EF4-FFF2-40B4-BE49-F238E27FC236}">
-                <a16:creationId xmlns="" xmlns:a16="http://schemas.microsoft.com/office/drawing/2014/main" id="{E074D0F5-8662-45C6-B05D-DF1F9D8A3D0C}"/>
+                <a16:creationId xmlns:a16="http://schemas.microsoft.com/office/drawing/2014/main" xmlns="" id="{E074D0F5-8662-45C6-B05D-DF1F9D8A3D0C}"/>
               </a:ext>
             </a:extLst>
           </p:cNvPr>
@@ -2736,7 +2737,7 @@
           <p:cNvPr id="2" name="Title 1">
             <a:extLst>
               <a:ext uri="{FF2B5EF4-FFF2-40B4-BE49-F238E27FC236}">
-                <a16:creationId xmlns="" xmlns:a16="http://schemas.microsoft.com/office/drawing/2014/main" id="{C88BF255-B2D7-498C-A3C7-A4C58317DD83}"/>
+                <a16:creationId xmlns:a16="http://schemas.microsoft.com/office/drawing/2014/main" xmlns="" id="{C88BF255-B2D7-498C-A3C7-A4C58317DD83}"/>
               </a:ext>
             </a:extLst>
           </p:cNvPr>
@@ -2774,7 +2775,7 @@
           <p:cNvPr id="3" name="Content Placeholder 2">
             <a:extLst>
               <a:ext uri="{FF2B5EF4-FFF2-40B4-BE49-F238E27FC236}">
-                <a16:creationId xmlns="" xmlns:a16="http://schemas.microsoft.com/office/drawing/2014/main" id="{2636CEDD-70C1-433C-BAA5-B342A147D3E0}"/>
+                <a16:creationId xmlns:a16="http://schemas.microsoft.com/office/drawing/2014/main" xmlns="" id="{2636CEDD-70C1-433C-BAA5-B342A147D3E0}"/>
               </a:ext>
             </a:extLst>
           </p:cNvPr>
@@ -2865,7 +2866,7 @@
           <p:cNvPr id="4" name="Text Placeholder 3">
             <a:extLst>
               <a:ext uri="{FF2B5EF4-FFF2-40B4-BE49-F238E27FC236}">
-                <a16:creationId xmlns="" xmlns:a16="http://schemas.microsoft.com/office/drawing/2014/main" id="{C5CB5D8C-A77C-4D26-A1D8-010736F847C8}"/>
+                <a16:creationId xmlns:a16="http://schemas.microsoft.com/office/drawing/2014/main" xmlns="" id="{C5CB5D8C-A77C-4D26-A1D8-010736F847C8}"/>
               </a:ext>
             </a:extLst>
           </p:cNvPr>
@@ -2936,7 +2937,7 @@
           <p:cNvPr id="5" name="Date Placeholder 4">
             <a:extLst>
               <a:ext uri="{FF2B5EF4-FFF2-40B4-BE49-F238E27FC236}">
-                <a16:creationId xmlns="" xmlns:a16="http://schemas.microsoft.com/office/drawing/2014/main" id="{9414FB87-DDFE-4E8F-87E0-C913D44A556A}"/>
+                <a16:creationId xmlns:a16="http://schemas.microsoft.com/office/drawing/2014/main" xmlns="" id="{9414FB87-DDFE-4E8F-87E0-C913D44A556A}"/>
               </a:ext>
             </a:extLst>
           </p:cNvPr>
@@ -2954,7 +2955,7 @@
           <a:p>
             <a:fld id="{CAE04C65-539E-4AD4-859E-8B7412D78289}" type="datetimeFigureOut">
               <a:rPr lang="x-none" smtClean="0"/>
-              <a:t>21/07/2023</a:t>
+              <a:t>22/07/2023</a:t>
             </a:fld>
             <a:endParaRPr lang="x-none"/>
           </a:p>
@@ -2965,7 +2966,7 @@
           <p:cNvPr id="6" name="Footer Placeholder 5">
             <a:extLst>
               <a:ext uri="{FF2B5EF4-FFF2-40B4-BE49-F238E27FC236}">
-                <a16:creationId xmlns="" xmlns:a16="http://schemas.microsoft.com/office/drawing/2014/main" id="{E396F764-A21C-45A4-91E4-7FA6B326DCA8}"/>
+                <a16:creationId xmlns:a16="http://schemas.microsoft.com/office/drawing/2014/main" xmlns="" id="{E396F764-A21C-45A4-91E4-7FA6B326DCA8}"/>
               </a:ext>
             </a:extLst>
           </p:cNvPr>
@@ -2990,7 +2991,7 @@
           <p:cNvPr id="7" name="Slide Number Placeholder 6">
             <a:extLst>
               <a:ext uri="{FF2B5EF4-FFF2-40B4-BE49-F238E27FC236}">
-                <a16:creationId xmlns="" xmlns:a16="http://schemas.microsoft.com/office/drawing/2014/main" id="{3EF52E83-3169-456B-AAD8-ABB8972F7E94}"/>
+                <a16:creationId xmlns:a16="http://schemas.microsoft.com/office/drawing/2014/main" xmlns="" id="{3EF52E83-3169-456B-AAD8-ABB8972F7E94}"/>
               </a:ext>
             </a:extLst>
           </p:cNvPr>
@@ -3057,7 +3058,7 @@
           <p:cNvPr id="2" name="Title Placeholder 1">
             <a:extLst>
               <a:ext uri="{FF2B5EF4-FFF2-40B4-BE49-F238E27FC236}">
-                <a16:creationId xmlns="" xmlns:a16="http://schemas.microsoft.com/office/drawing/2014/main" id="{1CC3A86D-3830-444D-B17A-3349865C7FF0}"/>
+                <a16:creationId xmlns:a16="http://schemas.microsoft.com/office/drawing/2014/main" xmlns="" id="{1CC3A86D-3830-444D-B17A-3349865C7FF0}"/>
               </a:ext>
             </a:extLst>
           </p:cNvPr>
@@ -3096,7 +3097,7 @@
           <p:cNvPr id="3" name="Text Placeholder 2">
             <a:extLst>
               <a:ext uri="{FF2B5EF4-FFF2-40B4-BE49-F238E27FC236}">
-                <a16:creationId xmlns="" xmlns:a16="http://schemas.microsoft.com/office/drawing/2014/main" id="{043AB334-5BA7-444F-8A15-4CBB1039B1A1}"/>
+                <a16:creationId xmlns:a16="http://schemas.microsoft.com/office/drawing/2014/main" xmlns="" id="{043AB334-5BA7-444F-8A15-4CBB1039B1A1}"/>
               </a:ext>
             </a:extLst>
           </p:cNvPr>
@@ -3164,7 +3165,7 @@
           <p:cNvPr id="4" name="Date Placeholder 3">
             <a:extLst>
               <a:ext uri="{FF2B5EF4-FFF2-40B4-BE49-F238E27FC236}">
-                <a16:creationId xmlns="" xmlns:a16="http://schemas.microsoft.com/office/drawing/2014/main" id="{DD6634C7-4BDC-430F-A9F0-60A3F69512B3}"/>
+                <a16:creationId xmlns:a16="http://schemas.microsoft.com/office/drawing/2014/main" xmlns="" id="{DD6634C7-4BDC-430F-A9F0-60A3F69512B3}"/>
               </a:ext>
             </a:extLst>
           </p:cNvPr>
@@ -3200,7 +3201,7 @@
           <a:p>
             <a:fld id="{CAE04C65-539E-4AD4-859E-8B7412D78289}" type="datetimeFigureOut">
               <a:rPr lang="x-none" smtClean="0"/>
-              <a:t>21/07/2023</a:t>
+              <a:t>22/07/2023</a:t>
             </a:fld>
             <a:endParaRPr lang="x-none"/>
           </a:p>
@@ -3211,7 +3212,7 @@
           <p:cNvPr id="5" name="Footer Placeholder 4">
             <a:extLst>
               <a:ext uri="{FF2B5EF4-FFF2-40B4-BE49-F238E27FC236}">
-                <a16:creationId xmlns="" xmlns:a16="http://schemas.microsoft.com/office/drawing/2014/main" id="{E93DAEAE-77B3-47FC-8341-6E0EFDFD0DBA}"/>
+                <a16:creationId xmlns:a16="http://schemas.microsoft.com/office/drawing/2014/main" xmlns="" id="{E93DAEAE-77B3-47FC-8341-6E0EFDFD0DBA}"/>
               </a:ext>
             </a:extLst>
           </p:cNvPr>
@@ -3254,7 +3255,7 @@
           <p:cNvPr id="6" name="Slide Number Placeholder 5">
             <a:extLst>
               <a:ext uri="{FF2B5EF4-FFF2-40B4-BE49-F238E27FC236}">
-                <a16:creationId xmlns="" xmlns:a16="http://schemas.microsoft.com/office/drawing/2014/main" id="{C4BCFFC4-BE25-4199-B180-25FF6B8B6EFE}"/>
+                <a16:creationId xmlns:a16="http://schemas.microsoft.com/office/drawing/2014/main" xmlns="" id="{C4BCFFC4-BE25-4199-B180-25FF6B8B6EFE}"/>
               </a:ext>
             </a:extLst>
           </p:cNvPr>
@@ -3623,7 +3624,7 @@
           <p:cNvPr id="2" name="Title 1">
             <a:extLst>
               <a:ext uri="{FF2B5EF4-FFF2-40B4-BE49-F238E27FC236}">
-                <a16:creationId xmlns="" xmlns:a16="http://schemas.microsoft.com/office/drawing/2014/main" id="{58A809C9-4B93-4BC5-9D6E-3EE198C9BC09}"/>
+                <a16:creationId xmlns:a16="http://schemas.microsoft.com/office/drawing/2014/main" xmlns="" id="{58A809C9-4B93-4BC5-9D6E-3EE198C9BC09}"/>
               </a:ext>
             </a:extLst>
           </p:cNvPr>
@@ -3652,7 +3653,7 @@
           <p:cNvPr id="3" name="Subtitle 2">
             <a:extLst>
               <a:ext uri="{FF2B5EF4-FFF2-40B4-BE49-F238E27FC236}">
-                <a16:creationId xmlns="" xmlns:a16="http://schemas.microsoft.com/office/drawing/2014/main" id="{86E98C76-BF7C-4E6D-9666-D506DF1D5B8A}"/>
+                <a16:creationId xmlns:a16="http://schemas.microsoft.com/office/drawing/2014/main" xmlns="" id="{86E98C76-BF7C-4E6D-9666-D506DF1D5B8A}"/>
               </a:ext>
             </a:extLst>
           </p:cNvPr>
@@ -3718,7 +3719,7 @@
           <p:cNvPr id="7" name="Title 6">
             <a:extLst>
               <a:ext uri="{FF2B5EF4-FFF2-40B4-BE49-F238E27FC236}">
-                <a16:creationId xmlns="" xmlns:a16="http://schemas.microsoft.com/office/drawing/2014/main" id="{73B810CF-8B65-40F1-A50C-4AEABE85B5E5}"/>
+                <a16:creationId xmlns:a16="http://schemas.microsoft.com/office/drawing/2014/main" xmlns="" id="{73B810CF-8B65-40F1-A50C-4AEABE85B5E5}"/>
               </a:ext>
             </a:extLst>
           </p:cNvPr>
@@ -3749,7 +3750,7 @@
           <p:cNvPr id="12" name="Content Placeholder 11">
             <a:extLst>
               <a:ext uri="{FF2B5EF4-FFF2-40B4-BE49-F238E27FC236}">
-                <a16:creationId xmlns="" xmlns:a16="http://schemas.microsoft.com/office/drawing/2014/main" id="{46AFF02A-4A3F-46A9-AA85-C205489ED0A3}"/>
+                <a16:creationId xmlns:a16="http://schemas.microsoft.com/office/drawing/2014/main" xmlns="" id="{46AFF02A-4A3F-46A9-AA85-C205489ED0A3}"/>
               </a:ext>
             </a:extLst>
           </p:cNvPr>
@@ -3778,7 +3779,7 @@
           <p:cNvPr id="18" name="Picture 17">
             <a:extLst>
               <a:ext uri="{FF2B5EF4-FFF2-40B4-BE49-F238E27FC236}">
-                <a16:creationId xmlns="" xmlns:a16="http://schemas.microsoft.com/office/drawing/2014/main" id="{E84A51B2-4D91-4021-8309-6E3EBF6BC3AF}"/>
+                <a16:creationId xmlns:a16="http://schemas.microsoft.com/office/drawing/2014/main" xmlns="" id="{E84A51B2-4D91-4021-8309-6E3EBF6BC3AF}"/>
               </a:ext>
             </a:extLst>
           </p:cNvPr>
@@ -3851,7 +3852,7 @@
           <p:cNvPr id="4" name="Title 3">
             <a:extLst>
               <a:ext uri="{FF2B5EF4-FFF2-40B4-BE49-F238E27FC236}">
-                <a16:creationId xmlns="" xmlns:a16="http://schemas.microsoft.com/office/drawing/2014/main" id="{0A05D06C-6013-4F53-8478-D129844FC8CC}"/>
+                <a16:creationId xmlns:a16="http://schemas.microsoft.com/office/drawing/2014/main" xmlns="" id="{0A05D06C-6013-4F53-8478-D129844FC8CC}"/>
               </a:ext>
             </a:extLst>
           </p:cNvPr>
@@ -3880,7 +3881,7 @@
           <p:cNvPr id="5" name="Content Placeholder 4">
             <a:extLst>
               <a:ext uri="{FF2B5EF4-FFF2-40B4-BE49-F238E27FC236}">
-                <a16:creationId xmlns="" xmlns:a16="http://schemas.microsoft.com/office/drawing/2014/main" id="{D82C205C-D269-41A7-9079-97120B0063B3}"/>
+                <a16:creationId xmlns:a16="http://schemas.microsoft.com/office/drawing/2014/main" xmlns="" id="{D82C205C-D269-41A7-9079-97120B0063B3}"/>
               </a:ext>
             </a:extLst>
           </p:cNvPr>
@@ -3923,7 +3924,7 @@
           <p:cNvPr id="7" name="Picture 6">
             <a:extLst>
               <a:ext uri="{FF2B5EF4-FFF2-40B4-BE49-F238E27FC236}">
-                <a16:creationId xmlns="" xmlns:a16="http://schemas.microsoft.com/office/drawing/2014/main" id="{49B0932E-A655-45F2-9269-67C936BCF00C}"/>
+                <a16:creationId xmlns:a16="http://schemas.microsoft.com/office/drawing/2014/main" xmlns="" id="{49B0932E-A655-45F2-9269-67C936BCF00C}"/>
               </a:ext>
             </a:extLst>
           </p:cNvPr>
@@ -3953,7 +3954,7 @@
           <p:cNvPr id="9" name="Picture 8">
             <a:extLst>
               <a:ext uri="{FF2B5EF4-FFF2-40B4-BE49-F238E27FC236}">
-                <a16:creationId xmlns="" xmlns:a16="http://schemas.microsoft.com/office/drawing/2014/main" id="{F875D6FF-E763-452F-B87F-EECE80E9E15C}"/>
+                <a16:creationId xmlns:a16="http://schemas.microsoft.com/office/drawing/2014/main" xmlns="" id="{F875D6FF-E763-452F-B87F-EECE80E9E15C}"/>
               </a:ext>
             </a:extLst>
           </p:cNvPr>
@@ -4020,7 +4021,7 @@
           <p:cNvPr id="4" name="Title 3">
             <a:extLst>
               <a:ext uri="{FF2B5EF4-FFF2-40B4-BE49-F238E27FC236}">
-                <a16:creationId xmlns="" xmlns:a16="http://schemas.microsoft.com/office/drawing/2014/main" id="{0A05D06C-6013-4F53-8478-D129844FC8CC}"/>
+                <a16:creationId xmlns:a16="http://schemas.microsoft.com/office/drawing/2014/main" xmlns="" id="{0A05D06C-6013-4F53-8478-D129844FC8CC}"/>
               </a:ext>
             </a:extLst>
           </p:cNvPr>
@@ -4049,7 +4050,7 @@
           <p:cNvPr id="5" name="Content Placeholder 4">
             <a:extLst>
               <a:ext uri="{FF2B5EF4-FFF2-40B4-BE49-F238E27FC236}">
-                <a16:creationId xmlns="" xmlns:a16="http://schemas.microsoft.com/office/drawing/2014/main" id="{D82C205C-D269-41A7-9079-97120B0063B3}"/>
+                <a16:creationId xmlns:a16="http://schemas.microsoft.com/office/drawing/2014/main" xmlns="" id="{D82C205C-D269-41A7-9079-97120B0063B3}"/>
               </a:ext>
             </a:extLst>
           </p:cNvPr>
@@ -4085,7 +4086,7 @@
           <p:cNvPr id="6" name="Picture 5">
             <a:extLst>
               <a:ext uri="{FF2B5EF4-FFF2-40B4-BE49-F238E27FC236}">
-                <a16:creationId xmlns="" xmlns:a16="http://schemas.microsoft.com/office/drawing/2014/main" id="{DC953E39-A1E1-4120-BA45-2C7E790EE460}"/>
+                <a16:creationId xmlns:a16="http://schemas.microsoft.com/office/drawing/2014/main" xmlns="" id="{DC953E39-A1E1-4120-BA45-2C7E790EE460}"/>
               </a:ext>
             </a:extLst>
           </p:cNvPr>
@@ -4152,7 +4153,7 @@
           <p:cNvPr id="2" name="Title 1">
             <a:extLst>
               <a:ext uri="{FF2B5EF4-FFF2-40B4-BE49-F238E27FC236}">
-                <a16:creationId xmlns="" xmlns:a16="http://schemas.microsoft.com/office/drawing/2014/main" id="{CCE9F001-422D-41D2-B0B0-44D45D916CA6}"/>
+                <a16:creationId xmlns:a16="http://schemas.microsoft.com/office/drawing/2014/main" xmlns="" id="{CCE9F001-422D-41D2-B0B0-44D45D916CA6}"/>
               </a:ext>
             </a:extLst>
           </p:cNvPr>
@@ -4185,7 +4186,7 @@
           <p:cNvPr id="3" name="Content Placeholder 2">
             <a:extLst>
               <a:ext uri="{FF2B5EF4-FFF2-40B4-BE49-F238E27FC236}">
-                <a16:creationId xmlns="" xmlns:a16="http://schemas.microsoft.com/office/drawing/2014/main" id="{CB15881A-5069-4285-97F3-5453BC930157}"/>
+                <a16:creationId xmlns:a16="http://schemas.microsoft.com/office/drawing/2014/main" xmlns="" id="{CB15881A-5069-4285-97F3-5453BC930157}"/>
               </a:ext>
             </a:extLst>
           </p:cNvPr>
@@ -4236,7 +4237,7 @@
           <p:cNvPr id="5" name="Picture 4">
             <a:extLst>
               <a:ext uri="{FF2B5EF4-FFF2-40B4-BE49-F238E27FC236}">
-                <a16:creationId xmlns="" xmlns:a16="http://schemas.microsoft.com/office/drawing/2014/main" id="{2340FC03-CF5D-4247-998C-49AA412A5808}"/>
+                <a16:creationId xmlns:a16="http://schemas.microsoft.com/office/drawing/2014/main" xmlns="" id="{2340FC03-CF5D-4247-998C-49AA412A5808}"/>
               </a:ext>
             </a:extLst>
           </p:cNvPr>
@@ -4368,7 +4369,7 @@
           <p:cNvPr id="2" name="Title 1">
             <a:extLst>
               <a:ext uri="{FF2B5EF4-FFF2-40B4-BE49-F238E27FC236}">
-                <a16:creationId xmlns="" xmlns:a16="http://schemas.microsoft.com/office/drawing/2014/main" id="{A7586D44-EECA-4316-AFD9-18218DD93FC5}"/>
+                <a16:creationId xmlns:a16="http://schemas.microsoft.com/office/drawing/2014/main" xmlns="" id="{A7586D44-EECA-4316-AFD9-18218DD93FC5}"/>
               </a:ext>
             </a:extLst>
           </p:cNvPr>
@@ -4397,7 +4398,7 @@
           <p:cNvPr id="3" name="Content Placeholder 2">
             <a:extLst>
               <a:ext uri="{FF2B5EF4-FFF2-40B4-BE49-F238E27FC236}">
-                <a16:creationId xmlns="" xmlns:a16="http://schemas.microsoft.com/office/drawing/2014/main" id="{274B9576-886E-4FFB-A78F-8B87E0DBB4C2}"/>
+                <a16:creationId xmlns:a16="http://schemas.microsoft.com/office/drawing/2014/main" xmlns="" id="{274B9576-886E-4FFB-A78F-8B87E0DBB4C2}"/>
               </a:ext>
             </a:extLst>
           </p:cNvPr>
@@ -4582,7 +4583,7 @@
           <p:cNvPr id="2" name="Title 1">
             <a:extLst>
               <a:ext uri="{FF2B5EF4-FFF2-40B4-BE49-F238E27FC236}">
-                <a16:creationId xmlns="" xmlns:a16="http://schemas.microsoft.com/office/drawing/2014/main" id="{62118670-9D33-4A23-AC4C-183474388AAF}"/>
+                <a16:creationId xmlns:a16="http://schemas.microsoft.com/office/drawing/2014/main" xmlns="" id="{62118670-9D33-4A23-AC4C-183474388AAF}"/>
               </a:ext>
             </a:extLst>
           </p:cNvPr>
@@ -4611,7 +4612,7 @@
           <p:cNvPr id="7" name="Content Placeholder 2">
             <a:extLst>
               <a:ext uri="{FF2B5EF4-FFF2-40B4-BE49-F238E27FC236}">
-                <a16:creationId xmlns="" xmlns:a16="http://schemas.microsoft.com/office/drawing/2014/main" id="{E4DA3F9C-F9DB-4F20-8762-A4E630955EE6}"/>
+                <a16:creationId xmlns:a16="http://schemas.microsoft.com/office/drawing/2014/main" xmlns="" id="{E4DA3F9C-F9DB-4F20-8762-A4E630955EE6}"/>
               </a:ext>
             </a:extLst>
           </p:cNvPr>
@@ -5205,7 +5206,7 @@
           <p:cNvPr id="2" name="Title 1">
             <a:extLst>
               <a:ext uri="{FF2B5EF4-FFF2-40B4-BE49-F238E27FC236}">
-                <a16:creationId xmlns="" xmlns:a16="http://schemas.microsoft.com/office/drawing/2014/main" id="{62118670-9D33-4A23-AC4C-183474388AAF}"/>
+                <a16:creationId xmlns:a16="http://schemas.microsoft.com/office/drawing/2014/main" xmlns="" id="{62118670-9D33-4A23-AC4C-183474388AAF}"/>
               </a:ext>
             </a:extLst>
           </p:cNvPr>
@@ -5234,7 +5235,7 @@
           <p:cNvPr id="7" name="Content Placeholder 2">
             <a:extLst>
               <a:ext uri="{FF2B5EF4-FFF2-40B4-BE49-F238E27FC236}">
-                <a16:creationId xmlns="" xmlns:a16="http://schemas.microsoft.com/office/drawing/2014/main" id="{E4DA3F9C-F9DB-4F20-8762-A4E630955EE6}"/>
+                <a16:creationId xmlns:a16="http://schemas.microsoft.com/office/drawing/2014/main" xmlns="" id="{E4DA3F9C-F9DB-4F20-8762-A4E630955EE6}"/>
               </a:ext>
             </a:extLst>
           </p:cNvPr>
@@ -5500,7 +5501,7 @@
           <p:cNvPr id="2" name="Title 1">
             <a:extLst>
               <a:ext uri="{FF2B5EF4-FFF2-40B4-BE49-F238E27FC236}">
-                <a16:creationId xmlns="" xmlns:a16="http://schemas.microsoft.com/office/drawing/2014/main" id="{62118670-9D33-4A23-AC4C-183474388AAF}"/>
+                <a16:creationId xmlns:a16="http://schemas.microsoft.com/office/drawing/2014/main" xmlns="" id="{62118670-9D33-4A23-AC4C-183474388AAF}"/>
               </a:ext>
             </a:extLst>
           </p:cNvPr>
@@ -6078,7 +6079,7 @@
           <p:cNvPr id="2" name="Title 1">
             <a:extLst>
               <a:ext uri="{FF2B5EF4-FFF2-40B4-BE49-F238E27FC236}">
-                <a16:creationId xmlns="" xmlns:a16="http://schemas.microsoft.com/office/drawing/2014/main" id="{62118670-9D33-4A23-AC4C-183474388AAF}"/>
+                <a16:creationId xmlns:a16="http://schemas.microsoft.com/office/drawing/2014/main" xmlns="" id="{62118670-9D33-4A23-AC4C-183474388AAF}"/>
               </a:ext>
             </a:extLst>
           </p:cNvPr>
@@ -6479,7 +6480,7 @@
           <p:cNvPr id="2" name="Title 1">
             <a:extLst>
               <a:ext uri="{FF2B5EF4-FFF2-40B4-BE49-F238E27FC236}">
-                <a16:creationId xmlns="" xmlns:a16="http://schemas.microsoft.com/office/drawing/2014/main" id="{D2966871-39A6-4CAF-9BAF-98EB2F6D1286}"/>
+                <a16:creationId xmlns:a16="http://schemas.microsoft.com/office/drawing/2014/main" xmlns="" id="{D2966871-39A6-4CAF-9BAF-98EB2F6D1286}"/>
               </a:ext>
             </a:extLst>
           </p:cNvPr>
@@ -6516,7 +6517,7 @@
           <p:cNvPr id="3" name="Content Placeholder 2">
             <a:extLst>
               <a:ext uri="{FF2B5EF4-FFF2-40B4-BE49-F238E27FC236}">
-                <a16:creationId xmlns="" xmlns:a16="http://schemas.microsoft.com/office/drawing/2014/main" id="{9CC308C7-6DFB-4507-A325-8CD2A01E731B}"/>
+                <a16:creationId xmlns:a16="http://schemas.microsoft.com/office/drawing/2014/main" xmlns="" id="{9CC308C7-6DFB-4507-A325-8CD2A01E731B}"/>
               </a:ext>
             </a:extLst>
           </p:cNvPr>
@@ -6660,7 +6661,11 @@
           <a:p>
             <a:r>
               <a:rPr lang="en-US" dirty="0" smtClean="0"/>
-              <a:t>Query – API Endpoint</a:t>
+              <a:t>Query – </a:t>
+            </a:r>
+            <a:r>
+              <a:rPr lang="en-US" dirty="0" smtClean="0"/>
+              <a:t>Alerting</a:t>
             </a:r>
             <a:endParaRPr lang="de-DE" dirty="0"/>
           </a:p>
@@ -6679,24 +6684,34 @@
         <p:spPr>
           <a:xfrm>
             <a:off x="838200" y="1320801"/>
-            <a:ext cx="10515600" cy="1514996"/>
+            <a:ext cx="10515600" cy="681619"/>
           </a:xfrm>
         </p:spPr>
         <p:txBody>
           <a:bodyPr>
-            <a:normAutofit fontScale="92500" lnSpcReduction="10000"/>
+            <a:normAutofit/>
           </a:bodyPr>
           <a:lstStyle/>
           <a:p>
             <a:r>
               <a:rPr lang="en-US" dirty="0" smtClean="0"/>
-              <a:t>Use the available API endpoint to execute queries from another application to get the data for usage in other applications.</a:t>
-            </a:r>
-          </a:p>
-          <a:p>
+              <a:t>Use the query feature to get alerts by </a:t>
+            </a:r>
+            <a:r>
+              <a:rPr lang="en-US" smtClean="0"/>
+              <a:t>eMail</a:t>
+            </a:r>
             <a:r>
               <a:rPr lang="en-US" dirty="0" smtClean="0"/>
-              <a:t>The user interface includes an overview of all API endpoints where you can generate example URLs and CURL commands to assist you in using the API:</a:t>
+              <a:t> or In-App </a:t>
+            </a:r>
+            <a:r>
+              <a:rPr lang="en-US" dirty="0"/>
+              <a:t>N</a:t>
+            </a:r>
+            <a:r>
+              <a:rPr lang="en-US" dirty="0" smtClean="0"/>
+              <a:t>otifications:</a:t>
             </a:r>
             <a:endParaRPr lang="de-DE" dirty="0"/>
           </a:p>
@@ -6704,7 +6719,7 @@
       </p:sp>
       <p:pic>
         <p:nvPicPr>
-          <p:cNvPr id="4098" name="Picture 2"/>
+          <p:cNvPr id="1026" name="Picture 2"/>
           <p:cNvPicPr>
             <a:picLocks noChangeAspect="1" noChangeArrowheads="1"/>
           </p:cNvPicPr>
@@ -6725,8 +6740,8 @@
         </p:blipFill>
         <p:spPr bwMode="auto">
           <a:xfrm>
-            <a:off x="614262" y="3027605"/>
-            <a:ext cx="11007011" cy="3037530"/>
+            <a:off x="2115473" y="2063591"/>
+            <a:ext cx="8199543" cy="4464534"/>
           </a:xfrm>
           <a:prstGeom prst="rect">
             <a:avLst/>
@@ -6805,36 +6820,131 @@
       </p:grpSpPr>
       <p:sp>
         <p:nvSpPr>
-          <p:cNvPr id="4" name="Titel 3"/>
+          <p:cNvPr id="2" name="Titel 1"/>
           <p:cNvSpPr>
             <a:spLocks noGrp="1"/>
           </p:cNvSpPr>
           <p:nvPr>
             <p:ph type="title"/>
+          </p:nvPr>
+        </p:nvSpPr>
+        <p:spPr/>
+        <p:txBody>
+          <a:bodyPr/>
+          <a:lstStyle/>
+          <a:p>
+            <a:r>
+              <a:rPr lang="en-US" dirty="0" smtClean="0"/>
+              <a:t>Query – API Endpoint</a:t>
+            </a:r>
+            <a:endParaRPr lang="de-DE" dirty="0"/>
+          </a:p>
+        </p:txBody>
+      </p:sp>
+      <p:sp>
+        <p:nvSpPr>
+          <p:cNvPr id="3" name="Inhaltsplatzhalter 2"/>
+          <p:cNvSpPr>
+            <a:spLocks noGrp="1"/>
+          </p:cNvSpPr>
+          <p:nvPr>
+            <p:ph idx="1"/>
           </p:nvPr>
         </p:nvSpPr>
         <p:spPr>
           <a:xfrm>
-            <a:off x="831850" y="2733040"/>
-            <a:ext cx="10515600" cy="1016000"/>
+            <a:off x="838200" y="1320801"/>
+            <a:ext cx="10515600" cy="1514996"/>
           </a:xfrm>
         </p:spPr>
         <p:txBody>
-          <a:bodyPr/>
+          <a:bodyPr>
+            <a:normAutofit fontScale="92500" lnSpcReduction="10000"/>
+          </a:bodyPr>
           <a:lstStyle/>
           <a:p>
             <a:r>
               <a:rPr lang="en-US" dirty="0" smtClean="0"/>
-              <a:t>QUERY EXAMPLES</a:t>
+              <a:t>Use the available API endpoint to execute queries from another application to get the data for usage in other applications.</a:t>
+            </a:r>
+          </a:p>
+          <a:p>
+            <a:r>
+              <a:rPr lang="en-US" dirty="0" smtClean="0"/>
+              <a:t>The user interface includes an overview of all API endpoints where you can generate example URLs and CURL commands to assist you in using the API:</a:t>
             </a:r>
             <a:endParaRPr lang="de-DE" dirty="0"/>
           </a:p>
         </p:txBody>
       </p:sp>
+      <p:pic>
+        <p:nvPicPr>
+          <p:cNvPr id="4098" name="Picture 2"/>
+          <p:cNvPicPr>
+            <a:picLocks noChangeAspect="1" noChangeArrowheads="1"/>
+          </p:cNvPicPr>
+          <p:nvPr/>
+        </p:nvPicPr>
+        <p:blipFill>
+          <a:blip r:embed="rId2">
+            <a:extLst>
+              <a:ext uri="{28A0092B-C50C-407E-A947-70E740481C1C}">
+                <a14:useLocalDpi xmlns:a14="http://schemas.microsoft.com/office/drawing/2010/main" val="0"/>
+              </a:ext>
+            </a:extLst>
+          </a:blip>
+          <a:srcRect/>
+          <a:stretch>
+            <a:fillRect/>
+          </a:stretch>
+        </p:blipFill>
+        <p:spPr bwMode="auto">
+          <a:xfrm>
+            <a:off x="614262" y="3027605"/>
+            <a:ext cx="11007011" cy="3037530"/>
+          </a:xfrm>
+          <a:prstGeom prst="rect">
+            <a:avLst/>
+          </a:prstGeom>
+          <a:noFill/>
+          <a:ln>
+            <a:noFill/>
+          </a:ln>
+          <a:effectLst/>
+          <a:extLst>
+            <a:ext uri="{909E8E84-426E-40DD-AFC4-6F175D3DCCD1}">
+              <a14:hiddenFill xmlns:a14="http://schemas.microsoft.com/office/drawing/2010/main">
+                <a:solidFill>
+                  <a:schemeClr val="accent1"/>
+                </a:solidFill>
+              </a14:hiddenFill>
+            </a:ext>
+            <a:ext uri="{91240B29-F687-4F45-9708-019B960494DF}">
+              <a14:hiddenLine xmlns:a14="http://schemas.microsoft.com/office/drawing/2010/main" w="9525">
+                <a:solidFill>
+                  <a:schemeClr val="tx1"/>
+                </a:solidFill>
+                <a:miter lim="800000"/>
+                <a:headEnd/>
+                <a:tailEnd/>
+              </a14:hiddenLine>
+            </a:ext>
+            <a:ext uri="{AF507438-7753-43E0-B8FC-AC1667EBCBE1}">
+              <a14:hiddenEffects xmlns:a14="http://schemas.microsoft.com/office/drawing/2010/main">
+                <a:effectLst>
+                  <a:outerShdw dist="35921" dir="2700000" algn="ctr" rotWithShape="0">
+                    <a:schemeClr val="bg2"/>
+                  </a:outerShdw>
+                </a:effectLst>
+              </a14:hiddenEffects>
+            </a:ext>
+          </a:extLst>
+        </p:spPr>
+      </p:pic>
     </p:spTree>
     <p:extLst>
       <p:ext uri="{BB962C8B-B14F-4D97-AF65-F5344CB8AC3E}">
-        <p14:creationId xmlns:p14="http://schemas.microsoft.com/office/powerpoint/2010/main" val="4224311462"/>
+        <p14:creationId xmlns:p14="http://schemas.microsoft.com/office/powerpoint/2010/main" val="4200392477"/>
       </p:ext>
     </p:extLst>
   </p:cSld>
@@ -6870,13 +6980,7 @@
       </p:grpSpPr>
       <p:sp>
         <p:nvSpPr>
-          <p:cNvPr id="2" name="Title 1">
-            <a:extLst>
-              <a:ext uri="{FF2B5EF4-FFF2-40B4-BE49-F238E27FC236}">
-                <a16:creationId xmlns="" xmlns:a16="http://schemas.microsoft.com/office/drawing/2014/main" id="{640606EA-B052-4986-9E62-6ACA495288FE}"/>
-              </a:ext>
-            </a:extLst>
-          </p:cNvPr>
+          <p:cNvPr id="4" name="Titel 3"/>
           <p:cNvSpPr>
             <a:spLocks noGrp="1"/>
           </p:cNvSpPr>
@@ -6884,139 +6988,28 @@
             <p:ph type="title"/>
           </p:nvPr>
         </p:nvSpPr>
-        <p:spPr/>
+        <p:spPr>
+          <a:xfrm>
+            <a:off x="831850" y="2733040"/>
+            <a:ext cx="10515600" cy="1016000"/>
+          </a:xfrm>
+        </p:spPr>
         <p:txBody>
           <a:bodyPr/>
           <a:lstStyle/>
           <a:p>
             <a:r>
               <a:rPr lang="en-US" dirty="0" smtClean="0"/>
-              <a:t>Query </a:t>
-            </a:r>
-            <a:r>
-              <a:rPr lang="en-US" dirty="0"/>
-              <a:t>– </a:t>
-            </a:r>
-            <a:r>
-              <a:rPr lang="en-US" dirty="0" smtClean="0"/>
-              <a:t>Content Assist</a:t>
-            </a:r>
-            <a:endParaRPr lang="en-CH" dirty="0"/>
-          </a:p>
-        </p:txBody>
-      </p:sp>
-      <p:sp>
-        <p:nvSpPr>
-          <p:cNvPr id="3" name="Content Placeholder 2">
-            <a:extLst>
-              <a:ext uri="{FF2B5EF4-FFF2-40B4-BE49-F238E27FC236}">
-                <a16:creationId xmlns="" xmlns:a16="http://schemas.microsoft.com/office/drawing/2014/main" id="{BF0741C9-90F7-49E1-9999-3F216DB04D68}"/>
-              </a:ext>
-            </a:extLst>
-          </p:cNvPr>
-          <p:cNvSpPr>
-            <a:spLocks noGrp="1"/>
-          </p:cNvSpPr>
-          <p:nvPr>
-            <p:ph idx="1"/>
-          </p:nvPr>
-        </p:nvSpPr>
-        <p:spPr>
-          <a:xfrm>
-            <a:off x="838200" y="1228201"/>
-            <a:ext cx="10515600" cy="890567"/>
-          </a:xfrm>
-        </p:spPr>
-        <p:txBody>
-          <a:bodyPr>
-            <a:normAutofit/>
-          </a:bodyPr>
-          <a:lstStyle/>
-          <a:p>
-            <a:r>
-              <a:rPr lang="en-US" dirty="0" smtClean="0"/>
-              <a:t>Use </a:t>
-            </a:r>
-            <a:r>
-              <a:rPr lang="en-US" dirty="0" err="1" smtClean="0"/>
-              <a:t>Ctrl+Space</a:t>
-            </a:r>
-            <a:r>
-              <a:rPr lang="en-US" dirty="0" smtClean="0"/>
-              <a:t> to open the content assist to search for commands, functions, getting help on how to use them and autocomplete items. </a:t>
-            </a:r>
-            <a:endParaRPr lang="en-CH" dirty="0"/>
-          </a:p>
-        </p:txBody>
-      </p:sp>
-      <p:pic>
-        <p:nvPicPr>
-          <p:cNvPr id="7170" name="Picture 2"/>
-          <p:cNvPicPr>
-            <a:picLocks noChangeAspect="1" noChangeArrowheads="1"/>
-          </p:cNvPicPr>
-          <p:nvPr/>
-        </p:nvPicPr>
-        <p:blipFill>
-          <a:blip r:embed="rId2">
-            <a:extLst>
-              <a:ext uri="{28A0092B-C50C-407E-A947-70E740481C1C}">
-                <a14:useLocalDpi xmlns:a14="http://schemas.microsoft.com/office/drawing/2010/main" val="0"/>
-              </a:ext>
-            </a:extLst>
-          </a:blip>
-          <a:srcRect/>
-          <a:stretch>
-            <a:fillRect/>
-          </a:stretch>
-        </p:blipFill>
-        <p:spPr bwMode="auto">
-          <a:xfrm>
-            <a:off x="387390" y="2165068"/>
-            <a:ext cx="11326190" cy="4498471"/>
-          </a:xfrm>
-          <a:prstGeom prst="rect">
-            <a:avLst/>
-          </a:prstGeom>
-          <a:noFill/>
-          <a:ln>
-            <a:noFill/>
-          </a:ln>
-          <a:effectLst/>
-          <a:extLst>
-            <a:ext uri="{909E8E84-426E-40DD-AFC4-6F175D3DCCD1}">
-              <a14:hiddenFill xmlns:a14="http://schemas.microsoft.com/office/drawing/2010/main">
-                <a:solidFill>
-                  <a:schemeClr val="accent1"/>
-                </a:solidFill>
-              </a14:hiddenFill>
-            </a:ext>
-            <a:ext uri="{91240B29-F687-4F45-9708-019B960494DF}">
-              <a14:hiddenLine xmlns:a14="http://schemas.microsoft.com/office/drawing/2010/main" w="9525">
-                <a:solidFill>
-                  <a:schemeClr val="tx1"/>
-                </a:solidFill>
-                <a:miter lim="800000"/>
-                <a:headEnd/>
-                <a:tailEnd/>
-              </a14:hiddenLine>
-            </a:ext>
-            <a:ext uri="{AF507438-7753-43E0-B8FC-AC1667EBCBE1}">
-              <a14:hiddenEffects xmlns:a14="http://schemas.microsoft.com/office/drawing/2010/main">
-                <a:effectLst>
-                  <a:outerShdw dist="35921" dir="2700000" algn="ctr" rotWithShape="0">
-                    <a:schemeClr val="bg2"/>
-                  </a:outerShdw>
-                </a:effectLst>
-              </a14:hiddenEffects>
-            </a:ext>
-          </a:extLst>
-        </p:spPr>
-      </p:pic>
+              <a:t>QUERY EXAMPLES</a:t>
+            </a:r>
+            <a:endParaRPr lang="de-DE" dirty="0"/>
+          </a:p>
+        </p:txBody>
+      </p:sp>
     </p:spTree>
     <p:extLst>
       <p:ext uri="{BB962C8B-B14F-4D97-AF65-F5344CB8AC3E}">
-        <p14:creationId xmlns:p14="http://schemas.microsoft.com/office/powerpoint/2010/main" val="3073090357"/>
+        <p14:creationId xmlns:p14="http://schemas.microsoft.com/office/powerpoint/2010/main" val="4224311462"/>
       </p:ext>
     </p:extLst>
   </p:cSld>
@@ -7055,7 +7048,7 @@
           <p:cNvPr id="2" name="Title 1">
             <a:extLst>
               <a:ext uri="{FF2B5EF4-FFF2-40B4-BE49-F238E27FC236}">
-                <a16:creationId xmlns="" xmlns:a16="http://schemas.microsoft.com/office/drawing/2014/main" id="{640606EA-B052-4986-9E62-6ACA495288FE}"/>
+                <a16:creationId xmlns:a16="http://schemas.microsoft.com/office/drawing/2014/main" xmlns="" id="{640606EA-B052-4986-9E62-6ACA495288FE}"/>
               </a:ext>
             </a:extLst>
           </p:cNvPr>
@@ -7077,6 +7070,188 @@
             </a:r>
             <a:r>
               <a:rPr lang="en-US" dirty="0"/>
+              <a:t>– </a:t>
+            </a:r>
+            <a:r>
+              <a:rPr lang="en-US" dirty="0" smtClean="0"/>
+              <a:t>Content Assist</a:t>
+            </a:r>
+            <a:endParaRPr lang="en-CH" dirty="0"/>
+          </a:p>
+        </p:txBody>
+      </p:sp>
+      <p:sp>
+        <p:nvSpPr>
+          <p:cNvPr id="3" name="Content Placeholder 2">
+            <a:extLst>
+              <a:ext uri="{FF2B5EF4-FFF2-40B4-BE49-F238E27FC236}">
+                <a16:creationId xmlns:a16="http://schemas.microsoft.com/office/drawing/2014/main" xmlns="" id="{BF0741C9-90F7-49E1-9999-3F216DB04D68}"/>
+              </a:ext>
+            </a:extLst>
+          </p:cNvPr>
+          <p:cNvSpPr>
+            <a:spLocks noGrp="1"/>
+          </p:cNvSpPr>
+          <p:nvPr>
+            <p:ph idx="1"/>
+          </p:nvPr>
+        </p:nvSpPr>
+        <p:spPr>
+          <a:xfrm>
+            <a:off x="838200" y="1228201"/>
+            <a:ext cx="10515600" cy="890567"/>
+          </a:xfrm>
+        </p:spPr>
+        <p:txBody>
+          <a:bodyPr>
+            <a:normAutofit/>
+          </a:bodyPr>
+          <a:lstStyle/>
+          <a:p>
+            <a:r>
+              <a:rPr lang="en-US" dirty="0" smtClean="0"/>
+              <a:t>Use </a:t>
+            </a:r>
+            <a:r>
+              <a:rPr lang="en-US" dirty="0" err="1" smtClean="0"/>
+              <a:t>Ctrl+Space</a:t>
+            </a:r>
+            <a:r>
+              <a:rPr lang="en-US" dirty="0" smtClean="0"/>
+              <a:t> to open the content assist to search for commands, functions, getting help on how to use them and autocomplete items. </a:t>
+            </a:r>
+            <a:endParaRPr lang="en-CH" dirty="0"/>
+          </a:p>
+        </p:txBody>
+      </p:sp>
+      <p:pic>
+        <p:nvPicPr>
+          <p:cNvPr id="7170" name="Picture 2"/>
+          <p:cNvPicPr>
+            <a:picLocks noChangeAspect="1" noChangeArrowheads="1"/>
+          </p:cNvPicPr>
+          <p:nvPr/>
+        </p:nvPicPr>
+        <p:blipFill>
+          <a:blip r:embed="rId2">
+            <a:extLst>
+              <a:ext uri="{28A0092B-C50C-407E-A947-70E740481C1C}">
+                <a14:useLocalDpi xmlns:a14="http://schemas.microsoft.com/office/drawing/2010/main" val="0"/>
+              </a:ext>
+            </a:extLst>
+          </a:blip>
+          <a:srcRect/>
+          <a:stretch>
+            <a:fillRect/>
+          </a:stretch>
+        </p:blipFill>
+        <p:spPr bwMode="auto">
+          <a:xfrm>
+            <a:off x="387390" y="2165068"/>
+            <a:ext cx="11326190" cy="4498471"/>
+          </a:xfrm>
+          <a:prstGeom prst="rect">
+            <a:avLst/>
+          </a:prstGeom>
+          <a:noFill/>
+          <a:ln>
+            <a:noFill/>
+          </a:ln>
+          <a:effectLst/>
+          <a:extLst>
+            <a:ext uri="{909E8E84-426E-40DD-AFC4-6F175D3DCCD1}">
+              <a14:hiddenFill xmlns:a14="http://schemas.microsoft.com/office/drawing/2010/main">
+                <a:solidFill>
+                  <a:schemeClr val="accent1"/>
+                </a:solidFill>
+              </a14:hiddenFill>
+            </a:ext>
+            <a:ext uri="{91240B29-F687-4F45-9708-019B960494DF}">
+              <a14:hiddenLine xmlns:a14="http://schemas.microsoft.com/office/drawing/2010/main" w="9525">
+                <a:solidFill>
+                  <a:schemeClr val="tx1"/>
+                </a:solidFill>
+                <a:miter lim="800000"/>
+                <a:headEnd/>
+                <a:tailEnd/>
+              </a14:hiddenLine>
+            </a:ext>
+            <a:ext uri="{AF507438-7753-43E0-B8FC-AC1667EBCBE1}">
+              <a14:hiddenEffects xmlns:a14="http://schemas.microsoft.com/office/drawing/2010/main">
+                <a:effectLst>
+                  <a:outerShdw dist="35921" dir="2700000" algn="ctr" rotWithShape="0">
+                    <a:schemeClr val="bg2"/>
+                  </a:outerShdw>
+                </a:effectLst>
+              </a14:hiddenEffects>
+            </a:ext>
+          </a:extLst>
+        </p:spPr>
+      </p:pic>
+    </p:spTree>
+    <p:extLst>
+      <p:ext uri="{BB962C8B-B14F-4D97-AF65-F5344CB8AC3E}">
+        <p14:creationId xmlns:p14="http://schemas.microsoft.com/office/powerpoint/2010/main" val="3073090357"/>
+      </p:ext>
+    </p:extLst>
+  </p:cSld>
+  <p:clrMapOvr>
+    <a:masterClrMapping/>
+  </p:clrMapOvr>
+  <p:timing>
+    <p:tnLst>
+      <p:par>
+        <p:cTn id="1" dur="indefinite" restart="never" nodeType="tmRoot"/>
+      </p:par>
+    </p:tnLst>
+  </p:timing>
+</p:sld>
+</file>
+
+<file path=ppt/slides/slide24.xml><?xml version="1.0" encoding="utf-8"?>
+<p:sld xmlns:a="http://schemas.openxmlformats.org/drawingml/2006/main" xmlns:r="http://schemas.openxmlformats.org/officeDocument/2006/relationships" xmlns:p="http://schemas.openxmlformats.org/presentationml/2006/main">
+  <p:cSld>
+    <p:spTree>
+      <p:nvGrpSpPr>
+        <p:cNvPr id="1" name=""/>
+        <p:cNvGrpSpPr/>
+        <p:nvPr/>
+      </p:nvGrpSpPr>
+      <p:grpSpPr>
+        <a:xfrm>
+          <a:off x="0" y="0"/>
+          <a:ext cx="0" cy="0"/>
+          <a:chOff x="0" y="0"/>
+          <a:chExt cx="0" cy="0"/>
+        </a:xfrm>
+      </p:grpSpPr>
+      <p:sp>
+        <p:nvSpPr>
+          <p:cNvPr id="2" name="Title 1">
+            <a:extLst>
+              <a:ext uri="{FF2B5EF4-FFF2-40B4-BE49-F238E27FC236}">
+                <a16:creationId xmlns:a16="http://schemas.microsoft.com/office/drawing/2014/main" xmlns="" id="{640606EA-B052-4986-9E62-6ACA495288FE}"/>
+              </a:ext>
+            </a:extLst>
+          </p:cNvPr>
+          <p:cNvSpPr>
+            <a:spLocks noGrp="1"/>
+          </p:cNvSpPr>
+          <p:nvPr>
+            <p:ph type="title"/>
+          </p:nvPr>
+        </p:nvSpPr>
+        <p:spPr/>
+        <p:txBody>
+          <a:bodyPr/>
+          <a:lstStyle/>
+          <a:p>
+            <a:r>
+              <a:rPr lang="en-US" dirty="0" smtClean="0"/>
+              <a:t>Query </a:t>
+            </a:r>
+            <a:r>
+              <a:rPr lang="en-US" dirty="0"/>
               <a:t>– Fetch Data From Database</a:t>
             </a:r>
             <a:endParaRPr lang="en-CH" dirty="0"/>
@@ -7088,7 +7263,7 @@
           <p:cNvPr id="3" name="Content Placeholder 2">
             <a:extLst>
               <a:ext uri="{FF2B5EF4-FFF2-40B4-BE49-F238E27FC236}">
-                <a16:creationId xmlns="" xmlns:a16="http://schemas.microsoft.com/office/drawing/2014/main" id="{BF0741C9-90F7-49E1-9999-3F216DB04D68}"/>
+                <a16:creationId xmlns:a16="http://schemas.microsoft.com/office/drawing/2014/main" xmlns="" id="{BF0741C9-90F7-49E1-9999-3F216DB04D68}"/>
               </a:ext>
             </a:extLst>
           </p:cNvPr>
@@ -7117,7 +7292,7 @@
           <p:cNvPr id="9" name="Picture 8">
             <a:extLst>
               <a:ext uri="{FF2B5EF4-FFF2-40B4-BE49-F238E27FC236}">
-                <a16:creationId xmlns="" xmlns:a16="http://schemas.microsoft.com/office/drawing/2014/main" id="{EC1EA80E-36ED-462E-AF59-5356E89542BF}"/>
+                <a16:creationId xmlns:a16="http://schemas.microsoft.com/office/drawing/2014/main" xmlns="" id="{EC1EA80E-36ED-462E-AF59-5356E89542BF}"/>
               </a:ext>
             </a:extLst>
           </p:cNvPr>
@@ -7162,7 +7337,7 @@
 </p:sld>
 </file>
 
-<file path=ppt/slides/slide24.xml><?xml version="1.0" encoding="utf-8"?>
+<file path=ppt/slides/slide25.xml><?xml version="1.0" encoding="utf-8"?>
 <p:sld xmlns:a="http://schemas.openxmlformats.org/drawingml/2006/main" xmlns:r="http://schemas.openxmlformats.org/officeDocument/2006/relationships" xmlns:p="http://schemas.openxmlformats.org/presentationml/2006/main">
   <p:cSld>
     <p:spTree>
@@ -7362,160 +7537,6 @@
     <p:extLst>
       <p:ext uri="{BB962C8B-B14F-4D97-AF65-F5344CB8AC3E}">
         <p14:creationId xmlns:p14="http://schemas.microsoft.com/office/powerpoint/2010/main" val="2527271957"/>
-      </p:ext>
-    </p:extLst>
-  </p:cSld>
-  <p:clrMapOvr>
-    <a:masterClrMapping/>
-  </p:clrMapOvr>
-  <p:timing>
-    <p:tnLst>
-      <p:par>
-        <p:cTn id="1" dur="indefinite" restart="never" nodeType="tmRoot"/>
-      </p:par>
-    </p:tnLst>
-  </p:timing>
-</p:sld>
-</file>
-
-<file path=ppt/slides/slide25.xml><?xml version="1.0" encoding="utf-8"?>
-<p:sld xmlns:a="http://schemas.openxmlformats.org/drawingml/2006/main" xmlns:r="http://schemas.openxmlformats.org/officeDocument/2006/relationships" xmlns:p="http://schemas.openxmlformats.org/presentationml/2006/main">
-  <p:cSld>
-    <p:spTree>
-      <p:nvGrpSpPr>
-        <p:cNvPr id="1" name=""/>
-        <p:cNvGrpSpPr/>
-        <p:nvPr/>
-      </p:nvGrpSpPr>
-      <p:grpSpPr>
-        <a:xfrm>
-          <a:off x="0" y="0"/>
-          <a:ext cx="0" cy="0"/>
-          <a:chOff x="0" y="0"/>
-          <a:chExt cx="0" cy="0"/>
-        </a:xfrm>
-      </p:grpSpPr>
-      <p:sp>
-        <p:nvSpPr>
-          <p:cNvPr id="2" name="Titel 1"/>
-          <p:cNvSpPr>
-            <a:spLocks noGrp="1"/>
-          </p:cNvSpPr>
-          <p:nvPr>
-            <p:ph type="title"/>
-          </p:nvPr>
-        </p:nvSpPr>
-        <p:spPr/>
-        <p:txBody>
-          <a:bodyPr/>
-          <a:lstStyle/>
-          <a:p>
-            <a:r>
-              <a:rPr lang="en-US" dirty="0" smtClean="0"/>
-              <a:t>Query – Filter Data</a:t>
-            </a:r>
-            <a:endParaRPr lang="de-DE" dirty="0"/>
-          </a:p>
-        </p:txBody>
-      </p:sp>
-      <p:sp>
-        <p:nvSpPr>
-          <p:cNvPr id="3" name="Inhaltsplatzhalter 2"/>
-          <p:cNvSpPr>
-            <a:spLocks noGrp="1"/>
-          </p:cNvSpPr>
-          <p:nvPr>
-            <p:ph idx="1"/>
-          </p:nvPr>
-        </p:nvSpPr>
-        <p:spPr>
-          <a:xfrm>
-            <a:off x="794611" y="1332375"/>
-            <a:ext cx="10515600" cy="982563"/>
-          </a:xfrm>
-        </p:spPr>
-        <p:txBody>
-          <a:bodyPr>
-            <a:normAutofit/>
-          </a:bodyPr>
-          <a:lstStyle/>
-          <a:p>
-            <a:r>
-              <a:rPr lang="en-US" dirty="0" smtClean="0"/>
-              <a:t>Use the filter command to do any kind of filtering on any field, supports regular expressions:</a:t>
-            </a:r>
-            <a:endParaRPr lang="de-DE" dirty="0"/>
-          </a:p>
-        </p:txBody>
-      </p:sp>
-      <p:pic>
-        <p:nvPicPr>
-          <p:cNvPr id="8194" name="Picture 2"/>
-          <p:cNvPicPr>
-            <a:picLocks noChangeAspect="1" noChangeArrowheads="1"/>
-          </p:cNvPicPr>
-          <p:nvPr/>
-        </p:nvPicPr>
-        <p:blipFill>
-          <a:blip r:embed="rId2">
-            <a:extLst>
-              <a:ext uri="{28A0092B-C50C-407E-A947-70E740481C1C}">
-                <a14:useLocalDpi xmlns:a14="http://schemas.microsoft.com/office/drawing/2010/main" val="0"/>
-              </a:ext>
-            </a:extLst>
-          </a:blip>
-          <a:srcRect/>
-          <a:stretch>
-            <a:fillRect/>
-          </a:stretch>
-        </p:blipFill>
-        <p:spPr bwMode="auto">
-          <a:xfrm>
-            <a:off x="954389" y="2559192"/>
-            <a:ext cx="10103444" cy="2059108"/>
-          </a:xfrm>
-          <a:prstGeom prst="rect">
-            <a:avLst/>
-          </a:prstGeom>
-          <a:noFill/>
-          <a:ln>
-            <a:noFill/>
-          </a:ln>
-          <a:effectLst/>
-          <a:extLst>
-            <a:ext uri="{909E8E84-426E-40DD-AFC4-6F175D3DCCD1}">
-              <a14:hiddenFill xmlns:a14="http://schemas.microsoft.com/office/drawing/2010/main">
-                <a:solidFill>
-                  <a:schemeClr val="accent1"/>
-                </a:solidFill>
-              </a14:hiddenFill>
-            </a:ext>
-            <a:ext uri="{91240B29-F687-4F45-9708-019B960494DF}">
-              <a14:hiddenLine xmlns:a14="http://schemas.microsoft.com/office/drawing/2010/main" w="9525">
-                <a:solidFill>
-                  <a:schemeClr val="tx1"/>
-                </a:solidFill>
-                <a:miter lim="800000"/>
-                <a:headEnd/>
-                <a:tailEnd/>
-              </a14:hiddenLine>
-            </a:ext>
-            <a:ext uri="{AF507438-7753-43E0-B8FC-AC1667EBCBE1}">
-              <a14:hiddenEffects xmlns:a14="http://schemas.microsoft.com/office/drawing/2010/main">
-                <a:effectLst>
-                  <a:outerShdw dist="35921" dir="2700000" algn="ctr" rotWithShape="0">
-                    <a:schemeClr val="bg2"/>
-                  </a:outerShdw>
-                </a:effectLst>
-              </a14:hiddenEffects>
-            </a:ext>
-          </a:extLst>
-        </p:spPr>
-      </p:pic>
-    </p:spTree>
-    <p:extLst>
-      <p:ext uri="{BB962C8B-B14F-4D97-AF65-F5344CB8AC3E}">
-        <p14:creationId xmlns:p14="http://schemas.microsoft.com/office/powerpoint/2010/main" val="1916299725"/>
       </p:ext>
     </p:extLst>
   </p:cSld>
@@ -7566,7 +7587,7 @@
           <a:p>
             <a:r>
               <a:rPr lang="en-US" dirty="0" smtClean="0"/>
-              <a:t>Query – Create Statistics</a:t>
+              <a:t>Query – Filter Data</a:t>
             </a:r>
             <a:endParaRPr lang="de-DE" dirty="0"/>
           </a:p>
@@ -7582,7 +7603,12 @@
             <p:ph idx="1"/>
           </p:nvPr>
         </p:nvSpPr>
-        <p:spPr/>
+        <p:spPr>
+          <a:xfrm>
+            <a:off x="794611" y="1332375"/>
+            <a:ext cx="10515600" cy="982563"/>
+          </a:xfrm>
+        </p:spPr>
         <p:txBody>
           <a:bodyPr>
             <a:normAutofit/>
@@ -7591,7 +7617,7 @@
           <a:p>
             <a:r>
               <a:rPr lang="en-US" dirty="0" smtClean="0"/>
-              <a:t>Create statistics fast and easy with the stats command:</a:t>
+              <a:t>Use the filter command to do any kind of filtering on any field, supports regular expressions:</a:t>
             </a:r>
             <a:endParaRPr lang="de-DE" dirty="0"/>
           </a:p>
@@ -7599,7 +7625,7 @@
       </p:sp>
       <p:pic>
         <p:nvPicPr>
-          <p:cNvPr id="6146" name="Picture 2"/>
+          <p:cNvPr id="8194" name="Picture 2"/>
           <p:cNvPicPr>
             <a:picLocks noChangeAspect="1" noChangeArrowheads="1"/>
           </p:cNvPicPr>
@@ -7620,8 +7646,8 @@
         </p:blipFill>
         <p:spPr bwMode="auto">
           <a:xfrm>
-            <a:off x="557310" y="2378045"/>
-            <a:ext cx="3472042" cy="3177801"/>
+            <a:off x="954389" y="2559192"/>
+            <a:ext cx="10103444" cy="2059108"/>
           </a:xfrm>
           <a:prstGeom prst="rect">
             <a:avLst/>
@@ -7661,74 +7687,10 @@
           </a:extLst>
         </p:spPr>
       </p:pic>
-      <p:pic>
-        <p:nvPicPr>
-          <p:cNvPr id="6147" name="Picture 3"/>
-          <p:cNvPicPr>
-            <a:picLocks noChangeAspect="1" noChangeArrowheads="1"/>
-          </p:cNvPicPr>
-          <p:nvPr/>
-        </p:nvPicPr>
-        <p:blipFill>
-          <a:blip r:embed="rId3">
-            <a:extLst>
-              <a:ext uri="{28A0092B-C50C-407E-A947-70E740481C1C}">
-                <a14:useLocalDpi xmlns:a14="http://schemas.microsoft.com/office/drawing/2010/main" val="0"/>
-              </a:ext>
-            </a:extLst>
-          </a:blip>
-          <a:srcRect/>
-          <a:stretch>
-            <a:fillRect/>
-          </a:stretch>
-        </p:blipFill>
-        <p:spPr bwMode="auto">
-          <a:xfrm>
-            <a:off x="4087227" y="2331745"/>
-            <a:ext cx="7811548" cy="3900661"/>
-          </a:xfrm>
-          <a:prstGeom prst="rect">
-            <a:avLst/>
-          </a:prstGeom>
-          <a:noFill/>
-          <a:ln>
-            <a:noFill/>
-          </a:ln>
-          <a:effectLst/>
-          <a:extLst>
-            <a:ext uri="{909E8E84-426E-40DD-AFC4-6F175D3DCCD1}">
-              <a14:hiddenFill xmlns:a14="http://schemas.microsoft.com/office/drawing/2010/main">
-                <a:solidFill>
-                  <a:schemeClr val="accent1"/>
-                </a:solidFill>
-              </a14:hiddenFill>
-            </a:ext>
-            <a:ext uri="{91240B29-F687-4F45-9708-019B960494DF}">
-              <a14:hiddenLine xmlns:a14="http://schemas.microsoft.com/office/drawing/2010/main" w="9525">
-                <a:solidFill>
-                  <a:schemeClr val="tx1"/>
-                </a:solidFill>
-                <a:miter lim="800000"/>
-                <a:headEnd/>
-                <a:tailEnd/>
-              </a14:hiddenLine>
-            </a:ext>
-            <a:ext uri="{AF507438-7753-43E0-B8FC-AC1667EBCBE1}">
-              <a14:hiddenEffects xmlns:a14="http://schemas.microsoft.com/office/drawing/2010/main">
-                <a:effectLst>
-                  <a:outerShdw dist="35921" dir="2700000" algn="ctr" rotWithShape="0">
-                    <a:schemeClr val="bg2"/>
-                  </a:outerShdw>
-                </a:effectLst>
-              </a14:hiddenEffects>
-            </a:ext>
-          </a:extLst>
-        </p:spPr>
-      </p:pic>
     </p:spTree>
     <p:extLst>
       <p:ext uri="{BB962C8B-B14F-4D97-AF65-F5344CB8AC3E}">
-        <p14:creationId xmlns:p14="http://schemas.microsoft.com/office/powerpoint/2010/main" val="3741133964"/>
+        <p14:creationId xmlns:p14="http://schemas.microsoft.com/office/powerpoint/2010/main" val="1916299725"/>
       </p:ext>
     </p:extLst>
   </p:cSld>
@@ -7764,13 +7726,7 @@
       </p:grpSpPr>
       <p:sp>
         <p:nvSpPr>
-          <p:cNvPr id="2" name="Title 1">
-            <a:extLst>
-              <a:ext uri="{FF2B5EF4-FFF2-40B4-BE49-F238E27FC236}">
-                <a16:creationId xmlns="" xmlns:a16="http://schemas.microsoft.com/office/drawing/2014/main" id="{1A48B704-594D-4CE1-8C3B-5EAC7C5F03A6}"/>
-              </a:ext>
-            </a:extLst>
-          </p:cNvPr>
+          <p:cNvPr id="2" name="Titel 1"/>
           <p:cNvSpPr>
             <a:spLocks noGrp="1"/>
           </p:cNvSpPr>
@@ -7785,21 +7741,15 @@
           <a:p>
             <a:r>
               <a:rPr lang="en-US" dirty="0" smtClean="0"/>
-              <a:t>Query - Formatting</a:t>
-            </a:r>
-            <a:endParaRPr lang="en-CH" dirty="0"/>
-          </a:p>
-        </p:txBody>
-      </p:sp>
-      <p:sp>
-        <p:nvSpPr>
-          <p:cNvPr id="3" name="Content Placeholder 2">
-            <a:extLst>
-              <a:ext uri="{FF2B5EF4-FFF2-40B4-BE49-F238E27FC236}">
-                <a16:creationId xmlns="" xmlns:a16="http://schemas.microsoft.com/office/drawing/2014/main" id="{8ABB42C9-39CD-487D-9BEE-AFC8655570CB}"/>
-              </a:ext>
-            </a:extLst>
-          </p:cNvPr>
+              <a:t>Query – Create Statistics</a:t>
+            </a:r>
+            <a:endParaRPr lang="de-DE" dirty="0"/>
+          </a:p>
+        </p:txBody>
+      </p:sp>
+      <p:sp>
+        <p:nvSpPr>
+          <p:cNvPr id="3" name="Inhaltsplatzhalter 2"/>
           <p:cNvSpPr>
             <a:spLocks noGrp="1"/>
           </p:cNvSpPr>
@@ -7809,57 +7759,29 @@
         </p:nvSpPr>
         <p:spPr/>
         <p:txBody>
-          <a:bodyPr/>
+          <a:bodyPr>
+            <a:normAutofit/>
+          </a:bodyPr>
           <a:lstStyle/>
           <a:p>
             <a:r>
-              <a:rPr lang="en-US" dirty="0"/>
-              <a:t>Show records as traffic lights based on field values.</a:t>
-            </a:r>
-            <a:endParaRPr lang="en-CH" dirty="0"/>
+              <a:rPr lang="en-US" dirty="0" smtClean="0"/>
+              <a:t>Create statistics fast and easy with the stats command:</a:t>
+            </a:r>
+            <a:endParaRPr lang="de-DE" dirty="0"/>
           </a:p>
         </p:txBody>
       </p:sp>
       <p:pic>
         <p:nvPicPr>
-          <p:cNvPr id="7" name="Picture 6">
-            <a:extLst>
-              <a:ext uri="{FF2B5EF4-FFF2-40B4-BE49-F238E27FC236}">
-                <a16:creationId xmlns="" xmlns:a16="http://schemas.microsoft.com/office/drawing/2014/main" id="{1F2C98FB-B744-402A-81F8-C360DDFF2473}"/>
-              </a:ext>
-            </a:extLst>
-          </p:cNvPr>
-          <p:cNvPicPr>
-            <a:picLocks noChangeAspect="1"/>
-          </p:cNvPicPr>
-          <p:nvPr/>
-        </p:nvPicPr>
-        <p:blipFill>
-          <a:blip r:embed="rId2"/>
-          <a:stretch>
-            <a:fillRect/>
-          </a:stretch>
-        </p:blipFill>
-        <p:spPr>
-          <a:xfrm>
-            <a:off x="4805341" y="2164338"/>
-            <a:ext cx="6726259" cy="4010023"/>
-          </a:xfrm>
-          <a:prstGeom prst="rect">
-            <a:avLst/>
-          </a:prstGeom>
-        </p:spPr>
-      </p:pic>
-      <p:pic>
-        <p:nvPicPr>
-          <p:cNvPr id="9218" name="Picture 2"/>
+          <p:cNvPr id="6146" name="Picture 2"/>
           <p:cNvPicPr>
             <a:picLocks noChangeAspect="1" noChangeArrowheads="1"/>
           </p:cNvPicPr>
           <p:nvPr/>
         </p:nvPicPr>
         <p:blipFill>
-          <a:blip r:embed="rId3">
+          <a:blip r:embed="rId2">
             <a:extLst>
               <a:ext uri="{28A0092B-C50C-407E-A947-70E740481C1C}">
                 <a14:useLocalDpi xmlns:a14="http://schemas.microsoft.com/office/drawing/2010/main" val="0"/>
@@ -7873,8 +7795,8 @@
         </p:blipFill>
         <p:spPr bwMode="auto">
           <a:xfrm>
-            <a:off x="687466" y="2164338"/>
-            <a:ext cx="4123872" cy="4010023"/>
+            <a:off x="557310" y="2378045"/>
+            <a:ext cx="3472042" cy="3177801"/>
           </a:xfrm>
           <a:prstGeom prst="rect">
             <a:avLst/>
@@ -7914,10 +7836,74 @@
           </a:extLst>
         </p:spPr>
       </p:pic>
+      <p:pic>
+        <p:nvPicPr>
+          <p:cNvPr id="6147" name="Picture 3"/>
+          <p:cNvPicPr>
+            <a:picLocks noChangeAspect="1" noChangeArrowheads="1"/>
+          </p:cNvPicPr>
+          <p:nvPr/>
+        </p:nvPicPr>
+        <p:blipFill>
+          <a:blip r:embed="rId3">
+            <a:extLst>
+              <a:ext uri="{28A0092B-C50C-407E-A947-70E740481C1C}">
+                <a14:useLocalDpi xmlns:a14="http://schemas.microsoft.com/office/drawing/2010/main" val="0"/>
+              </a:ext>
+            </a:extLst>
+          </a:blip>
+          <a:srcRect/>
+          <a:stretch>
+            <a:fillRect/>
+          </a:stretch>
+        </p:blipFill>
+        <p:spPr bwMode="auto">
+          <a:xfrm>
+            <a:off x="4087227" y="2331745"/>
+            <a:ext cx="7811548" cy="3900661"/>
+          </a:xfrm>
+          <a:prstGeom prst="rect">
+            <a:avLst/>
+          </a:prstGeom>
+          <a:noFill/>
+          <a:ln>
+            <a:noFill/>
+          </a:ln>
+          <a:effectLst/>
+          <a:extLst>
+            <a:ext uri="{909E8E84-426E-40DD-AFC4-6F175D3DCCD1}">
+              <a14:hiddenFill xmlns:a14="http://schemas.microsoft.com/office/drawing/2010/main">
+                <a:solidFill>
+                  <a:schemeClr val="accent1"/>
+                </a:solidFill>
+              </a14:hiddenFill>
+            </a:ext>
+            <a:ext uri="{91240B29-F687-4F45-9708-019B960494DF}">
+              <a14:hiddenLine xmlns:a14="http://schemas.microsoft.com/office/drawing/2010/main" w="9525">
+                <a:solidFill>
+                  <a:schemeClr val="tx1"/>
+                </a:solidFill>
+                <a:miter lim="800000"/>
+                <a:headEnd/>
+                <a:tailEnd/>
+              </a14:hiddenLine>
+            </a:ext>
+            <a:ext uri="{AF507438-7753-43E0-B8FC-AC1667EBCBE1}">
+              <a14:hiddenEffects xmlns:a14="http://schemas.microsoft.com/office/drawing/2010/main">
+                <a:effectLst>
+                  <a:outerShdw dist="35921" dir="2700000" algn="ctr" rotWithShape="0">
+                    <a:schemeClr val="bg2"/>
+                  </a:outerShdw>
+                </a:effectLst>
+              </a14:hiddenEffects>
+            </a:ext>
+          </a:extLst>
+        </p:spPr>
+      </p:pic>
     </p:spTree>
     <p:extLst>
       <p:ext uri="{BB962C8B-B14F-4D97-AF65-F5344CB8AC3E}">
-        <p14:creationId xmlns:p14="http://schemas.microsoft.com/office/powerpoint/2010/main" val="4235682211"/>
+        <p14:creationId xmlns:p14="http://schemas.microsoft.com/office/powerpoint/2010/main" val="3741133964"/>
       </p:ext>
     </p:extLst>
   </p:cSld>
@@ -7956,7 +7942,7 @@
           <p:cNvPr id="2" name="Title 1">
             <a:extLst>
               <a:ext uri="{FF2B5EF4-FFF2-40B4-BE49-F238E27FC236}">
-                <a16:creationId xmlns="" xmlns:a16="http://schemas.microsoft.com/office/drawing/2014/main" id="{A8BFE8D1-2656-4D55-B23C-7228FA743196}"/>
+                <a16:creationId xmlns:a16="http://schemas.microsoft.com/office/drawing/2014/main" xmlns="" id="{1A48B704-594D-4CE1-8C3B-5EAC7C5F03A6}"/>
               </a:ext>
             </a:extLst>
           </p:cNvPr>
@@ -7974,6 +7960,195 @@
           <a:p>
             <a:r>
               <a:rPr lang="en-US" dirty="0" smtClean="0"/>
+              <a:t>Query - Formatting</a:t>
+            </a:r>
+            <a:endParaRPr lang="en-CH" dirty="0"/>
+          </a:p>
+        </p:txBody>
+      </p:sp>
+      <p:sp>
+        <p:nvSpPr>
+          <p:cNvPr id="3" name="Content Placeholder 2">
+            <a:extLst>
+              <a:ext uri="{FF2B5EF4-FFF2-40B4-BE49-F238E27FC236}">
+                <a16:creationId xmlns:a16="http://schemas.microsoft.com/office/drawing/2014/main" xmlns="" id="{8ABB42C9-39CD-487D-9BEE-AFC8655570CB}"/>
+              </a:ext>
+            </a:extLst>
+          </p:cNvPr>
+          <p:cNvSpPr>
+            <a:spLocks noGrp="1"/>
+          </p:cNvSpPr>
+          <p:nvPr>
+            <p:ph idx="1"/>
+          </p:nvPr>
+        </p:nvSpPr>
+        <p:spPr/>
+        <p:txBody>
+          <a:bodyPr/>
+          <a:lstStyle/>
+          <a:p>
+            <a:r>
+              <a:rPr lang="en-US" dirty="0"/>
+              <a:t>Show records as traffic lights based on field values.</a:t>
+            </a:r>
+            <a:endParaRPr lang="en-CH" dirty="0"/>
+          </a:p>
+        </p:txBody>
+      </p:sp>
+      <p:pic>
+        <p:nvPicPr>
+          <p:cNvPr id="7" name="Picture 6">
+            <a:extLst>
+              <a:ext uri="{FF2B5EF4-FFF2-40B4-BE49-F238E27FC236}">
+                <a16:creationId xmlns:a16="http://schemas.microsoft.com/office/drawing/2014/main" xmlns="" id="{1F2C98FB-B744-402A-81F8-C360DDFF2473}"/>
+              </a:ext>
+            </a:extLst>
+          </p:cNvPr>
+          <p:cNvPicPr>
+            <a:picLocks noChangeAspect="1"/>
+          </p:cNvPicPr>
+          <p:nvPr/>
+        </p:nvPicPr>
+        <p:blipFill>
+          <a:blip r:embed="rId2"/>
+          <a:stretch>
+            <a:fillRect/>
+          </a:stretch>
+        </p:blipFill>
+        <p:spPr>
+          <a:xfrm>
+            <a:off x="4805341" y="2164338"/>
+            <a:ext cx="6726259" cy="4010023"/>
+          </a:xfrm>
+          <a:prstGeom prst="rect">
+            <a:avLst/>
+          </a:prstGeom>
+        </p:spPr>
+      </p:pic>
+      <p:pic>
+        <p:nvPicPr>
+          <p:cNvPr id="9218" name="Picture 2"/>
+          <p:cNvPicPr>
+            <a:picLocks noChangeAspect="1" noChangeArrowheads="1"/>
+          </p:cNvPicPr>
+          <p:nvPr/>
+        </p:nvPicPr>
+        <p:blipFill>
+          <a:blip r:embed="rId3">
+            <a:extLst>
+              <a:ext uri="{28A0092B-C50C-407E-A947-70E740481C1C}">
+                <a14:useLocalDpi xmlns:a14="http://schemas.microsoft.com/office/drawing/2010/main" val="0"/>
+              </a:ext>
+            </a:extLst>
+          </a:blip>
+          <a:srcRect/>
+          <a:stretch>
+            <a:fillRect/>
+          </a:stretch>
+        </p:blipFill>
+        <p:spPr bwMode="auto">
+          <a:xfrm>
+            <a:off x="687466" y="2164338"/>
+            <a:ext cx="4123872" cy="4010023"/>
+          </a:xfrm>
+          <a:prstGeom prst="rect">
+            <a:avLst/>
+          </a:prstGeom>
+          <a:noFill/>
+          <a:ln>
+            <a:noFill/>
+          </a:ln>
+          <a:effectLst/>
+          <a:extLst>
+            <a:ext uri="{909E8E84-426E-40DD-AFC4-6F175D3DCCD1}">
+              <a14:hiddenFill xmlns:a14="http://schemas.microsoft.com/office/drawing/2010/main">
+                <a:solidFill>
+                  <a:schemeClr val="accent1"/>
+                </a:solidFill>
+              </a14:hiddenFill>
+            </a:ext>
+            <a:ext uri="{91240B29-F687-4F45-9708-019B960494DF}">
+              <a14:hiddenLine xmlns:a14="http://schemas.microsoft.com/office/drawing/2010/main" w="9525">
+                <a:solidFill>
+                  <a:schemeClr val="tx1"/>
+                </a:solidFill>
+                <a:miter lim="800000"/>
+                <a:headEnd/>
+                <a:tailEnd/>
+              </a14:hiddenLine>
+            </a:ext>
+            <a:ext uri="{AF507438-7753-43E0-B8FC-AC1667EBCBE1}">
+              <a14:hiddenEffects xmlns:a14="http://schemas.microsoft.com/office/drawing/2010/main">
+                <a:effectLst>
+                  <a:outerShdw dist="35921" dir="2700000" algn="ctr" rotWithShape="0">
+                    <a:schemeClr val="bg2"/>
+                  </a:outerShdw>
+                </a:effectLst>
+              </a14:hiddenEffects>
+            </a:ext>
+          </a:extLst>
+        </p:spPr>
+      </p:pic>
+    </p:spTree>
+    <p:extLst>
+      <p:ext uri="{BB962C8B-B14F-4D97-AF65-F5344CB8AC3E}">
+        <p14:creationId xmlns:p14="http://schemas.microsoft.com/office/powerpoint/2010/main" val="4235682211"/>
+      </p:ext>
+    </p:extLst>
+  </p:cSld>
+  <p:clrMapOvr>
+    <a:masterClrMapping/>
+  </p:clrMapOvr>
+  <p:timing>
+    <p:tnLst>
+      <p:par>
+        <p:cTn id="1" dur="indefinite" restart="never" nodeType="tmRoot"/>
+      </p:par>
+    </p:tnLst>
+  </p:timing>
+</p:sld>
+</file>
+
+<file path=ppt/slides/slide29.xml><?xml version="1.0" encoding="utf-8"?>
+<p:sld xmlns:a="http://schemas.openxmlformats.org/drawingml/2006/main" xmlns:r="http://schemas.openxmlformats.org/officeDocument/2006/relationships" xmlns:p="http://schemas.openxmlformats.org/presentationml/2006/main">
+  <p:cSld>
+    <p:spTree>
+      <p:nvGrpSpPr>
+        <p:cNvPr id="1" name=""/>
+        <p:cNvGrpSpPr/>
+        <p:nvPr/>
+      </p:nvGrpSpPr>
+      <p:grpSpPr>
+        <a:xfrm>
+          <a:off x="0" y="0"/>
+          <a:ext cx="0" cy="0"/>
+          <a:chOff x="0" y="0"/>
+          <a:chExt cx="0" cy="0"/>
+        </a:xfrm>
+      </p:grpSpPr>
+      <p:sp>
+        <p:nvSpPr>
+          <p:cNvPr id="2" name="Title 1">
+            <a:extLst>
+              <a:ext uri="{FF2B5EF4-FFF2-40B4-BE49-F238E27FC236}">
+                <a16:creationId xmlns:a16="http://schemas.microsoft.com/office/drawing/2014/main" xmlns="" id="{A8BFE8D1-2656-4D55-B23C-7228FA743196}"/>
+              </a:ext>
+            </a:extLst>
+          </p:cNvPr>
+          <p:cNvSpPr>
+            <a:spLocks noGrp="1"/>
+          </p:cNvSpPr>
+          <p:nvPr>
+            <p:ph type="title"/>
+          </p:nvPr>
+        </p:nvSpPr>
+        <p:spPr/>
+        <p:txBody>
+          <a:bodyPr/>
+          <a:lstStyle/>
+          <a:p>
+            <a:r>
+              <a:rPr lang="en-US" dirty="0" smtClean="0"/>
               <a:t>Query - Dashboard </a:t>
             </a:r>
             <a:r>
@@ -7989,7 +8164,7 @@
           <p:cNvPr id="3" name="Content Placeholder 2">
             <a:extLst>
               <a:ext uri="{FF2B5EF4-FFF2-40B4-BE49-F238E27FC236}">
-                <a16:creationId xmlns="" xmlns:a16="http://schemas.microsoft.com/office/drawing/2014/main" id="{0A425075-3083-4C08-9A0E-A1DE3A4D6342}"/>
+                <a16:creationId xmlns:a16="http://schemas.microsoft.com/office/drawing/2014/main" xmlns="" id="{0A425075-3083-4C08-9A0E-A1DE3A4D6342}"/>
               </a:ext>
             </a:extLst>
           </p:cNvPr>
@@ -8020,7 +8195,7 @@
           <p:cNvPr id="7" name="Picture 6">
             <a:extLst>
               <a:ext uri="{FF2B5EF4-FFF2-40B4-BE49-F238E27FC236}">
-                <a16:creationId xmlns="" xmlns:a16="http://schemas.microsoft.com/office/drawing/2014/main" id="{1F5A427E-4B35-421D-8621-525DBD1FC382}"/>
+                <a16:creationId xmlns:a16="http://schemas.microsoft.com/office/drawing/2014/main" xmlns="" id="{1F5A427E-4B35-421D-8621-525DBD1FC382}"/>
               </a:ext>
             </a:extLst>
           </p:cNvPr>
@@ -8065,352 +8240,6 @@
 </p:sld>
 </file>
 
-<file path=ppt/slides/slide29.xml><?xml version="1.0" encoding="utf-8"?>
-<p:sld xmlns:a="http://schemas.openxmlformats.org/drawingml/2006/main" xmlns:r="http://schemas.openxmlformats.org/officeDocument/2006/relationships" xmlns:p="http://schemas.openxmlformats.org/presentationml/2006/main">
-  <p:cSld>
-    <p:spTree>
-      <p:nvGrpSpPr>
-        <p:cNvPr id="1" name=""/>
-        <p:cNvGrpSpPr/>
-        <p:nvPr/>
-      </p:nvGrpSpPr>
-      <p:grpSpPr>
-        <a:xfrm>
-          <a:off x="0" y="0"/>
-          <a:ext cx="0" cy="0"/>
-          <a:chOff x="0" y="0"/>
-          <a:chExt cx="0" cy="0"/>
-        </a:xfrm>
-      </p:grpSpPr>
-      <p:sp>
-        <p:nvSpPr>
-          <p:cNvPr id="2" name="Titel 1"/>
-          <p:cNvSpPr>
-            <a:spLocks noGrp="1"/>
-          </p:cNvSpPr>
-          <p:nvPr>
-            <p:ph type="title"/>
-          </p:nvPr>
-        </p:nvSpPr>
-        <p:spPr/>
-        <p:txBody>
-          <a:bodyPr/>
-          <a:lstStyle/>
-          <a:p>
-            <a:r>
-              <a:rPr lang="en-US" dirty="0" smtClean="0"/>
-              <a:t>Query – Status Map for Mass Display </a:t>
-            </a:r>
-            <a:endParaRPr lang="de-DE" dirty="0"/>
-          </a:p>
-        </p:txBody>
-      </p:sp>
-      <p:sp>
-        <p:nvSpPr>
-          <p:cNvPr id="3" name="Inhaltsplatzhalter 2"/>
-          <p:cNvSpPr>
-            <a:spLocks noGrp="1"/>
-          </p:cNvSpPr>
-          <p:nvPr>
-            <p:ph idx="1"/>
-          </p:nvPr>
-        </p:nvSpPr>
-        <p:spPr>
-          <a:xfrm>
-            <a:off x="838200" y="1157467"/>
-            <a:ext cx="10581640" cy="1620453"/>
-          </a:xfrm>
-        </p:spPr>
-        <p:txBody>
-          <a:bodyPr>
-            <a:normAutofit lnSpcReduction="10000"/>
-          </a:bodyPr>
-          <a:lstStyle/>
-          <a:p>
-            <a:r>
-              <a:rPr lang="en-US" dirty="0" smtClean="0"/>
-              <a:t>Use the query feature to mass display thousands of items, sort them with a simple command and get full visibility of the status of an entire system, add custom links for drilldown into detailed views(below 10’000 squares rendered in 2 sec):</a:t>
-            </a:r>
-            <a:endParaRPr lang="de-DE" dirty="0"/>
-          </a:p>
-        </p:txBody>
-      </p:sp>
-      <p:pic>
-        <p:nvPicPr>
-          <p:cNvPr id="3074" name="Picture 2"/>
-          <p:cNvPicPr>
-            <a:picLocks noChangeAspect="1" noChangeArrowheads="1"/>
-          </p:cNvPicPr>
-          <p:nvPr/>
-        </p:nvPicPr>
-        <p:blipFill>
-          <a:blip r:embed="rId2">
-            <a:extLst>
-              <a:ext uri="{28A0092B-C50C-407E-A947-70E740481C1C}">
-                <a14:useLocalDpi xmlns:a14="http://schemas.microsoft.com/office/drawing/2010/main" val="0"/>
-              </a:ext>
-            </a:extLst>
-          </a:blip>
-          <a:srcRect/>
-          <a:stretch>
-            <a:fillRect/>
-          </a:stretch>
-        </p:blipFill>
-        <p:spPr bwMode="auto">
-          <a:xfrm>
-            <a:off x="352425" y="2791546"/>
-            <a:ext cx="3204948" cy="1824355"/>
-          </a:xfrm>
-          <a:prstGeom prst="rect">
-            <a:avLst/>
-          </a:prstGeom>
-          <a:noFill/>
-          <a:ln>
-            <a:noFill/>
-          </a:ln>
-          <a:effectLst/>
-          <a:extLst>
-            <a:ext uri="{909E8E84-426E-40DD-AFC4-6F175D3DCCD1}">
-              <a14:hiddenFill xmlns:a14="http://schemas.microsoft.com/office/drawing/2010/main">
-                <a:solidFill>
-                  <a:schemeClr val="accent1"/>
-                </a:solidFill>
-              </a14:hiddenFill>
-            </a:ext>
-            <a:ext uri="{91240B29-F687-4F45-9708-019B960494DF}">
-              <a14:hiddenLine xmlns:a14="http://schemas.microsoft.com/office/drawing/2010/main" w="9525">
-                <a:solidFill>
-                  <a:schemeClr val="tx1"/>
-                </a:solidFill>
-                <a:miter lim="800000"/>
-                <a:headEnd/>
-                <a:tailEnd/>
-              </a14:hiddenLine>
-            </a:ext>
-            <a:ext uri="{AF507438-7753-43E0-B8FC-AC1667EBCBE1}">
-              <a14:hiddenEffects xmlns:a14="http://schemas.microsoft.com/office/drawing/2010/main">
-                <a:effectLst>
-                  <a:outerShdw dist="35921" dir="2700000" algn="ctr" rotWithShape="0">
-                    <a:schemeClr val="bg2"/>
-                  </a:outerShdw>
-                </a:effectLst>
-              </a14:hiddenEffects>
-            </a:ext>
-          </a:extLst>
-        </p:spPr>
-      </p:pic>
-      <p:pic>
-        <p:nvPicPr>
-          <p:cNvPr id="3076" name="Picture 4"/>
-          <p:cNvPicPr>
-            <a:picLocks noChangeAspect="1" noChangeArrowheads="1"/>
-          </p:cNvPicPr>
-          <p:nvPr/>
-        </p:nvPicPr>
-        <p:blipFill>
-          <a:blip r:embed="rId3">
-            <a:extLst>
-              <a:ext uri="{28A0092B-C50C-407E-A947-70E740481C1C}">
-                <a14:useLocalDpi xmlns:a14="http://schemas.microsoft.com/office/drawing/2010/main" val="0"/>
-              </a:ext>
-            </a:extLst>
-          </a:blip>
-          <a:srcRect/>
-          <a:stretch>
-            <a:fillRect/>
-          </a:stretch>
-        </p:blipFill>
-        <p:spPr bwMode="auto">
-          <a:xfrm>
-            <a:off x="3607593" y="2777921"/>
-            <a:ext cx="8292765" cy="1814830"/>
-          </a:xfrm>
-          <a:prstGeom prst="rect">
-            <a:avLst/>
-          </a:prstGeom>
-          <a:noFill/>
-          <a:ln>
-            <a:noFill/>
-          </a:ln>
-          <a:effectLst/>
-          <a:extLst>
-            <a:ext uri="{909E8E84-426E-40DD-AFC4-6F175D3DCCD1}">
-              <a14:hiddenFill xmlns:a14="http://schemas.microsoft.com/office/drawing/2010/main">
-                <a:solidFill>
-                  <a:schemeClr val="accent1"/>
-                </a:solidFill>
-              </a14:hiddenFill>
-            </a:ext>
-            <a:ext uri="{91240B29-F687-4F45-9708-019B960494DF}">
-              <a14:hiddenLine xmlns:a14="http://schemas.microsoft.com/office/drawing/2010/main" w="9525">
-                <a:solidFill>
-                  <a:schemeClr val="tx1"/>
-                </a:solidFill>
-                <a:miter lim="800000"/>
-                <a:headEnd/>
-                <a:tailEnd/>
-              </a14:hiddenLine>
-            </a:ext>
-            <a:ext uri="{AF507438-7753-43E0-B8FC-AC1667EBCBE1}">
-              <a14:hiddenEffects xmlns:a14="http://schemas.microsoft.com/office/drawing/2010/main">
-                <a:effectLst>
-                  <a:outerShdw dist="35921" dir="2700000" algn="ctr" rotWithShape="0">
-                    <a:schemeClr val="bg2"/>
-                  </a:outerShdw>
-                </a:effectLst>
-              </a14:hiddenEffects>
-            </a:ext>
-          </a:extLst>
-        </p:spPr>
-      </p:pic>
-      <p:pic>
-        <p:nvPicPr>
-          <p:cNvPr id="3077" name="Picture 5"/>
-          <p:cNvPicPr>
-            <a:picLocks noChangeAspect="1" noChangeArrowheads="1"/>
-          </p:cNvPicPr>
-          <p:nvPr/>
-        </p:nvPicPr>
-        <p:blipFill>
-          <a:blip r:embed="rId4">
-            <a:extLst>
-              <a:ext uri="{28A0092B-C50C-407E-A947-70E740481C1C}">
-                <a14:useLocalDpi xmlns:a14="http://schemas.microsoft.com/office/drawing/2010/main" val="0"/>
-              </a:ext>
-            </a:extLst>
-          </a:blip>
-          <a:srcRect/>
-          <a:stretch>
-            <a:fillRect/>
-          </a:stretch>
-        </p:blipFill>
-        <p:spPr bwMode="auto">
-          <a:xfrm>
-            <a:off x="364000" y="4780537"/>
-            <a:ext cx="3173888" cy="1909637"/>
-          </a:xfrm>
-          <a:prstGeom prst="rect">
-            <a:avLst/>
-          </a:prstGeom>
-          <a:noFill/>
-          <a:ln>
-            <a:noFill/>
-          </a:ln>
-          <a:effectLst/>
-          <a:extLst>
-            <a:ext uri="{909E8E84-426E-40DD-AFC4-6F175D3DCCD1}">
-              <a14:hiddenFill xmlns:a14="http://schemas.microsoft.com/office/drawing/2010/main">
-                <a:solidFill>
-                  <a:schemeClr val="accent1"/>
-                </a:solidFill>
-              </a14:hiddenFill>
-            </a:ext>
-            <a:ext uri="{91240B29-F687-4F45-9708-019B960494DF}">
-              <a14:hiddenLine xmlns:a14="http://schemas.microsoft.com/office/drawing/2010/main" w="9525">
-                <a:solidFill>
-                  <a:schemeClr val="tx1"/>
-                </a:solidFill>
-                <a:miter lim="800000"/>
-                <a:headEnd/>
-                <a:tailEnd/>
-              </a14:hiddenLine>
-            </a:ext>
-            <a:ext uri="{AF507438-7753-43E0-B8FC-AC1667EBCBE1}">
-              <a14:hiddenEffects xmlns:a14="http://schemas.microsoft.com/office/drawing/2010/main">
-                <a:effectLst>
-                  <a:outerShdw dist="35921" dir="2700000" algn="ctr" rotWithShape="0">
-                    <a:schemeClr val="bg2"/>
-                  </a:outerShdw>
-                </a:effectLst>
-              </a14:hiddenEffects>
-            </a:ext>
-          </a:extLst>
-        </p:spPr>
-      </p:pic>
-      <p:pic>
-        <p:nvPicPr>
-          <p:cNvPr id="3078" name="Picture 6"/>
-          <p:cNvPicPr>
-            <a:picLocks noChangeAspect="1" noChangeArrowheads="1"/>
-          </p:cNvPicPr>
-          <p:nvPr/>
-        </p:nvPicPr>
-        <p:blipFill>
-          <a:blip r:embed="rId5">
-            <a:extLst>
-              <a:ext uri="{28A0092B-C50C-407E-A947-70E740481C1C}">
-                <a14:useLocalDpi xmlns:a14="http://schemas.microsoft.com/office/drawing/2010/main" val="0"/>
-              </a:ext>
-            </a:extLst>
-          </a:blip>
-          <a:srcRect/>
-          <a:stretch>
-            <a:fillRect/>
-          </a:stretch>
-        </p:blipFill>
-        <p:spPr bwMode="auto">
-          <a:xfrm>
-            <a:off x="3642318" y="4826837"/>
-            <a:ext cx="8258040" cy="1803171"/>
-          </a:xfrm>
-          <a:prstGeom prst="rect">
-            <a:avLst/>
-          </a:prstGeom>
-          <a:noFill/>
-          <a:ln>
-            <a:noFill/>
-          </a:ln>
-          <a:effectLst/>
-          <a:extLst>
-            <a:ext uri="{909E8E84-426E-40DD-AFC4-6F175D3DCCD1}">
-              <a14:hiddenFill xmlns:a14="http://schemas.microsoft.com/office/drawing/2010/main">
-                <a:solidFill>
-                  <a:schemeClr val="accent1"/>
-                </a:solidFill>
-              </a14:hiddenFill>
-            </a:ext>
-            <a:ext uri="{91240B29-F687-4F45-9708-019B960494DF}">
-              <a14:hiddenLine xmlns:a14="http://schemas.microsoft.com/office/drawing/2010/main" w="9525">
-                <a:solidFill>
-                  <a:schemeClr val="tx1"/>
-                </a:solidFill>
-                <a:miter lim="800000"/>
-                <a:headEnd/>
-                <a:tailEnd/>
-              </a14:hiddenLine>
-            </a:ext>
-            <a:ext uri="{AF507438-7753-43E0-B8FC-AC1667EBCBE1}">
-              <a14:hiddenEffects xmlns:a14="http://schemas.microsoft.com/office/drawing/2010/main">
-                <a:effectLst>
-                  <a:outerShdw dist="35921" dir="2700000" algn="ctr" rotWithShape="0">
-                    <a:schemeClr val="bg2"/>
-                  </a:outerShdw>
-                </a:effectLst>
-              </a14:hiddenEffects>
-            </a:ext>
-          </a:extLst>
-        </p:spPr>
-      </p:pic>
-    </p:spTree>
-    <p:extLst>
-      <p:ext uri="{BB962C8B-B14F-4D97-AF65-F5344CB8AC3E}">
-        <p14:creationId xmlns:p14="http://schemas.microsoft.com/office/powerpoint/2010/main" val="3076715510"/>
-      </p:ext>
-    </p:extLst>
-  </p:cSld>
-  <p:clrMapOvr>
-    <a:masterClrMapping/>
-  </p:clrMapOvr>
-  <p:timing>
-    <p:tnLst>
-      <p:par>
-        <p:cTn id="1" dur="indefinite" restart="never" nodeType="tmRoot"/>
-      </p:par>
-    </p:tnLst>
-  </p:timing>
-</p:sld>
-</file>
-
 <file path=ppt/slides/slide3.xml><?xml version="1.0" encoding="utf-8"?>
 <p:sld xmlns:a="http://schemas.openxmlformats.org/drawingml/2006/main" xmlns:r="http://schemas.openxmlformats.org/officeDocument/2006/relationships" xmlns:p="http://schemas.openxmlformats.org/presentationml/2006/main">
   <p:cSld>
@@ -8510,7 +8339,7 @@
           <a:p>
             <a:r>
               <a:rPr lang="en-US" dirty="0" smtClean="0"/>
-              <a:t>Query – Compare Data</a:t>
+              <a:t>Query – Status Map for Mass Display </a:t>
             </a:r>
             <a:endParaRPr lang="de-DE" dirty="0"/>
           </a:p>
@@ -8526,16 +8355,21 @@
             <p:ph idx="1"/>
           </p:nvPr>
         </p:nvSpPr>
-        <p:spPr/>
+        <p:spPr>
+          <a:xfrm>
+            <a:off x="838200" y="1157467"/>
+            <a:ext cx="10581640" cy="1620453"/>
+          </a:xfrm>
+        </p:spPr>
         <p:txBody>
           <a:bodyPr>
-            <a:normAutofit fontScale="92500" lnSpcReduction="10000"/>
+            <a:normAutofit lnSpcReduction="10000"/>
           </a:bodyPr>
           <a:lstStyle/>
           <a:p>
             <a:r>
               <a:rPr lang="en-US" dirty="0" smtClean="0"/>
-              <a:t>Use the query language to compare similar data from two different sources or two different timeframes:</a:t>
+              <a:t>Use the query feature to mass display thousands of items, sort them with a simple command and get full visibility of the status of an entire system, add custom links for drilldown into detailed views(below 10’000 squares rendered in 2 sec):</a:t>
             </a:r>
             <a:endParaRPr lang="de-DE" dirty="0"/>
           </a:p>
@@ -8543,7 +8377,7 @@
       </p:sp>
       <p:pic>
         <p:nvPicPr>
-          <p:cNvPr id="1027" name="Picture 3"/>
+          <p:cNvPr id="3074" name="Picture 2"/>
           <p:cNvPicPr>
             <a:picLocks noChangeAspect="1" noChangeArrowheads="1"/>
           </p:cNvPicPr>
@@ -8564,8 +8398,8 @@
         </p:blipFill>
         <p:spPr bwMode="auto">
           <a:xfrm>
-            <a:off x="344170" y="2288540"/>
-            <a:ext cx="11296790" cy="3990340"/>
+            <a:off x="352425" y="2791546"/>
+            <a:ext cx="3204948" cy="1824355"/>
           </a:xfrm>
           <a:prstGeom prst="rect">
             <a:avLst/>
@@ -8605,10 +8439,202 @@
           </a:extLst>
         </p:spPr>
       </p:pic>
+      <p:pic>
+        <p:nvPicPr>
+          <p:cNvPr id="3076" name="Picture 4"/>
+          <p:cNvPicPr>
+            <a:picLocks noChangeAspect="1" noChangeArrowheads="1"/>
+          </p:cNvPicPr>
+          <p:nvPr/>
+        </p:nvPicPr>
+        <p:blipFill>
+          <a:blip r:embed="rId3">
+            <a:extLst>
+              <a:ext uri="{28A0092B-C50C-407E-A947-70E740481C1C}">
+                <a14:useLocalDpi xmlns:a14="http://schemas.microsoft.com/office/drawing/2010/main" val="0"/>
+              </a:ext>
+            </a:extLst>
+          </a:blip>
+          <a:srcRect/>
+          <a:stretch>
+            <a:fillRect/>
+          </a:stretch>
+        </p:blipFill>
+        <p:spPr bwMode="auto">
+          <a:xfrm>
+            <a:off x="3607593" y="2777921"/>
+            <a:ext cx="8292765" cy="1814830"/>
+          </a:xfrm>
+          <a:prstGeom prst="rect">
+            <a:avLst/>
+          </a:prstGeom>
+          <a:noFill/>
+          <a:ln>
+            <a:noFill/>
+          </a:ln>
+          <a:effectLst/>
+          <a:extLst>
+            <a:ext uri="{909E8E84-426E-40DD-AFC4-6F175D3DCCD1}">
+              <a14:hiddenFill xmlns:a14="http://schemas.microsoft.com/office/drawing/2010/main">
+                <a:solidFill>
+                  <a:schemeClr val="accent1"/>
+                </a:solidFill>
+              </a14:hiddenFill>
+            </a:ext>
+            <a:ext uri="{91240B29-F687-4F45-9708-019B960494DF}">
+              <a14:hiddenLine xmlns:a14="http://schemas.microsoft.com/office/drawing/2010/main" w="9525">
+                <a:solidFill>
+                  <a:schemeClr val="tx1"/>
+                </a:solidFill>
+                <a:miter lim="800000"/>
+                <a:headEnd/>
+                <a:tailEnd/>
+              </a14:hiddenLine>
+            </a:ext>
+            <a:ext uri="{AF507438-7753-43E0-B8FC-AC1667EBCBE1}">
+              <a14:hiddenEffects xmlns:a14="http://schemas.microsoft.com/office/drawing/2010/main">
+                <a:effectLst>
+                  <a:outerShdw dist="35921" dir="2700000" algn="ctr" rotWithShape="0">
+                    <a:schemeClr val="bg2"/>
+                  </a:outerShdw>
+                </a:effectLst>
+              </a14:hiddenEffects>
+            </a:ext>
+          </a:extLst>
+        </p:spPr>
+      </p:pic>
+      <p:pic>
+        <p:nvPicPr>
+          <p:cNvPr id="3077" name="Picture 5"/>
+          <p:cNvPicPr>
+            <a:picLocks noChangeAspect="1" noChangeArrowheads="1"/>
+          </p:cNvPicPr>
+          <p:nvPr/>
+        </p:nvPicPr>
+        <p:blipFill>
+          <a:blip r:embed="rId4">
+            <a:extLst>
+              <a:ext uri="{28A0092B-C50C-407E-A947-70E740481C1C}">
+                <a14:useLocalDpi xmlns:a14="http://schemas.microsoft.com/office/drawing/2010/main" val="0"/>
+              </a:ext>
+            </a:extLst>
+          </a:blip>
+          <a:srcRect/>
+          <a:stretch>
+            <a:fillRect/>
+          </a:stretch>
+        </p:blipFill>
+        <p:spPr bwMode="auto">
+          <a:xfrm>
+            <a:off x="364000" y="4780537"/>
+            <a:ext cx="3173888" cy="1909637"/>
+          </a:xfrm>
+          <a:prstGeom prst="rect">
+            <a:avLst/>
+          </a:prstGeom>
+          <a:noFill/>
+          <a:ln>
+            <a:noFill/>
+          </a:ln>
+          <a:effectLst/>
+          <a:extLst>
+            <a:ext uri="{909E8E84-426E-40DD-AFC4-6F175D3DCCD1}">
+              <a14:hiddenFill xmlns:a14="http://schemas.microsoft.com/office/drawing/2010/main">
+                <a:solidFill>
+                  <a:schemeClr val="accent1"/>
+                </a:solidFill>
+              </a14:hiddenFill>
+            </a:ext>
+            <a:ext uri="{91240B29-F687-4F45-9708-019B960494DF}">
+              <a14:hiddenLine xmlns:a14="http://schemas.microsoft.com/office/drawing/2010/main" w="9525">
+                <a:solidFill>
+                  <a:schemeClr val="tx1"/>
+                </a:solidFill>
+                <a:miter lim="800000"/>
+                <a:headEnd/>
+                <a:tailEnd/>
+              </a14:hiddenLine>
+            </a:ext>
+            <a:ext uri="{AF507438-7753-43E0-B8FC-AC1667EBCBE1}">
+              <a14:hiddenEffects xmlns:a14="http://schemas.microsoft.com/office/drawing/2010/main">
+                <a:effectLst>
+                  <a:outerShdw dist="35921" dir="2700000" algn="ctr" rotWithShape="0">
+                    <a:schemeClr val="bg2"/>
+                  </a:outerShdw>
+                </a:effectLst>
+              </a14:hiddenEffects>
+            </a:ext>
+          </a:extLst>
+        </p:spPr>
+      </p:pic>
+      <p:pic>
+        <p:nvPicPr>
+          <p:cNvPr id="3078" name="Picture 6"/>
+          <p:cNvPicPr>
+            <a:picLocks noChangeAspect="1" noChangeArrowheads="1"/>
+          </p:cNvPicPr>
+          <p:nvPr/>
+        </p:nvPicPr>
+        <p:blipFill>
+          <a:blip r:embed="rId5">
+            <a:extLst>
+              <a:ext uri="{28A0092B-C50C-407E-A947-70E740481C1C}">
+                <a14:useLocalDpi xmlns:a14="http://schemas.microsoft.com/office/drawing/2010/main" val="0"/>
+              </a:ext>
+            </a:extLst>
+          </a:blip>
+          <a:srcRect/>
+          <a:stretch>
+            <a:fillRect/>
+          </a:stretch>
+        </p:blipFill>
+        <p:spPr bwMode="auto">
+          <a:xfrm>
+            <a:off x="3642318" y="4826837"/>
+            <a:ext cx="8258040" cy="1803171"/>
+          </a:xfrm>
+          <a:prstGeom prst="rect">
+            <a:avLst/>
+          </a:prstGeom>
+          <a:noFill/>
+          <a:ln>
+            <a:noFill/>
+          </a:ln>
+          <a:effectLst/>
+          <a:extLst>
+            <a:ext uri="{909E8E84-426E-40DD-AFC4-6F175D3DCCD1}">
+              <a14:hiddenFill xmlns:a14="http://schemas.microsoft.com/office/drawing/2010/main">
+                <a:solidFill>
+                  <a:schemeClr val="accent1"/>
+                </a:solidFill>
+              </a14:hiddenFill>
+            </a:ext>
+            <a:ext uri="{91240B29-F687-4F45-9708-019B960494DF}">
+              <a14:hiddenLine xmlns:a14="http://schemas.microsoft.com/office/drawing/2010/main" w="9525">
+                <a:solidFill>
+                  <a:schemeClr val="tx1"/>
+                </a:solidFill>
+                <a:miter lim="800000"/>
+                <a:headEnd/>
+                <a:tailEnd/>
+              </a14:hiddenLine>
+            </a:ext>
+            <a:ext uri="{AF507438-7753-43E0-B8FC-AC1667EBCBE1}">
+              <a14:hiddenEffects xmlns:a14="http://schemas.microsoft.com/office/drawing/2010/main">
+                <a:effectLst>
+                  <a:outerShdw dist="35921" dir="2700000" algn="ctr" rotWithShape="0">
+                    <a:schemeClr val="bg2"/>
+                  </a:outerShdw>
+                </a:effectLst>
+              </a14:hiddenEffects>
+            </a:ext>
+          </a:extLst>
+        </p:spPr>
+      </p:pic>
     </p:spTree>
     <p:extLst>
       <p:ext uri="{BB962C8B-B14F-4D97-AF65-F5344CB8AC3E}">
-        <p14:creationId xmlns:p14="http://schemas.microsoft.com/office/powerpoint/2010/main" val="4280751305"/>
+        <p14:creationId xmlns:p14="http://schemas.microsoft.com/office/powerpoint/2010/main" val="3076715510"/>
       </p:ext>
     </p:extLst>
   </p:cSld>
@@ -8659,15 +8685,7 @@
           <a:p>
             <a:r>
               <a:rPr lang="en-US" dirty="0" smtClean="0"/>
-              <a:t>Query – </a:t>
-            </a:r>
-            <a:r>
-              <a:rPr lang="en-US" dirty="0" err="1" smtClean="0"/>
-              <a:t>Subquerying</a:t>
-            </a:r>
-            <a:r>
-              <a:rPr lang="en-US" dirty="0" smtClean="0"/>
-              <a:t> Data</a:t>
+              <a:t>Query – Compare Data</a:t>
             </a:r>
             <a:endParaRPr lang="de-DE" dirty="0"/>
           </a:p>
@@ -8683,12 +8701,7 @@
             <p:ph idx="1"/>
           </p:nvPr>
         </p:nvSpPr>
-        <p:spPr>
-          <a:xfrm>
-            <a:off x="768752" y="1216629"/>
-            <a:ext cx="4424680" cy="1412239"/>
-          </a:xfrm>
-        </p:spPr>
+        <p:spPr/>
         <p:txBody>
           <a:bodyPr>
             <a:normAutofit fontScale="92500" lnSpcReduction="10000"/>
@@ -8697,15 +8710,7 @@
           <a:p>
             <a:r>
               <a:rPr lang="en-US" dirty="0" smtClean="0"/>
-              <a:t>The </a:t>
-            </a:r>
-            <a:r>
-              <a:rPr lang="en-US" dirty="0" err="1" smtClean="0"/>
-              <a:t>subquery</a:t>
-            </a:r>
-            <a:r>
-              <a:rPr lang="en-US" dirty="0" smtClean="0"/>
-              <a:t> function allows you to query additional data from another data source to enhance your data:</a:t>
+              <a:t>Use the query language to compare similar data from two different sources or two different timeframes:</a:t>
             </a:r>
             <a:endParaRPr lang="de-DE" dirty="0"/>
           </a:p>
@@ -8713,7 +8718,7 @@
       </p:sp>
       <p:pic>
         <p:nvPicPr>
-          <p:cNvPr id="2050" name="Picture 2"/>
+          <p:cNvPr id="1027" name="Picture 3"/>
           <p:cNvPicPr>
             <a:picLocks noChangeAspect="1" noChangeArrowheads="1"/>
           </p:cNvPicPr>
@@ -8734,8 +8739,8 @@
         </p:blipFill>
         <p:spPr bwMode="auto">
           <a:xfrm>
-            <a:off x="5385055" y="1157468"/>
-            <a:ext cx="6525895" cy="5494910"/>
+            <a:off x="344170" y="2288540"/>
+            <a:ext cx="11296790" cy="3990340"/>
           </a:xfrm>
           <a:prstGeom prst="rect">
             <a:avLst/>
@@ -8778,7 +8783,7 @@
     </p:spTree>
     <p:extLst>
       <p:ext uri="{BB962C8B-B14F-4D97-AF65-F5344CB8AC3E}">
-        <p14:creationId xmlns:p14="http://schemas.microsoft.com/office/powerpoint/2010/main" val="2697591186"/>
+        <p14:creationId xmlns:p14="http://schemas.microsoft.com/office/powerpoint/2010/main" val="4280751305"/>
       </p:ext>
     </p:extLst>
   </p:cSld>
@@ -8829,7 +8834,15 @@
           <a:p>
             <a:r>
               <a:rPr lang="en-US" dirty="0" smtClean="0"/>
-              <a:t>Query – Object and Array Support</a:t>
+              <a:t>Query – </a:t>
+            </a:r>
+            <a:r>
+              <a:rPr lang="en-US" dirty="0" err="1" smtClean="0"/>
+              <a:t>Subquerying</a:t>
+            </a:r>
+            <a:r>
+              <a:rPr lang="en-US" dirty="0" smtClean="0"/>
+              <a:t> Data</a:t>
             </a:r>
             <a:endParaRPr lang="de-DE" dirty="0"/>
           </a:p>
@@ -8845,7 +8858,12 @@
             <p:ph idx="1"/>
           </p:nvPr>
         </p:nvSpPr>
-        <p:spPr/>
+        <p:spPr>
+          <a:xfrm>
+            <a:off x="768752" y="1216629"/>
+            <a:ext cx="4424680" cy="1412239"/>
+          </a:xfrm>
+        </p:spPr>
         <p:txBody>
           <a:bodyPr>
             <a:normAutofit fontScale="92500" lnSpcReduction="10000"/>
@@ -8854,15 +8872,15 @@
           <a:p>
             <a:r>
               <a:rPr lang="en-US" dirty="0" smtClean="0"/>
-              <a:t>The query language supports objects and arrays, creating, accessing and </a:t>
+              <a:t>The </a:t>
+            </a:r>
+            <a:r>
+              <a:rPr lang="en-US" dirty="0" err="1" smtClean="0"/>
+              <a:t>subquery</a:t>
             </a:r>
             <a:r>
               <a:rPr lang="en-US" dirty="0" smtClean="0"/>
-              <a:t>manipulation </a:t>
-            </a:r>
-            <a:r>
-              <a:rPr lang="en-US" dirty="0" smtClean="0"/>
-              <a:t>of the data included in them:</a:t>
+              <a:t> function allows you to query additional data from another data source to enhance your data:</a:t>
             </a:r>
             <a:endParaRPr lang="de-DE" dirty="0"/>
           </a:p>
@@ -8870,7 +8888,7 @@
       </p:sp>
       <p:pic>
         <p:nvPicPr>
-          <p:cNvPr id="5122" name="Picture 2"/>
+          <p:cNvPr id="2050" name="Picture 2"/>
           <p:cNvPicPr>
             <a:picLocks noChangeAspect="1" noChangeArrowheads="1"/>
           </p:cNvPicPr>
@@ -8891,8 +8909,8 @@
         </p:blipFill>
         <p:spPr bwMode="auto">
           <a:xfrm>
-            <a:off x="259930" y="2144555"/>
-            <a:ext cx="5048250" cy="3362325"/>
+            <a:off x="5385055" y="1157468"/>
+            <a:ext cx="6525895" cy="5494910"/>
           </a:xfrm>
           <a:prstGeom prst="rect">
             <a:avLst/>
@@ -8932,74 +8950,10 @@
           </a:extLst>
         </p:spPr>
       </p:pic>
-      <p:pic>
-        <p:nvPicPr>
-          <p:cNvPr id="5124" name="Picture 4"/>
-          <p:cNvPicPr>
-            <a:picLocks noChangeAspect="1" noChangeArrowheads="1"/>
-          </p:cNvPicPr>
-          <p:nvPr/>
-        </p:nvPicPr>
-        <p:blipFill>
-          <a:blip r:embed="rId3">
-            <a:extLst>
-              <a:ext uri="{28A0092B-C50C-407E-A947-70E740481C1C}">
-                <a14:useLocalDpi xmlns:a14="http://schemas.microsoft.com/office/drawing/2010/main" val="0"/>
-              </a:ext>
-            </a:extLst>
-          </a:blip>
-          <a:srcRect/>
-          <a:stretch>
-            <a:fillRect/>
-          </a:stretch>
-        </p:blipFill>
-        <p:spPr bwMode="auto">
-          <a:xfrm>
-            <a:off x="5331330" y="2144556"/>
-            <a:ext cx="6776518" cy="5494736"/>
-          </a:xfrm>
-          <a:prstGeom prst="rect">
-            <a:avLst/>
-          </a:prstGeom>
-          <a:noFill/>
-          <a:ln>
-            <a:noFill/>
-          </a:ln>
-          <a:effectLst/>
-          <a:extLst>
-            <a:ext uri="{909E8E84-426E-40DD-AFC4-6F175D3DCCD1}">
-              <a14:hiddenFill xmlns:a14="http://schemas.microsoft.com/office/drawing/2010/main">
-                <a:solidFill>
-                  <a:schemeClr val="accent1"/>
-                </a:solidFill>
-              </a14:hiddenFill>
-            </a:ext>
-            <a:ext uri="{91240B29-F687-4F45-9708-019B960494DF}">
-              <a14:hiddenLine xmlns:a14="http://schemas.microsoft.com/office/drawing/2010/main" w="9525">
-                <a:solidFill>
-                  <a:schemeClr val="tx1"/>
-                </a:solidFill>
-                <a:miter lim="800000"/>
-                <a:headEnd/>
-                <a:tailEnd/>
-              </a14:hiddenLine>
-            </a:ext>
-            <a:ext uri="{AF507438-7753-43E0-B8FC-AC1667EBCBE1}">
-              <a14:hiddenEffects xmlns:a14="http://schemas.microsoft.com/office/drawing/2010/main">
-                <a:effectLst>
-                  <a:outerShdw dist="35921" dir="2700000" algn="ctr" rotWithShape="0">
-                    <a:schemeClr val="bg2"/>
-                  </a:outerShdw>
-                </a:effectLst>
-              </a14:hiddenEffects>
-            </a:ext>
-          </a:extLst>
-        </p:spPr>
-      </p:pic>
     </p:spTree>
     <p:extLst>
       <p:ext uri="{BB962C8B-B14F-4D97-AF65-F5344CB8AC3E}">
-        <p14:creationId xmlns:p14="http://schemas.microsoft.com/office/powerpoint/2010/main" val="391116196"/>
+        <p14:creationId xmlns:p14="http://schemas.microsoft.com/office/powerpoint/2010/main" val="2697591186"/>
       </p:ext>
     </p:extLst>
   </p:cSld>
@@ -9050,11 +9004,220 @@
           <a:p>
             <a:r>
               <a:rPr lang="en-US" dirty="0" smtClean="0"/>
-              <a:t>Query – </a:t>
-            </a:r>
+              <a:t>Query – Object and Array Support</a:t>
+            </a:r>
+            <a:endParaRPr lang="de-DE" dirty="0"/>
+          </a:p>
+        </p:txBody>
+      </p:sp>
+      <p:sp>
+        <p:nvSpPr>
+          <p:cNvPr id="3" name="Inhaltsplatzhalter 2"/>
+          <p:cNvSpPr>
+            <a:spLocks noGrp="1"/>
+          </p:cNvSpPr>
+          <p:nvPr>
+            <p:ph idx="1"/>
+          </p:nvPr>
+        </p:nvSpPr>
+        <p:spPr/>
+        <p:txBody>
+          <a:bodyPr>
+            <a:normAutofit fontScale="92500" lnSpcReduction="10000"/>
+          </a:bodyPr>
+          <a:lstStyle/>
+          <a:p>
             <a:r>
               <a:rPr lang="en-US" dirty="0" smtClean="0"/>
-              <a:t>Multi Chart and Chart Details</a:t>
+              <a:t>The query language supports objects and arrays, creating, accessing and manipulation of the data included in them:</a:t>
+            </a:r>
+            <a:endParaRPr lang="de-DE" dirty="0"/>
+          </a:p>
+        </p:txBody>
+      </p:sp>
+      <p:pic>
+        <p:nvPicPr>
+          <p:cNvPr id="5122" name="Picture 2"/>
+          <p:cNvPicPr>
+            <a:picLocks noChangeAspect="1" noChangeArrowheads="1"/>
+          </p:cNvPicPr>
+          <p:nvPr/>
+        </p:nvPicPr>
+        <p:blipFill>
+          <a:blip r:embed="rId2">
+            <a:extLst>
+              <a:ext uri="{28A0092B-C50C-407E-A947-70E740481C1C}">
+                <a14:useLocalDpi xmlns:a14="http://schemas.microsoft.com/office/drawing/2010/main" val="0"/>
+              </a:ext>
+            </a:extLst>
+          </a:blip>
+          <a:srcRect/>
+          <a:stretch>
+            <a:fillRect/>
+          </a:stretch>
+        </p:blipFill>
+        <p:spPr bwMode="auto">
+          <a:xfrm>
+            <a:off x="259930" y="2144555"/>
+            <a:ext cx="5048250" cy="3362325"/>
+          </a:xfrm>
+          <a:prstGeom prst="rect">
+            <a:avLst/>
+          </a:prstGeom>
+          <a:noFill/>
+          <a:ln>
+            <a:noFill/>
+          </a:ln>
+          <a:effectLst/>
+          <a:extLst>
+            <a:ext uri="{909E8E84-426E-40DD-AFC4-6F175D3DCCD1}">
+              <a14:hiddenFill xmlns:a14="http://schemas.microsoft.com/office/drawing/2010/main">
+                <a:solidFill>
+                  <a:schemeClr val="accent1"/>
+                </a:solidFill>
+              </a14:hiddenFill>
+            </a:ext>
+            <a:ext uri="{91240B29-F687-4F45-9708-019B960494DF}">
+              <a14:hiddenLine xmlns:a14="http://schemas.microsoft.com/office/drawing/2010/main" w="9525">
+                <a:solidFill>
+                  <a:schemeClr val="tx1"/>
+                </a:solidFill>
+                <a:miter lim="800000"/>
+                <a:headEnd/>
+                <a:tailEnd/>
+              </a14:hiddenLine>
+            </a:ext>
+            <a:ext uri="{AF507438-7753-43E0-B8FC-AC1667EBCBE1}">
+              <a14:hiddenEffects xmlns:a14="http://schemas.microsoft.com/office/drawing/2010/main">
+                <a:effectLst>
+                  <a:outerShdw dist="35921" dir="2700000" algn="ctr" rotWithShape="0">
+                    <a:schemeClr val="bg2"/>
+                  </a:outerShdw>
+                </a:effectLst>
+              </a14:hiddenEffects>
+            </a:ext>
+          </a:extLst>
+        </p:spPr>
+      </p:pic>
+      <p:pic>
+        <p:nvPicPr>
+          <p:cNvPr id="5124" name="Picture 4"/>
+          <p:cNvPicPr>
+            <a:picLocks noChangeAspect="1" noChangeArrowheads="1"/>
+          </p:cNvPicPr>
+          <p:nvPr/>
+        </p:nvPicPr>
+        <p:blipFill>
+          <a:blip r:embed="rId3">
+            <a:extLst>
+              <a:ext uri="{28A0092B-C50C-407E-A947-70E740481C1C}">
+                <a14:useLocalDpi xmlns:a14="http://schemas.microsoft.com/office/drawing/2010/main" val="0"/>
+              </a:ext>
+            </a:extLst>
+          </a:blip>
+          <a:srcRect/>
+          <a:stretch>
+            <a:fillRect/>
+          </a:stretch>
+        </p:blipFill>
+        <p:spPr bwMode="auto">
+          <a:xfrm>
+            <a:off x="5331330" y="2144556"/>
+            <a:ext cx="6776518" cy="5494736"/>
+          </a:xfrm>
+          <a:prstGeom prst="rect">
+            <a:avLst/>
+          </a:prstGeom>
+          <a:noFill/>
+          <a:ln>
+            <a:noFill/>
+          </a:ln>
+          <a:effectLst/>
+          <a:extLst>
+            <a:ext uri="{909E8E84-426E-40DD-AFC4-6F175D3DCCD1}">
+              <a14:hiddenFill xmlns:a14="http://schemas.microsoft.com/office/drawing/2010/main">
+                <a:solidFill>
+                  <a:schemeClr val="accent1"/>
+                </a:solidFill>
+              </a14:hiddenFill>
+            </a:ext>
+            <a:ext uri="{91240B29-F687-4F45-9708-019B960494DF}">
+              <a14:hiddenLine xmlns:a14="http://schemas.microsoft.com/office/drawing/2010/main" w="9525">
+                <a:solidFill>
+                  <a:schemeClr val="tx1"/>
+                </a:solidFill>
+                <a:miter lim="800000"/>
+                <a:headEnd/>
+                <a:tailEnd/>
+              </a14:hiddenLine>
+            </a:ext>
+            <a:ext uri="{AF507438-7753-43E0-B8FC-AC1667EBCBE1}">
+              <a14:hiddenEffects xmlns:a14="http://schemas.microsoft.com/office/drawing/2010/main">
+                <a:effectLst>
+                  <a:outerShdw dist="35921" dir="2700000" algn="ctr" rotWithShape="0">
+                    <a:schemeClr val="bg2"/>
+                  </a:outerShdw>
+                </a:effectLst>
+              </a14:hiddenEffects>
+            </a:ext>
+          </a:extLst>
+        </p:spPr>
+      </p:pic>
+    </p:spTree>
+    <p:extLst>
+      <p:ext uri="{BB962C8B-B14F-4D97-AF65-F5344CB8AC3E}">
+        <p14:creationId xmlns:p14="http://schemas.microsoft.com/office/powerpoint/2010/main" val="391116196"/>
+      </p:ext>
+    </p:extLst>
+  </p:cSld>
+  <p:clrMapOvr>
+    <a:masterClrMapping/>
+  </p:clrMapOvr>
+  <p:timing>
+    <p:tnLst>
+      <p:par>
+        <p:cTn id="1" dur="indefinite" restart="never" nodeType="tmRoot"/>
+      </p:par>
+    </p:tnLst>
+  </p:timing>
+</p:sld>
+</file>
+
+<file path=ppt/slides/slide34.xml><?xml version="1.0" encoding="utf-8"?>
+<p:sld xmlns:a="http://schemas.openxmlformats.org/drawingml/2006/main" xmlns:r="http://schemas.openxmlformats.org/officeDocument/2006/relationships" xmlns:p="http://schemas.openxmlformats.org/presentationml/2006/main">
+  <p:cSld>
+    <p:spTree>
+      <p:nvGrpSpPr>
+        <p:cNvPr id="1" name=""/>
+        <p:cNvGrpSpPr/>
+        <p:nvPr/>
+      </p:nvGrpSpPr>
+      <p:grpSpPr>
+        <a:xfrm>
+          <a:off x="0" y="0"/>
+          <a:ext cx="0" cy="0"/>
+          <a:chOff x="0" y="0"/>
+          <a:chExt cx="0" cy="0"/>
+        </a:xfrm>
+      </p:grpSpPr>
+      <p:sp>
+        <p:nvSpPr>
+          <p:cNvPr id="2" name="Titel 1"/>
+          <p:cNvSpPr>
+            <a:spLocks noGrp="1"/>
+          </p:cNvSpPr>
+          <p:nvPr>
+            <p:ph type="title"/>
+          </p:nvPr>
+        </p:nvSpPr>
+        <p:spPr/>
+        <p:txBody>
+          <a:bodyPr/>
+          <a:lstStyle/>
+          <a:p>
+            <a:r>
+              <a:rPr lang="en-US" dirty="0" smtClean="0"/>
+              <a:t>Query – Multi Chart and Chart Details</a:t>
             </a:r>
             <a:endParaRPr lang="de-DE" dirty="0"/>
           </a:p>
@@ -9255,7 +9418,7 @@
           <p:cNvPr id="2" name="Title 1">
             <a:extLst>
               <a:ext uri="{FF2B5EF4-FFF2-40B4-BE49-F238E27FC236}">
-                <a16:creationId xmlns="" xmlns:a16="http://schemas.microsoft.com/office/drawing/2014/main" id="{CDCDEA46-AB36-471C-8BC0-E2849C41986F}"/>
+                <a16:creationId xmlns:a16="http://schemas.microsoft.com/office/drawing/2014/main" xmlns="" id="{CDCDEA46-AB36-471C-8BC0-E2849C41986F}"/>
               </a:ext>
             </a:extLst>
           </p:cNvPr>
@@ -9284,7 +9447,7 @@
           <p:cNvPr id="5" name="Picture 4">
             <a:extLst>
               <a:ext uri="{FF2B5EF4-FFF2-40B4-BE49-F238E27FC236}">
-                <a16:creationId xmlns="" xmlns:a16="http://schemas.microsoft.com/office/drawing/2014/main" id="{FB790BAE-2EAA-4426-8E94-CA35B3AA924A}"/>
+                <a16:creationId xmlns:a16="http://schemas.microsoft.com/office/drawing/2014/main" xmlns="" id="{FB790BAE-2EAA-4426-8E94-CA35B3AA924A}"/>
               </a:ext>
             </a:extLst>
           </p:cNvPr>
@@ -9416,7 +9579,7 @@
           <p:cNvPr id="2" name="Title 1">
             <a:extLst>
               <a:ext uri="{FF2B5EF4-FFF2-40B4-BE49-F238E27FC236}">
-                <a16:creationId xmlns="" xmlns:a16="http://schemas.microsoft.com/office/drawing/2014/main" id="{F208E1EB-D1EA-49C6-A87D-807F9EF8B59B}"/>
+                <a16:creationId xmlns:a16="http://schemas.microsoft.com/office/drawing/2014/main" xmlns="" id="{F208E1EB-D1EA-49C6-A87D-807F9EF8B59B}"/>
               </a:ext>
             </a:extLst>
           </p:cNvPr>
@@ -9445,7 +9608,7 @@
           <p:cNvPr id="5" name="Picture 4">
             <a:extLst>
               <a:ext uri="{FF2B5EF4-FFF2-40B4-BE49-F238E27FC236}">
-                <a16:creationId xmlns="" xmlns:a16="http://schemas.microsoft.com/office/drawing/2014/main" id="{2457B652-73B7-45B0-874C-963B358D59FA}"/>
+                <a16:creationId xmlns:a16="http://schemas.microsoft.com/office/drawing/2014/main" xmlns="" id="{2457B652-73B7-45B0-874C-963B358D59FA}"/>
               </a:ext>
             </a:extLst>
           </p:cNvPr>
@@ -9512,7 +9675,7 @@
           <p:cNvPr id="2" name="Title 1">
             <a:extLst>
               <a:ext uri="{FF2B5EF4-FFF2-40B4-BE49-F238E27FC236}">
-                <a16:creationId xmlns="" xmlns:a16="http://schemas.microsoft.com/office/drawing/2014/main" id="{DF1C355E-D737-4D59-8170-3869785DCA0C}"/>
+                <a16:creationId xmlns:a16="http://schemas.microsoft.com/office/drawing/2014/main" xmlns="" id="{DF1C355E-D737-4D59-8170-3869785DCA0C}"/>
               </a:ext>
             </a:extLst>
           </p:cNvPr>
@@ -9541,7 +9704,7 @@
           <p:cNvPr id="3" name="Content Placeholder 2">
             <a:extLst>
               <a:ext uri="{FF2B5EF4-FFF2-40B4-BE49-F238E27FC236}">
-                <a16:creationId xmlns="" xmlns:a16="http://schemas.microsoft.com/office/drawing/2014/main" id="{6A872884-D8FA-473F-BA4D-48DF02AD3431}"/>
+                <a16:creationId xmlns:a16="http://schemas.microsoft.com/office/drawing/2014/main" xmlns="" id="{6A872884-D8FA-473F-BA4D-48DF02AD3431}"/>
               </a:ext>
             </a:extLst>
           </p:cNvPr>
@@ -9609,7 +9772,7 @@
           <p:cNvPr id="5" name="Picture 4">
             <a:extLst>
               <a:ext uri="{FF2B5EF4-FFF2-40B4-BE49-F238E27FC236}">
-                <a16:creationId xmlns="" xmlns:a16="http://schemas.microsoft.com/office/drawing/2014/main" id="{6661E8F4-3000-4F5D-9315-C3E1003B6820}"/>
+                <a16:creationId xmlns:a16="http://schemas.microsoft.com/office/drawing/2014/main" xmlns="" id="{6661E8F4-3000-4F5D-9315-C3E1003B6820}"/>
               </a:ext>
             </a:extLst>
           </p:cNvPr>
@@ -9676,7 +9839,7 @@
           <p:cNvPr id="2" name="Title 1">
             <a:extLst>
               <a:ext uri="{FF2B5EF4-FFF2-40B4-BE49-F238E27FC236}">
-                <a16:creationId xmlns="" xmlns:a16="http://schemas.microsoft.com/office/drawing/2014/main" id="{1B5E51F3-A5F3-4C93-AA3F-38F4818C0DFE}"/>
+                <a16:creationId xmlns:a16="http://schemas.microsoft.com/office/drawing/2014/main" xmlns="" id="{1B5E51F3-A5F3-4C93-AA3F-38F4818C0DFE}"/>
               </a:ext>
             </a:extLst>
           </p:cNvPr>
@@ -9709,7 +9872,7 @@
           <p:cNvPr id="5" name="Content Placeholder 4">
             <a:extLst>
               <a:ext uri="{FF2B5EF4-FFF2-40B4-BE49-F238E27FC236}">
-                <a16:creationId xmlns="" xmlns:a16="http://schemas.microsoft.com/office/drawing/2014/main" id="{9455BA79-08DE-44E8-8A22-40E4D835AAD7}"/>
+                <a16:creationId xmlns:a16="http://schemas.microsoft.com/office/drawing/2014/main" xmlns="" id="{9455BA79-08DE-44E8-8A22-40E4D835AAD7}"/>
               </a:ext>
             </a:extLst>
           </p:cNvPr>
@@ -9820,7 +9983,7 @@
           <p:cNvPr id="8" name="Content Placeholder 4">
             <a:extLst>
               <a:ext uri="{FF2B5EF4-FFF2-40B4-BE49-F238E27FC236}">
-                <a16:creationId xmlns="" xmlns:a16="http://schemas.microsoft.com/office/drawing/2014/main" id="{9455BA79-08DE-44E8-8A22-40E4D835AAD7}"/>
+                <a16:creationId xmlns:a16="http://schemas.microsoft.com/office/drawing/2014/main" xmlns="" id="{9455BA79-08DE-44E8-8A22-40E4D835AAD7}"/>
               </a:ext>
             </a:extLst>
           </p:cNvPr>
@@ -10125,7 +10288,7 @@
           <p:cNvPr id="11" name="Title 10">
             <a:extLst>
               <a:ext uri="{FF2B5EF4-FFF2-40B4-BE49-F238E27FC236}">
-                <a16:creationId xmlns="" xmlns:a16="http://schemas.microsoft.com/office/drawing/2014/main" id="{30F7E243-F54D-4F7C-845C-0C2C1DBA9D28}"/>
+                <a16:creationId xmlns:a16="http://schemas.microsoft.com/office/drawing/2014/main" xmlns="" id="{30F7E243-F54D-4F7C-845C-0C2C1DBA9D28}"/>
               </a:ext>
             </a:extLst>
           </p:cNvPr>
@@ -10154,7 +10317,7 @@
           <p:cNvPr id="15" name="Picture 14">
             <a:extLst>
               <a:ext uri="{FF2B5EF4-FFF2-40B4-BE49-F238E27FC236}">
-                <a16:creationId xmlns="" xmlns:a16="http://schemas.microsoft.com/office/drawing/2014/main" id="{6C615B85-DB7E-490F-BF09-363517CDBB58}"/>
+                <a16:creationId xmlns:a16="http://schemas.microsoft.com/office/drawing/2014/main" xmlns="" id="{6C615B85-DB7E-490F-BF09-363517CDBB58}"/>
               </a:ext>
             </a:extLst>
           </p:cNvPr>
@@ -10494,7 +10657,7 @@
   <a:extraClrSchemeLst/>
   <a:extLst>
     <a:ext uri="{05A4C25C-085E-4340-85A3-A5531E510DB2}">
-      <thm15:themeFamily xmlns="" xmlns:thm15="http://schemas.microsoft.com/office/thememl/2012/main" name="Office Theme" id="{62F939B6-93AF-4DB8-9C6B-D6C7DFDC589F}" vid="{4A3C46E8-61CC-4603-A589-7422A47A8E4A}"/>
+      <thm15:themeFamily xmlns:thm15="http://schemas.microsoft.com/office/thememl/2012/main" xmlns="" name="Office Theme" id="{62F939B6-93AF-4DB8-9C6B-D6C7DFDC589F}" vid="{4A3C46E8-61CC-4603-A589-7422A47A8E4A}"/>
     </a:ext>
   </a:extLst>
 </a:theme>

</xml_diff>

<commit_message>
Query: Finished statsmatrix command
</commit_message>
<xml_diff>
--- a/docs/CFW_Features.pptx
+++ b/docs/CFW_Features.pptx
@@ -32,13 +32,14 @@
     <p:sldId id="287" r:id="rId26"/>
     <p:sldId id="300" r:id="rId27"/>
     <p:sldId id="298" r:id="rId28"/>
-    <p:sldId id="278" r:id="rId29"/>
-    <p:sldId id="281" r:id="rId30"/>
-    <p:sldId id="293" r:id="rId31"/>
-    <p:sldId id="296" r:id="rId32"/>
-    <p:sldId id="295" r:id="rId33"/>
-    <p:sldId id="297" r:id="rId34"/>
-    <p:sldId id="301" r:id="rId35"/>
+    <p:sldId id="303" r:id="rId29"/>
+    <p:sldId id="278" r:id="rId30"/>
+    <p:sldId id="281" r:id="rId31"/>
+    <p:sldId id="293" r:id="rId32"/>
+    <p:sldId id="296" r:id="rId33"/>
+    <p:sldId id="295" r:id="rId34"/>
+    <p:sldId id="297" r:id="rId35"/>
+    <p:sldId id="301" r:id="rId36"/>
   </p:sldIdLst>
   <p:sldSz cx="12192000" cy="6858000"/>
   <p:notesSz cx="6858000" cy="9144000"/>
@@ -6698,7 +6699,7 @@
               <a:t>Use the query feature to get alerts by </a:t>
             </a:r>
             <a:r>
-              <a:rPr lang="en-US" smtClean="0"/>
+              <a:rPr lang="en-US" dirty="0" err="1" smtClean="0"/>
               <a:t>eMail</a:t>
             </a:r>
             <a:r>
@@ -7939,6 +7940,243 @@
       </p:grpSpPr>
       <p:sp>
         <p:nvSpPr>
+          <p:cNvPr id="2" name="Titel 1"/>
+          <p:cNvSpPr>
+            <a:spLocks noGrp="1"/>
+          </p:cNvSpPr>
+          <p:nvPr>
+            <p:ph type="title"/>
+          </p:nvPr>
+        </p:nvSpPr>
+        <p:spPr/>
+        <p:txBody>
+          <a:bodyPr/>
+          <a:lstStyle/>
+          <a:p>
+            <a:r>
+              <a:rPr lang="en-US" dirty="0" smtClean="0"/>
+              <a:t>Query – Create </a:t>
+            </a:r>
+            <a:r>
+              <a:rPr lang="en-US" dirty="0" smtClean="0"/>
+              <a:t>Statistics Matrix</a:t>
+            </a:r>
+            <a:endParaRPr lang="de-DE" dirty="0"/>
+          </a:p>
+        </p:txBody>
+      </p:sp>
+      <p:sp>
+        <p:nvSpPr>
+          <p:cNvPr id="3" name="Inhaltsplatzhalter 2"/>
+          <p:cNvSpPr>
+            <a:spLocks noGrp="1"/>
+          </p:cNvSpPr>
+          <p:nvPr>
+            <p:ph idx="1"/>
+          </p:nvPr>
+        </p:nvSpPr>
+        <p:spPr/>
+        <p:txBody>
+          <a:bodyPr>
+            <a:normAutofit/>
+          </a:bodyPr>
+          <a:lstStyle/>
+          <a:p>
+            <a:r>
+              <a:rPr lang="en-US" dirty="0" smtClean="0"/>
+              <a:t>Create </a:t>
+            </a:r>
+            <a:r>
+              <a:rPr lang="en-US" dirty="0" smtClean="0"/>
+              <a:t>statistical matrix with </a:t>
+            </a:r>
+            <a:r>
+              <a:rPr lang="en-US" dirty="0" smtClean="0"/>
+              <a:t>the </a:t>
+            </a:r>
+            <a:r>
+              <a:rPr lang="en-US" dirty="0" err="1" smtClean="0"/>
+              <a:t>statsmatrix</a:t>
+            </a:r>
+            <a:r>
+              <a:rPr lang="en-US" dirty="0" smtClean="0"/>
+              <a:t> </a:t>
+            </a:r>
+            <a:r>
+              <a:rPr lang="en-US" dirty="0" smtClean="0"/>
+              <a:t>command:</a:t>
+            </a:r>
+            <a:endParaRPr lang="de-DE" dirty="0"/>
+          </a:p>
+        </p:txBody>
+      </p:sp>
+      <p:pic>
+        <p:nvPicPr>
+          <p:cNvPr id="2050" name="Picture 2"/>
+          <p:cNvPicPr>
+            <a:picLocks noChangeAspect="1" noChangeArrowheads="1"/>
+          </p:cNvPicPr>
+          <p:nvPr/>
+        </p:nvPicPr>
+        <p:blipFill>
+          <a:blip r:embed="rId2">
+            <a:extLst>
+              <a:ext uri="{28A0092B-C50C-407E-A947-70E740481C1C}">
+                <a14:useLocalDpi xmlns:a14="http://schemas.microsoft.com/office/drawing/2010/main" val="0"/>
+              </a:ext>
+            </a:extLst>
+          </a:blip>
+          <a:srcRect/>
+          <a:stretch>
+            <a:fillRect/>
+          </a:stretch>
+        </p:blipFill>
+        <p:spPr bwMode="auto">
+          <a:xfrm>
+            <a:off x="375194" y="1903472"/>
+            <a:ext cx="3752850" cy="3219450"/>
+          </a:xfrm>
+          <a:prstGeom prst="rect">
+            <a:avLst/>
+          </a:prstGeom>
+          <a:noFill/>
+          <a:ln>
+            <a:noFill/>
+          </a:ln>
+          <a:effectLst/>
+          <a:extLst>
+            <a:ext uri="{909E8E84-426E-40DD-AFC4-6F175D3DCCD1}">
+              <a14:hiddenFill xmlns:a14="http://schemas.microsoft.com/office/drawing/2010/main">
+                <a:solidFill>
+                  <a:schemeClr val="accent1"/>
+                </a:solidFill>
+              </a14:hiddenFill>
+            </a:ext>
+            <a:ext uri="{91240B29-F687-4F45-9708-019B960494DF}">
+              <a14:hiddenLine xmlns:a14="http://schemas.microsoft.com/office/drawing/2010/main" w="9525">
+                <a:solidFill>
+                  <a:schemeClr val="tx1"/>
+                </a:solidFill>
+                <a:miter lim="800000"/>
+                <a:headEnd/>
+                <a:tailEnd/>
+              </a14:hiddenLine>
+            </a:ext>
+            <a:ext uri="{AF507438-7753-43E0-B8FC-AC1667EBCBE1}">
+              <a14:hiddenEffects xmlns:a14="http://schemas.microsoft.com/office/drawing/2010/main">
+                <a:effectLst>
+                  <a:outerShdw dist="35921" dir="2700000" algn="ctr" rotWithShape="0">
+                    <a:schemeClr val="bg2"/>
+                  </a:outerShdw>
+                </a:effectLst>
+              </a14:hiddenEffects>
+            </a:ext>
+          </a:extLst>
+        </p:spPr>
+      </p:pic>
+      <p:pic>
+        <p:nvPicPr>
+          <p:cNvPr id="2051" name="Picture 3"/>
+          <p:cNvPicPr>
+            <a:picLocks noChangeAspect="1" noChangeArrowheads="1"/>
+          </p:cNvPicPr>
+          <p:nvPr/>
+        </p:nvPicPr>
+        <p:blipFill>
+          <a:blip r:embed="rId3">
+            <a:extLst>
+              <a:ext uri="{28A0092B-C50C-407E-A947-70E740481C1C}">
+                <a14:useLocalDpi xmlns:a14="http://schemas.microsoft.com/office/drawing/2010/main" val="0"/>
+              </a:ext>
+            </a:extLst>
+          </a:blip>
+          <a:srcRect/>
+          <a:stretch>
+            <a:fillRect/>
+          </a:stretch>
+        </p:blipFill>
+        <p:spPr bwMode="auto">
+          <a:xfrm>
+            <a:off x="4268867" y="1903472"/>
+            <a:ext cx="7480566" cy="4393155"/>
+          </a:xfrm>
+          <a:prstGeom prst="rect">
+            <a:avLst/>
+          </a:prstGeom>
+          <a:noFill/>
+          <a:ln>
+            <a:noFill/>
+          </a:ln>
+          <a:effectLst/>
+          <a:extLst>
+            <a:ext uri="{909E8E84-426E-40DD-AFC4-6F175D3DCCD1}">
+              <a14:hiddenFill xmlns:a14="http://schemas.microsoft.com/office/drawing/2010/main">
+                <a:solidFill>
+                  <a:schemeClr val="accent1"/>
+                </a:solidFill>
+              </a14:hiddenFill>
+            </a:ext>
+            <a:ext uri="{91240B29-F687-4F45-9708-019B960494DF}">
+              <a14:hiddenLine xmlns:a14="http://schemas.microsoft.com/office/drawing/2010/main" w="9525">
+                <a:solidFill>
+                  <a:schemeClr val="tx1"/>
+                </a:solidFill>
+                <a:miter lim="800000"/>
+                <a:headEnd/>
+                <a:tailEnd/>
+              </a14:hiddenLine>
+            </a:ext>
+            <a:ext uri="{AF507438-7753-43E0-B8FC-AC1667EBCBE1}">
+              <a14:hiddenEffects xmlns:a14="http://schemas.microsoft.com/office/drawing/2010/main">
+                <a:effectLst>
+                  <a:outerShdw dist="35921" dir="2700000" algn="ctr" rotWithShape="0">
+                    <a:schemeClr val="bg2"/>
+                  </a:outerShdw>
+                </a:effectLst>
+              </a14:hiddenEffects>
+            </a:ext>
+          </a:extLst>
+        </p:spPr>
+      </p:pic>
+    </p:spTree>
+    <p:extLst>
+      <p:ext uri="{BB962C8B-B14F-4D97-AF65-F5344CB8AC3E}">
+        <p14:creationId xmlns:p14="http://schemas.microsoft.com/office/powerpoint/2010/main" val="1685329205"/>
+      </p:ext>
+    </p:extLst>
+  </p:cSld>
+  <p:clrMapOvr>
+    <a:masterClrMapping/>
+  </p:clrMapOvr>
+  <p:timing>
+    <p:tnLst>
+      <p:par>
+        <p:cTn id="1" dur="indefinite" restart="never" nodeType="tmRoot"/>
+      </p:par>
+    </p:tnLst>
+  </p:timing>
+</p:sld>
+</file>
+
+<file path=ppt/slides/slide29.xml><?xml version="1.0" encoding="utf-8"?>
+<p:sld xmlns:a="http://schemas.openxmlformats.org/drawingml/2006/main" xmlns:r="http://schemas.openxmlformats.org/officeDocument/2006/relationships" xmlns:p="http://schemas.openxmlformats.org/presentationml/2006/main">
+  <p:cSld>
+    <p:spTree>
+      <p:nvGrpSpPr>
+        <p:cNvPr id="1" name=""/>
+        <p:cNvGrpSpPr/>
+        <p:nvPr/>
+      </p:nvGrpSpPr>
+      <p:grpSpPr>
+        <a:xfrm>
+          <a:off x="0" y="0"/>
+          <a:ext cx="0" cy="0"/>
+          <a:chOff x="0" y="0"/>
+          <a:chExt cx="0" cy="0"/>
+        </a:xfrm>
+      </p:grpSpPr>
+      <p:sp>
+        <p:nvSpPr>
           <p:cNvPr id="2" name="Title 1">
             <a:extLst>
               <a:ext uri="{FF2B5EF4-FFF2-40B4-BE49-F238E27FC236}">
@@ -8109,7 +8347,72 @@
 </p:sld>
 </file>
 
-<file path=ppt/slides/slide29.xml><?xml version="1.0" encoding="utf-8"?>
+<file path=ppt/slides/slide3.xml><?xml version="1.0" encoding="utf-8"?>
+<p:sld xmlns:a="http://schemas.openxmlformats.org/drawingml/2006/main" xmlns:r="http://schemas.openxmlformats.org/officeDocument/2006/relationships" xmlns:p="http://schemas.openxmlformats.org/presentationml/2006/main">
+  <p:cSld>
+    <p:spTree>
+      <p:nvGrpSpPr>
+        <p:cNvPr id="1" name=""/>
+        <p:cNvGrpSpPr/>
+        <p:nvPr/>
+      </p:nvGrpSpPr>
+      <p:grpSpPr>
+        <a:xfrm>
+          <a:off x="0" y="0"/>
+          <a:ext cx="0" cy="0"/>
+          <a:chOff x="0" y="0"/>
+          <a:chExt cx="0" cy="0"/>
+        </a:xfrm>
+      </p:grpSpPr>
+      <p:sp>
+        <p:nvSpPr>
+          <p:cNvPr id="4" name="Titel 3"/>
+          <p:cNvSpPr>
+            <a:spLocks noGrp="1"/>
+          </p:cNvSpPr>
+          <p:nvPr>
+            <p:ph type="title"/>
+          </p:nvPr>
+        </p:nvSpPr>
+        <p:spPr>
+          <a:xfrm>
+            <a:off x="831850" y="2733040"/>
+            <a:ext cx="10515600" cy="1016000"/>
+          </a:xfrm>
+        </p:spPr>
+        <p:txBody>
+          <a:bodyPr/>
+          <a:lstStyle/>
+          <a:p>
+            <a:r>
+              <a:rPr lang="en-US" dirty="0" smtClean="0"/>
+              <a:t>USER MANAGEMENT</a:t>
+            </a:r>
+            <a:endParaRPr lang="de-DE" dirty="0"/>
+          </a:p>
+        </p:txBody>
+      </p:sp>
+    </p:spTree>
+    <p:extLst>
+      <p:ext uri="{BB962C8B-B14F-4D97-AF65-F5344CB8AC3E}">
+        <p14:creationId xmlns:p14="http://schemas.microsoft.com/office/powerpoint/2010/main" val="3935850883"/>
+      </p:ext>
+    </p:extLst>
+  </p:cSld>
+  <p:clrMapOvr>
+    <a:masterClrMapping/>
+  </p:clrMapOvr>
+  <p:timing>
+    <p:tnLst>
+      <p:par>
+        <p:cTn id="1" dur="indefinite" restart="never" nodeType="tmRoot"/>
+      </p:par>
+    </p:tnLst>
+  </p:timing>
+</p:sld>
+</file>
+
+<file path=ppt/slides/slide30.xml><?xml version="1.0" encoding="utf-8"?>
 <p:sld xmlns:a="http://schemas.openxmlformats.org/drawingml/2006/main" xmlns:r="http://schemas.openxmlformats.org/officeDocument/2006/relationships" xmlns:p="http://schemas.openxmlformats.org/presentationml/2006/main">
   <p:cSld>
     <p:spTree>
@@ -8240,72 +8543,7 @@
 </p:sld>
 </file>
 
-<file path=ppt/slides/slide3.xml><?xml version="1.0" encoding="utf-8"?>
-<p:sld xmlns:a="http://schemas.openxmlformats.org/drawingml/2006/main" xmlns:r="http://schemas.openxmlformats.org/officeDocument/2006/relationships" xmlns:p="http://schemas.openxmlformats.org/presentationml/2006/main">
-  <p:cSld>
-    <p:spTree>
-      <p:nvGrpSpPr>
-        <p:cNvPr id="1" name=""/>
-        <p:cNvGrpSpPr/>
-        <p:nvPr/>
-      </p:nvGrpSpPr>
-      <p:grpSpPr>
-        <a:xfrm>
-          <a:off x="0" y="0"/>
-          <a:ext cx="0" cy="0"/>
-          <a:chOff x="0" y="0"/>
-          <a:chExt cx="0" cy="0"/>
-        </a:xfrm>
-      </p:grpSpPr>
-      <p:sp>
-        <p:nvSpPr>
-          <p:cNvPr id="4" name="Titel 3"/>
-          <p:cNvSpPr>
-            <a:spLocks noGrp="1"/>
-          </p:cNvSpPr>
-          <p:nvPr>
-            <p:ph type="title"/>
-          </p:nvPr>
-        </p:nvSpPr>
-        <p:spPr>
-          <a:xfrm>
-            <a:off x="831850" y="2733040"/>
-            <a:ext cx="10515600" cy="1016000"/>
-          </a:xfrm>
-        </p:spPr>
-        <p:txBody>
-          <a:bodyPr/>
-          <a:lstStyle/>
-          <a:p>
-            <a:r>
-              <a:rPr lang="en-US" dirty="0" smtClean="0"/>
-              <a:t>USER MANAGEMENT</a:t>
-            </a:r>
-            <a:endParaRPr lang="de-DE" dirty="0"/>
-          </a:p>
-        </p:txBody>
-      </p:sp>
-    </p:spTree>
-    <p:extLst>
-      <p:ext uri="{BB962C8B-B14F-4D97-AF65-F5344CB8AC3E}">
-        <p14:creationId xmlns:p14="http://schemas.microsoft.com/office/powerpoint/2010/main" val="3935850883"/>
-      </p:ext>
-    </p:extLst>
-  </p:cSld>
-  <p:clrMapOvr>
-    <a:masterClrMapping/>
-  </p:clrMapOvr>
-  <p:timing>
-    <p:tnLst>
-      <p:par>
-        <p:cTn id="1" dur="indefinite" restart="never" nodeType="tmRoot"/>
-      </p:par>
-    </p:tnLst>
-  </p:timing>
-</p:sld>
-</file>
-
-<file path=ppt/slides/slide30.xml><?xml version="1.0" encoding="utf-8"?>
+<file path=ppt/slides/slide31.xml><?xml version="1.0" encoding="utf-8"?>
 <p:sld xmlns:a="http://schemas.openxmlformats.org/drawingml/2006/main" xmlns:r="http://schemas.openxmlformats.org/officeDocument/2006/relationships" xmlns:p="http://schemas.openxmlformats.org/presentationml/2006/main">
   <p:cSld>
     <p:spTree>
@@ -8635,155 +8873,6 @@
     <p:extLst>
       <p:ext uri="{BB962C8B-B14F-4D97-AF65-F5344CB8AC3E}">
         <p14:creationId xmlns:p14="http://schemas.microsoft.com/office/powerpoint/2010/main" val="3076715510"/>
-      </p:ext>
-    </p:extLst>
-  </p:cSld>
-  <p:clrMapOvr>
-    <a:masterClrMapping/>
-  </p:clrMapOvr>
-  <p:timing>
-    <p:tnLst>
-      <p:par>
-        <p:cTn id="1" dur="indefinite" restart="never" nodeType="tmRoot"/>
-      </p:par>
-    </p:tnLst>
-  </p:timing>
-</p:sld>
-</file>
-
-<file path=ppt/slides/slide31.xml><?xml version="1.0" encoding="utf-8"?>
-<p:sld xmlns:a="http://schemas.openxmlformats.org/drawingml/2006/main" xmlns:r="http://schemas.openxmlformats.org/officeDocument/2006/relationships" xmlns:p="http://schemas.openxmlformats.org/presentationml/2006/main">
-  <p:cSld>
-    <p:spTree>
-      <p:nvGrpSpPr>
-        <p:cNvPr id="1" name=""/>
-        <p:cNvGrpSpPr/>
-        <p:nvPr/>
-      </p:nvGrpSpPr>
-      <p:grpSpPr>
-        <a:xfrm>
-          <a:off x="0" y="0"/>
-          <a:ext cx="0" cy="0"/>
-          <a:chOff x="0" y="0"/>
-          <a:chExt cx="0" cy="0"/>
-        </a:xfrm>
-      </p:grpSpPr>
-      <p:sp>
-        <p:nvSpPr>
-          <p:cNvPr id="2" name="Titel 1"/>
-          <p:cNvSpPr>
-            <a:spLocks noGrp="1"/>
-          </p:cNvSpPr>
-          <p:nvPr>
-            <p:ph type="title"/>
-          </p:nvPr>
-        </p:nvSpPr>
-        <p:spPr/>
-        <p:txBody>
-          <a:bodyPr/>
-          <a:lstStyle/>
-          <a:p>
-            <a:r>
-              <a:rPr lang="en-US" dirty="0" smtClean="0"/>
-              <a:t>Query – Compare Data</a:t>
-            </a:r>
-            <a:endParaRPr lang="de-DE" dirty="0"/>
-          </a:p>
-        </p:txBody>
-      </p:sp>
-      <p:sp>
-        <p:nvSpPr>
-          <p:cNvPr id="3" name="Inhaltsplatzhalter 2"/>
-          <p:cNvSpPr>
-            <a:spLocks noGrp="1"/>
-          </p:cNvSpPr>
-          <p:nvPr>
-            <p:ph idx="1"/>
-          </p:nvPr>
-        </p:nvSpPr>
-        <p:spPr/>
-        <p:txBody>
-          <a:bodyPr>
-            <a:normAutofit fontScale="92500" lnSpcReduction="10000"/>
-          </a:bodyPr>
-          <a:lstStyle/>
-          <a:p>
-            <a:r>
-              <a:rPr lang="en-US" dirty="0" smtClean="0"/>
-              <a:t>Use the query language to compare similar data from two different sources or two different timeframes:</a:t>
-            </a:r>
-            <a:endParaRPr lang="de-DE" dirty="0"/>
-          </a:p>
-        </p:txBody>
-      </p:sp>
-      <p:pic>
-        <p:nvPicPr>
-          <p:cNvPr id="1027" name="Picture 3"/>
-          <p:cNvPicPr>
-            <a:picLocks noChangeAspect="1" noChangeArrowheads="1"/>
-          </p:cNvPicPr>
-          <p:nvPr/>
-        </p:nvPicPr>
-        <p:blipFill>
-          <a:blip r:embed="rId2">
-            <a:extLst>
-              <a:ext uri="{28A0092B-C50C-407E-A947-70E740481C1C}">
-                <a14:useLocalDpi xmlns:a14="http://schemas.microsoft.com/office/drawing/2010/main" val="0"/>
-              </a:ext>
-            </a:extLst>
-          </a:blip>
-          <a:srcRect/>
-          <a:stretch>
-            <a:fillRect/>
-          </a:stretch>
-        </p:blipFill>
-        <p:spPr bwMode="auto">
-          <a:xfrm>
-            <a:off x="344170" y="2288540"/>
-            <a:ext cx="11296790" cy="3990340"/>
-          </a:xfrm>
-          <a:prstGeom prst="rect">
-            <a:avLst/>
-          </a:prstGeom>
-          <a:noFill/>
-          <a:ln>
-            <a:noFill/>
-          </a:ln>
-          <a:effectLst/>
-          <a:extLst>
-            <a:ext uri="{909E8E84-426E-40DD-AFC4-6F175D3DCCD1}">
-              <a14:hiddenFill xmlns:a14="http://schemas.microsoft.com/office/drawing/2010/main">
-                <a:solidFill>
-                  <a:schemeClr val="accent1"/>
-                </a:solidFill>
-              </a14:hiddenFill>
-            </a:ext>
-            <a:ext uri="{91240B29-F687-4F45-9708-019B960494DF}">
-              <a14:hiddenLine xmlns:a14="http://schemas.microsoft.com/office/drawing/2010/main" w="9525">
-                <a:solidFill>
-                  <a:schemeClr val="tx1"/>
-                </a:solidFill>
-                <a:miter lim="800000"/>
-                <a:headEnd/>
-                <a:tailEnd/>
-              </a14:hiddenLine>
-            </a:ext>
-            <a:ext uri="{AF507438-7753-43E0-B8FC-AC1667EBCBE1}">
-              <a14:hiddenEffects xmlns:a14="http://schemas.microsoft.com/office/drawing/2010/main">
-                <a:effectLst>
-                  <a:outerShdw dist="35921" dir="2700000" algn="ctr" rotWithShape="0">
-                    <a:schemeClr val="bg2"/>
-                  </a:outerShdw>
-                </a:effectLst>
-              </a14:hiddenEffects>
-            </a:ext>
-          </a:extLst>
-        </p:spPr>
-      </p:pic>
-    </p:spTree>
-    <p:extLst>
-      <p:ext uri="{BB962C8B-B14F-4D97-AF65-F5344CB8AC3E}">
-        <p14:creationId xmlns:p14="http://schemas.microsoft.com/office/powerpoint/2010/main" val="4280751305"/>
       </p:ext>
     </p:extLst>
   </p:cSld>
@@ -8834,15 +8923,7 @@
           <a:p>
             <a:r>
               <a:rPr lang="en-US" dirty="0" smtClean="0"/>
-              <a:t>Query – </a:t>
-            </a:r>
-            <a:r>
-              <a:rPr lang="en-US" dirty="0" err="1" smtClean="0"/>
-              <a:t>Subquerying</a:t>
-            </a:r>
-            <a:r>
-              <a:rPr lang="en-US" dirty="0" smtClean="0"/>
-              <a:t> Data</a:t>
+              <a:t>Query – Compare Data</a:t>
             </a:r>
             <a:endParaRPr lang="de-DE" dirty="0"/>
           </a:p>
@@ -8858,12 +8939,7 @@
             <p:ph idx="1"/>
           </p:nvPr>
         </p:nvSpPr>
-        <p:spPr>
-          <a:xfrm>
-            <a:off x="768752" y="1216629"/>
-            <a:ext cx="4424680" cy="1412239"/>
-          </a:xfrm>
-        </p:spPr>
+        <p:spPr/>
         <p:txBody>
           <a:bodyPr>
             <a:normAutofit fontScale="92500" lnSpcReduction="10000"/>
@@ -8872,15 +8948,7 @@
           <a:p>
             <a:r>
               <a:rPr lang="en-US" dirty="0" smtClean="0"/>
-              <a:t>The </a:t>
-            </a:r>
-            <a:r>
-              <a:rPr lang="en-US" dirty="0" err="1" smtClean="0"/>
-              <a:t>subquery</a:t>
-            </a:r>
-            <a:r>
-              <a:rPr lang="en-US" dirty="0" smtClean="0"/>
-              <a:t> function allows you to query additional data from another data source to enhance your data:</a:t>
+              <a:t>Use the query language to compare similar data from two different sources or two different timeframes:</a:t>
             </a:r>
             <a:endParaRPr lang="de-DE" dirty="0"/>
           </a:p>
@@ -8888,7 +8956,7 @@
       </p:sp>
       <p:pic>
         <p:nvPicPr>
-          <p:cNvPr id="2050" name="Picture 2"/>
+          <p:cNvPr id="1027" name="Picture 3"/>
           <p:cNvPicPr>
             <a:picLocks noChangeAspect="1" noChangeArrowheads="1"/>
           </p:cNvPicPr>
@@ -8909,8 +8977,8 @@
         </p:blipFill>
         <p:spPr bwMode="auto">
           <a:xfrm>
-            <a:off x="5385055" y="1157468"/>
-            <a:ext cx="6525895" cy="5494910"/>
+            <a:off x="344170" y="2288540"/>
+            <a:ext cx="11296790" cy="3990340"/>
           </a:xfrm>
           <a:prstGeom prst="rect">
             <a:avLst/>
@@ -8953,7 +9021,7 @@
     </p:spTree>
     <p:extLst>
       <p:ext uri="{BB962C8B-B14F-4D97-AF65-F5344CB8AC3E}">
-        <p14:creationId xmlns:p14="http://schemas.microsoft.com/office/powerpoint/2010/main" val="2697591186"/>
+        <p14:creationId xmlns:p14="http://schemas.microsoft.com/office/powerpoint/2010/main" val="4280751305"/>
       </p:ext>
     </p:extLst>
   </p:cSld>
@@ -9004,6 +9072,176 @@
           <a:p>
             <a:r>
               <a:rPr lang="en-US" dirty="0" smtClean="0"/>
+              <a:t>Query – </a:t>
+            </a:r>
+            <a:r>
+              <a:rPr lang="en-US" dirty="0" err="1" smtClean="0"/>
+              <a:t>Subquerying</a:t>
+            </a:r>
+            <a:r>
+              <a:rPr lang="en-US" dirty="0" smtClean="0"/>
+              <a:t> Data</a:t>
+            </a:r>
+            <a:endParaRPr lang="de-DE" dirty="0"/>
+          </a:p>
+        </p:txBody>
+      </p:sp>
+      <p:sp>
+        <p:nvSpPr>
+          <p:cNvPr id="3" name="Inhaltsplatzhalter 2"/>
+          <p:cNvSpPr>
+            <a:spLocks noGrp="1"/>
+          </p:cNvSpPr>
+          <p:nvPr>
+            <p:ph idx="1"/>
+          </p:nvPr>
+        </p:nvSpPr>
+        <p:spPr>
+          <a:xfrm>
+            <a:off x="768752" y="1216629"/>
+            <a:ext cx="4424680" cy="1412239"/>
+          </a:xfrm>
+        </p:spPr>
+        <p:txBody>
+          <a:bodyPr>
+            <a:normAutofit fontScale="92500" lnSpcReduction="10000"/>
+          </a:bodyPr>
+          <a:lstStyle/>
+          <a:p>
+            <a:r>
+              <a:rPr lang="en-US" dirty="0" smtClean="0"/>
+              <a:t>The </a:t>
+            </a:r>
+            <a:r>
+              <a:rPr lang="en-US" dirty="0" err="1" smtClean="0"/>
+              <a:t>subquery</a:t>
+            </a:r>
+            <a:r>
+              <a:rPr lang="en-US" dirty="0" smtClean="0"/>
+              <a:t> function allows you to query additional data from another data source to enhance your data:</a:t>
+            </a:r>
+            <a:endParaRPr lang="de-DE" dirty="0"/>
+          </a:p>
+        </p:txBody>
+      </p:sp>
+      <p:pic>
+        <p:nvPicPr>
+          <p:cNvPr id="2050" name="Picture 2"/>
+          <p:cNvPicPr>
+            <a:picLocks noChangeAspect="1" noChangeArrowheads="1"/>
+          </p:cNvPicPr>
+          <p:nvPr/>
+        </p:nvPicPr>
+        <p:blipFill>
+          <a:blip r:embed="rId2">
+            <a:extLst>
+              <a:ext uri="{28A0092B-C50C-407E-A947-70E740481C1C}">
+                <a14:useLocalDpi xmlns:a14="http://schemas.microsoft.com/office/drawing/2010/main" val="0"/>
+              </a:ext>
+            </a:extLst>
+          </a:blip>
+          <a:srcRect/>
+          <a:stretch>
+            <a:fillRect/>
+          </a:stretch>
+        </p:blipFill>
+        <p:spPr bwMode="auto">
+          <a:xfrm>
+            <a:off x="5385055" y="1157468"/>
+            <a:ext cx="6525895" cy="5494910"/>
+          </a:xfrm>
+          <a:prstGeom prst="rect">
+            <a:avLst/>
+          </a:prstGeom>
+          <a:noFill/>
+          <a:ln>
+            <a:noFill/>
+          </a:ln>
+          <a:effectLst/>
+          <a:extLst>
+            <a:ext uri="{909E8E84-426E-40DD-AFC4-6F175D3DCCD1}">
+              <a14:hiddenFill xmlns:a14="http://schemas.microsoft.com/office/drawing/2010/main">
+                <a:solidFill>
+                  <a:schemeClr val="accent1"/>
+                </a:solidFill>
+              </a14:hiddenFill>
+            </a:ext>
+            <a:ext uri="{91240B29-F687-4F45-9708-019B960494DF}">
+              <a14:hiddenLine xmlns:a14="http://schemas.microsoft.com/office/drawing/2010/main" w="9525">
+                <a:solidFill>
+                  <a:schemeClr val="tx1"/>
+                </a:solidFill>
+                <a:miter lim="800000"/>
+                <a:headEnd/>
+                <a:tailEnd/>
+              </a14:hiddenLine>
+            </a:ext>
+            <a:ext uri="{AF507438-7753-43E0-B8FC-AC1667EBCBE1}">
+              <a14:hiddenEffects xmlns:a14="http://schemas.microsoft.com/office/drawing/2010/main">
+                <a:effectLst>
+                  <a:outerShdw dist="35921" dir="2700000" algn="ctr" rotWithShape="0">
+                    <a:schemeClr val="bg2"/>
+                  </a:outerShdw>
+                </a:effectLst>
+              </a14:hiddenEffects>
+            </a:ext>
+          </a:extLst>
+        </p:spPr>
+      </p:pic>
+    </p:spTree>
+    <p:extLst>
+      <p:ext uri="{BB962C8B-B14F-4D97-AF65-F5344CB8AC3E}">
+        <p14:creationId xmlns:p14="http://schemas.microsoft.com/office/powerpoint/2010/main" val="2697591186"/>
+      </p:ext>
+    </p:extLst>
+  </p:cSld>
+  <p:clrMapOvr>
+    <a:masterClrMapping/>
+  </p:clrMapOvr>
+  <p:timing>
+    <p:tnLst>
+      <p:par>
+        <p:cTn id="1" dur="indefinite" restart="never" nodeType="tmRoot"/>
+      </p:par>
+    </p:tnLst>
+  </p:timing>
+</p:sld>
+</file>
+
+<file path=ppt/slides/slide34.xml><?xml version="1.0" encoding="utf-8"?>
+<p:sld xmlns:a="http://schemas.openxmlformats.org/drawingml/2006/main" xmlns:r="http://schemas.openxmlformats.org/officeDocument/2006/relationships" xmlns:p="http://schemas.openxmlformats.org/presentationml/2006/main">
+  <p:cSld>
+    <p:spTree>
+      <p:nvGrpSpPr>
+        <p:cNvPr id="1" name=""/>
+        <p:cNvGrpSpPr/>
+        <p:nvPr/>
+      </p:nvGrpSpPr>
+      <p:grpSpPr>
+        <a:xfrm>
+          <a:off x="0" y="0"/>
+          <a:ext cx="0" cy="0"/>
+          <a:chOff x="0" y="0"/>
+          <a:chExt cx="0" cy="0"/>
+        </a:xfrm>
+      </p:grpSpPr>
+      <p:sp>
+        <p:nvSpPr>
+          <p:cNvPr id="2" name="Titel 1"/>
+          <p:cNvSpPr>
+            <a:spLocks noGrp="1"/>
+          </p:cNvSpPr>
+          <p:nvPr>
+            <p:ph type="title"/>
+          </p:nvPr>
+        </p:nvSpPr>
+        <p:spPr/>
+        <p:txBody>
+          <a:bodyPr/>
+          <a:lstStyle/>
+          <a:p>
+            <a:r>
+              <a:rPr lang="en-US" dirty="0" smtClean="0"/>
               <a:t>Query – Object and Array Support</a:t>
             </a:r>
             <a:endParaRPr lang="de-DE" dirty="0"/>
@@ -9183,7 +9421,7 @@
 </p:sld>
 </file>
 
-<file path=ppt/slides/slide34.xml><?xml version="1.0" encoding="utf-8"?>
+<file path=ppt/slides/slide35.xml><?xml version="1.0" encoding="utf-8"?>
 <p:sld xmlns:a="http://schemas.openxmlformats.org/drawingml/2006/main" xmlns:r="http://schemas.openxmlformats.org/officeDocument/2006/relationships" xmlns:p="http://schemas.openxmlformats.org/presentationml/2006/main">
   <p:cSld>
     <p:spTree>

</xml_diff>